<commit_message>
Changes in the Class overview
</commit_message>
<xml_diff>
--- a/teaching/CS472/Timetable/CI-CD.pptx
+++ b/teaching/CS472/Timetable/CI-CD.pptx
@@ -225,7 +225,7 @@
           <a:p>
             <a:fld id="{E4BC6123-1163-F94A-BA09-1DD7850FFB16}" type="datetimeFigureOut">
               <a:rPr lang="en-BE" smtClean="0"/>
-              <a:t>18/09/2024</a:t>
+              <a:t>04/02/2025</a:t>
             </a:fld>
             <a:endParaRPr lang="en-BE"/>
           </a:p>
@@ -4518,7 +4518,7 @@
           <a:p>
             <a:fld id="{66E7E895-4D34-FB4B-8B19-AC896057ED5E}" type="datetimeFigureOut">
               <a:rPr lang="en-BE" smtClean="0"/>
-              <a:t>18/09/2024</a:t>
+              <a:t>04/02/2025</a:t>
             </a:fld>
             <a:endParaRPr lang="en-BE"/>
           </a:p>
@@ -4718,7 +4718,7 @@
           <a:p>
             <a:fld id="{66E7E895-4D34-FB4B-8B19-AC896057ED5E}" type="datetimeFigureOut">
               <a:rPr lang="en-BE" smtClean="0"/>
-              <a:t>18/09/2024</a:t>
+              <a:t>04/02/2025</a:t>
             </a:fld>
             <a:endParaRPr lang="en-BE"/>
           </a:p>
@@ -4928,7 +4928,7 @@
           <a:p>
             <a:fld id="{66E7E895-4D34-FB4B-8B19-AC896057ED5E}" type="datetimeFigureOut">
               <a:rPr lang="en-BE" smtClean="0"/>
-              <a:t>18/09/2024</a:t>
+              <a:t>04/02/2025</a:t>
             </a:fld>
             <a:endParaRPr lang="en-BE"/>
           </a:p>
@@ -5128,7 +5128,7 @@
           <a:p>
             <a:fld id="{66E7E895-4D34-FB4B-8B19-AC896057ED5E}" type="datetimeFigureOut">
               <a:rPr lang="en-BE" smtClean="0"/>
-              <a:t>18/09/2024</a:t>
+              <a:t>04/02/2025</a:t>
             </a:fld>
             <a:endParaRPr lang="en-BE"/>
           </a:p>
@@ -5404,7 +5404,7 @@
           <a:p>
             <a:fld id="{66E7E895-4D34-FB4B-8B19-AC896057ED5E}" type="datetimeFigureOut">
               <a:rPr lang="en-BE" smtClean="0"/>
-              <a:t>18/09/2024</a:t>
+              <a:t>04/02/2025</a:t>
             </a:fld>
             <a:endParaRPr lang="en-BE"/>
           </a:p>
@@ -5672,7 +5672,7 @@
           <a:p>
             <a:fld id="{66E7E895-4D34-FB4B-8B19-AC896057ED5E}" type="datetimeFigureOut">
               <a:rPr lang="en-BE" smtClean="0"/>
-              <a:t>18/09/2024</a:t>
+              <a:t>04/02/2025</a:t>
             </a:fld>
             <a:endParaRPr lang="en-BE"/>
           </a:p>
@@ -6087,7 +6087,7 @@
           <a:p>
             <a:fld id="{66E7E895-4D34-FB4B-8B19-AC896057ED5E}" type="datetimeFigureOut">
               <a:rPr lang="en-BE" smtClean="0"/>
-              <a:t>18/09/2024</a:t>
+              <a:t>04/02/2025</a:t>
             </a:fld>
             <a:endParaRPr lang="en-BE"/>
           </a:p>
@@ -6229,7 +6229,7 @@
           <a:p>
             <a:fld id="{66E7E895-4D34-FB4B-8B19-AC896057ED5E}" type="datetimeFigureOut">
               <a:rPr lang="en-BE" smtClean="0"/>
-              <a:t>18/09/2024</a:t>
+              <a:t>04/02/2025</a:t>
             </a:fld>
             <a:endParaRPr lang="en-BE"/>
           </a:p>
@@ -6342,7 +6342,7 @@
           <a:p>
             <a:fld id="{66E7E895-4D34-FB4B-8B19-AC896057ED5E}" type="datetimeFigureOut">
               <a:rPr lang="en-BE" smtClean="0"/>
-              <a:t>18/09/2024</a:t>
+              <a:t>04/02/2025</a:t>
             </a:fld>
             <a:endParaRPr lang="en-BE"/>
           </a:p>
@@ -6655,7 +6655,7 @@
           <a:p>
             <a:fld id="{66E7E895-4D34-FB4B-8B19-AC896057ED5E}" type="datetimeFigureOut">
               <a:rPr lang="en-BE" smtClean="0"/>
-              <a:t>18/09/2024</a:t>
+              <a:t>04/02/2025</a:t>
             </a:fld>
             <a:endParaRPr lang="en-BE"/>
           </a:p>
@@ -6944,7 +6944,7 @@
           <a:p>
             <a:fld id="{66E7E895-4D34-FB4B-8B19-AC896057ED5E}" type="datetimeFigureOut">
               <a:rPr lang="en-BE" smtClean="0"/>
-              <a:t>18/09/2024</a:t>
+              <a:t>04/02/2025</a:t>
             </a:fld>
             <a:endParaRPr lang="en-BE"/>
           </a:p>
@@ -7187,7 +7187,7 @@
           <a:p>
             <a:fld id="{66E7E895-4D34-FB4B-8B19-AC896057ED5E}" type="datetimeFigureOut">
               <a:rPr lang="en-BE" smtClean="0"/>
-              <a:t>18/09/2024</a:t>
+              <a:t>04/02/2025</a:t>
             </a:fld>
             <a:endParaRPr lang="en-BE"/>
           </a:p>
@@ -12643,7 +12643,7 @@
         <p:spPr>
           <a:xfrm>
             <a:off x="7566992" y="5229420"/>
-            <a:ext cx="2252871" cy="1477328"/>
+            <a:ext cx="2252871" cy="923330"/>
           </a:xfrm>
           <a:prstGeom prst="rect">
             <a:avLst/>
@@ -12659,34 +12659,6 @@
             <a:r>
               <a:rPr lang="en-BE" dirty="0"/>
               <a:t>Jobs Contain steps</a:t>
-            </a:r>
-          </a:p>
-          <a:p>
-            <a:pPr marL="285750" indent="-285750">
-              <a:buFont typeface="Arial" panose="020B0604020202020204" pitchFamily="34" charset="0"/>
-              <a:buChar char="•"/>
-            </a:pPr>
-            <a:r>
-              <a:rPr lang="en-GB" dirty="0"/>
-              <a:t>C</a:t>
-            </a:r>
-            <a:r>
-              <a:rPr lang="en-BE" dirty="0"/>
-              <a:t>heckout code</a:t>
-            </a:r>
-          </a:p>
-          <a:p>
-            <a:pPr marL="285750" indent="-285750">
-              <a:buFont typeface="Arial" panose="020B0604020202020204" pitchFamily="34" charset="0"/>
-              <a:buChar char="•"/>
-            </a:pPr>
-            <a:r>
-              <a:rPr lang="en-GB" dirty="0"/>
-              <a:t>C</a:t>
-            </a:r>
-            <a:r>
-              <a:rPr lang="en-BE" dirty="0"/>
-              <a:t>ompile code</a:t>
             </a:r>
           </a:p>
           <a:p>
@@ -13893,38 +13865,25 @@
           <a:p>
             <a:r>
               <a:rPr lang="en-US" dirty="0"/>
-              <a:t>The two lab marks will be posted by the end of the weekend</a:t>
+              <a:t>Lab 1 marks are posted – a few students are missing marks</a:t>
             </a:r>
           </a:p>
           <a:p>
             <a:r>
               <a:rPr lang="en-US" dirty="0"/>
-              <a:t>Precondition report feedback this weekend</a:t>
-            </a:r>
-          </a:p>
-          <a:p>
-            <a:pPr lvl="1"/>
+              <a:t>Merge conflicts in the testing lab</a:t>
+            </a:r>
+          </a:p>
+          <a:p>
             <a:r>
               <a:rPr lang="en-US" dirty="0"/>
-              <a:t>A quick glance at the ideas, they seem solid.</a:t>
+              <a:t>Start working on the DP I ASAP</a:t>
             </a:r>
           </a:p>
           <a:p>
             <a:r>
               <a:rPr lang="en-US" dirty="0"/>
-              <a:t>Start working on the CI lab – Due 09/24/2024</a:t>
-            </a:r>
-          </a:p>
-          <a:p>
-            <a:r>
-              <a:rPr lang="en-US" dirty="0"/>
-              <a:t>Start working on DP I – Due 09/30/2024</a:t>
-            </a:r>
-          </a:p>
-          <a:p>
-            <a:r>
-              <a:rPr lang="en-US" dirty="0"/>
-              <a:t>Kane Toomer from the Advising center will visit 09/25/2024 </a:t>
+              <a:t>CI lab will be a continuation of the testing lab</a:t>
             </a:r>
           </a:p>
         </p:txBody>
@@ -17673,7 +17632,7 @@
         <p:spPr>
           <a:xfrm>
             <a:off x="649357" y="1404730"/>
-            <a:ext cx="5963478" cy="4247317"/>
+            <a:ext cx="5963478" cy="3385542"/>
           </a:xfrm>
           <a:prstGeom prst="rect">
             <a:avLst/>
@@ -17725,16 +17684,6 @@
             <a:r>
               <a:rPr lang="en-BE" sz="2800" dirty="0"/>
               <a:t>Actions can have arguments by specifying (with:) keyword followed by name-value pairs</a:t>
-            </a:r>
-          </a:p>
-          <a:p>
-            <a:pPr marL="285750" indent="-285750">
-              <a:buFont typeface="Arial" panose="020B0604020202020204" pitchFamily="34" charset="0"/>
-              <a:buChar char="•"/>
-            </a:pPr>
-            <a:r>
-              <a:rPr lang="en-BE" sz="2800" dirty="0"/>
-              <a:t>Read the actions documentation to explore all options</a:t>
             </a:r>
           </a:p>
           <a:p>
@@ -21174,7 +21123,7 @@
 </file>
 
 <file path=ppt/slides/slide4.xml><?xml version="1.0" encoding="utf-8"?>
-<p:sld xmlns:a="http://schemas.openxmlformats.org/drawingml/2006/main" xmlns:r="http://schemas.openxmlformats.org/officeDocument/2006/relationships" xmlns:p="http://schemas.openxmlformats.org/presentationml/2006/main">
+<p:sld xmlns:a="http://schemas.openxmlformats.org/drawingml/2006/main" xmlns:r="http://schemas.openxmlformats.org/officeDocument/2006/relationships" xmlns:p="http://schemas.openxmlformats.org/presentationml/2006/main" show="0">
   <p:cSld>
     <p:spTree>
       <p:nvGrpSpPr>
@@ -22681,7 +22630,7 @@
 </file>
 
 <file path=ppt/slides/slide5.xml><?xml version="1.0" encoding="utf-8"?>
-<p:sld xmlns:a="http://schemas.openxmlformats.org/drawingml/2006/main" xmlns:r="http://schemas.openxmlformats.org/officeDocument/2006/relationships" xmlns:p="http://schemas.openxmlformats.org/presentationml/2006/main">
+<p:sld xmlns:a="http://schemas.openxmlformats.org/drawingml/2006/main" xmlns:r="http://schemas.openxmlformats.org/officeDocument/2006/relationships" xmlns:p="http://schemas.openxmlformats.org/presentationml/2006/main" show="0">
   <p:cSld>
     <p:spTree>
       <p:nvGrpSpPr>

</xml_diff>

<commit_message>
cahnges in the GenAI lab
</commit_message>
<xml_diff>
--- a/teaching/CS472/Timetable/CI-CD.pptx
+++ b/teaching/CS472/Timetable/CI-CD.pptx
@@ -21123,7 +21123,7 @@
 </file>
 
 <file path=ppt/slides/slide4.xml><?xml version="1.0" encoding="utf-8"?>
-<p:sld xmlns:a="http://schemas.openxmlformats.org/drawingml/2006/main" xmlns:r="http://schemas.openxmlformats.org/officeDocument/2006/relationships" xmlns:p="http://schemas.openxmlformats.org/presentationml/2006/main" show="0">
+<p:sld xmlns:a="http://schemas.openxmlformats.org/drawingml/2006/main" xmlns:r="http://schemas.openxmlformats.org/officeDocument/2006/relationships" xmlns:p="http://schemas.openxmlformats.org/presentationml/2006/main">
   <p:cSld>
     <p:spTree>
       <p:nvGrpSpPr>
@@ -22630,7 +22630,7 @@
 </file>
 
 <file path=ppt/slides/slide5.xml><?xml version="1.0" encoding="utf-8"?>
-<p:sld xmlns:a="http://schemas.openxmlformats.org/drawingml/2006/main" xmlns:r="http://schemas.openxmlformats.org/officeDocument/2006/relationships" xmlns:p="http://schemas.openxmlformats.org/presentationml/2006/main" show="0">
+<p:sld xmlns:a="http://schemas.openxmlformats.org/drawingml/2006/main" xmlns:r="http://schemas.openxmlformats.org/officeDocument/2006/relationships" xmlns:p="http://schemas.openxmlformats.org/presentationml/2006/main">
   <p:cSld>
     <p:spTree>
       <p:nvGrpSpPr>

</xml_diff>

<commit_message>
changes in the CI slides
</commit_message>
<xml_diff>
--- a/teaching/CS472/Timetable/CI-CD.pptx
+++ b/teaching/CS472/Timetable/CI-CD.pptx
@@ -225,7 +225,7 @@
           <a:p>
             <a:fld id="{E4BC6123-1163-F94A-BA09-1DD7850FFB16}" type="datetimeFigureOut">
               <a:rPr lang="en-BE" smtClean="0"/>
-              <a:t>04/02/2025</a:t>
+              <a:t>15/09/2025</a:t>
             </a:fld>
             <a:endParaRPr lang="en-BE"/>
           </a:p>
@@ -4518,7 +4518,7 @@
           <a:p>
             <a:fld id="{66E7E895-4D34-FB4B-8B19-AC896057ED5E}" type="datetimeFigureOut">
               <a:rPr lang="en-BE" smtClean="0"/>
-              <a:t>04/02/2025</a:t>
+              <a:t>15/09/2025</a:t>
             </a:fld>
             <a:endParaRPr lang="en-BE"/>
           </a:p>
@@ -4718,7 +4718,7 @@
           <a:p>
             <a:fld id="{66E7E895-4D34-FB4B-8B19-AC896057ED5E}" type="datetimeFigureOut">
               <a:rPr lang="en-BE" smtClean="0"/>
-              <a:t>04/02/2025</a:t>
+              <a:t>15/09/2025</a:t>
             </a:fld>
             <a:endParaRPr lang="en-BE"/>
           </a:p>
@@ -4928,7 +4928,7 @@
           <a:p>
             <a:fld id="{66E7E895-4D34-FB4B-8B19-AC896057ED5E}" type="datetimeFigureOut">
               <a:rPr lang="en-BE" smtClean="0"/>
-              <a:t>04/02/2025</a:t>
+              <a:t>15/09/2025</a:t>
             </a:fld>
             <a:endParaRPr lang="en-BE"/>
           </a:p>
@@ -5128,7 +5128,7 @@
           <a:p>
             <a:fld id="{66E7E895-4D34-FB4B-8B19-AC896057ED5E}" type="datetimeFigureOut">
               <a:rPr lang="en-BE" smtClean="0"/>
-              <a:t>04/02/2025</a:t>
+              <a:t>15/09/2025</a:t>
             </a:fld>
             <a:endParaRPr lang="en-BE"/>
           </a:p>
@@ -5404,7 +5404,7 @@
           <a:p>
             <a:fld id="{66E7E895-4D34-FB4B-8B19-AC896057ED5E}" type="datetimeFigureOut">
               <a:rPr lang="en-BE" smtClean="0"/>
-              <a:t>04/02/2025</a:t>
+              <a:t>15/09/2025</a:t>
             </a:fld>
             <a:endParaRPr lang="en-BE"/>
           </a:p>
@@ -5672,7 +5672,7 @@
           <a:p>
             <a:fld id="{66E7E895-4D34-FB4B-8B19-AC896057ED5E}" type="datetimeFigureOut">
               <a:rPr lang="en-BE" smtClean="0"/>
-              <a:t>04/02/2025</a:t>
+              <a:t>15/09/2025</a:t>
             </a:fld>
             <a:endParaRPr lang="en-BE"/>
           </a:p>
@@ -6087,7 +6087,7 @@
           <a:p>
             <a:fld id="{66E7E895-4D34-FB4B-8B19-AC896057ED5E}" type="datetimeFigureOut">
               <a:rPr lang="en-BE" smtClean="0"/>
-              <a:t>04/02/2025</a:t>
+              <a:t>15/09/2025</a:t>
             </a:fld>
             <a:endParaRPr lang="en-BE"/>
           </a:p>
@@ -6229,7 +6229,7 @@
           <a:p>
             <a:fld id="{66E7E895-4D34-FB4B-8B19-AC896057ED5E}" type="datetimeFigureOut">
               <a:rPr lang="en-BE" smtClean="0"/>
-              <a:t>04/02/2025</a:t>
+              <a:t>15/09/2025</a:t>
             </a:fld>
             <a:endParaRPr lang="en-BE"/>
           </a:p>
@@ -6342,7 +6342,7 @@
           <a:p>
             <a:fld id="{66E7E895-4D34-FB4B-8B19-AC896057ED5E}" type="datetimeFigureOut">
               <a:rPr lang="en-BE" smtClean="0"/>
-              <a:t>04/02/2025</a:t>
+              <a:t>15/09/2025</a:t>
             </a:fld>
             <a:endParaRPr lang="en-BE"/>
           </a:p>
@@ -6655,7 +6655,7 @@
           <a:p>
             <a:fld id="{66E7E895-4D34-FB4B-8B19-AC896057ED5E}" type="datetimeFigureOut">
               <a:rPr lang="en-BE" smtClean="0"/>
-              <a:t>04/02/2025</a:t>
+              <a:t>15/09/2025</a:t>
             </a:fld>
             <a:endParaRPr lang="en-BE"/>
           </a:p>
@@ -6944,7 +6944,7 @@
           <a:p>
             <a:fld id="{66E7E895-4D34-FB4B-8B19-AC896057ED5E}" type="datetimeFigureOut">
               <a:rPr lang="en-BE" smtClean="0"/>
-              <a:t>04/02/2025</a:t>
+              <a:t>15/09/2025</a:t>
             </a:fld>
             <a:endParaRPr lang="en-BE"/>
           </a:p>
@@ -7187,7 +7187,7 @@
           <a:p>
             <a:fld id="{66E7E895-4D34-FB4B-8B19-AC896057ED5E}" type="datetimeFigureOut">
               <a:rPr lang="en-BE" smtClean="0"/>
-              <a:t>04/02/2025</a:t>
+              <a:t>15/09/2025</a:t>
             </a:fld>
             <a:endParaRPr lang="en-BE"/>
           </a:p>
@@ -12369,7 +12369,7 @@
           <a:p>
             <a:r>
               <a:rPr lang="en-BE" dirty="0"/>
-              <a:t>Everyrepository can have any number of workflows</a:t>
+              <a:t>Every repository can have any number of workflows</a:t>
             </a:r>
           </a:p>
           <a:p>
@@ -13871,19 +13871,11 @@
           <a:p>
             <a:r>
               <a:rPr lang="en-US" dirty="0"/>
-              <a:t>Merge conflicts in the testing lab</a:t>
-            </a:r>
-          </a:p>
-          <a:p>
-            <a:r>
-              <a:rPr lang="en-US" dirty="0"/>
-              <a:t>Start working on the DP I ASAP</a:t>
-            </a:r>
-          </a:p>
-          <a:p>
-            <a:r>
-              <a:rPr lang="en-US" dirty="0"/>
-              <a:t>CI lab will be a continuation of the testing lab</a:t>
+              <a:t>Start working on the DP I ASAP – </a:t>
+            </a:r>
+            <a:r>
+              <a:rPr lang="en-US" b="1" dirty="0"/>
+              <a:t>Due date 09/21/2025</a:t>
             </a:r>
           </a:p>
         </p:txBody>

</xml_diff>

<commit_message>
changes to the project
</commit_message>
<xml_diff>
--- a/teaching/CS472/Timetable/CI-CD.pptx
+++ b/teaching/CS472/Timetable/CI-CD.pptx
@@ -5,7 +5,7 @@
     <p:sldMasterId id="2147483648" r:id="rId1"/>
   </p:sldMasterIdLst>
   <p:notesMasterIdLst>
-    <p:notesMasterId r:id="rId31"/>
+    <p:notesMasterId r:id="rId33"/>
   </p:notesMasterIdLst>
   <p:sldIdLst>
     <p:sldId id="265" r:id="rId2"/>
@@ -22,21 +22,23 @@
     <p:sldId id="287" r:id="rId13"/>
     <p:sldId id="286" r:id="rId14"/>
     <p:sldId id="258" r:id="rId15"/>
-    <p:sldId id="260" r:id="rId16"/>
-    <p:sldId id="261" r:id="rId17"/>
-    <p:sldId id="262" r:id="rId18"/>
-    <p:sldId id="264" r:id="rId19"/>
-    <p:sldId id="263" r:id="rId20"/>
-    <p:sldId id="270" r:id="rId21"/>
-    <p:sldId id="271" r:id="rId22"/>
-    <p:sldId id="272" r:id="rId23"/>
-    <p:sldId id="273" r:id="rId24"/>
-    <p:sldId id="274" r:id="rId25"/>
-    <p:sldId id="276" r:id="rId26"/>
-    <p:sldId id="275" r:id="rId27"/>
-    <p:sldId id="278" r:id="rId28"/>
-    <p:sldId id="279" r:id="rId29"/>
-    <p:sldId id="288" r:id="rId30"/>
+    <p:sldId id="290" r:id="rId16"/>
+    <p:sldId id="291" r:id="rId17"/>
+    <p:sldId id="260" r:id="rId18"/>
+    <p:sldId id="261" r:id="rId19"/>
+    <p:sldId id="262" r:id="rId20"/>
+    <p:sldId id="264" r:id="rId21"/>
+    <p:sldId id="263" r:id="rId22"/>
+    <p:sldId id="270" r:id="rId23"/>
+    <p:sldId id="271" r:id="rId24"/>
+    <p:sldId id="272" r:id="rId25"/>
+    <p:sldId id="273" r:id="rId26"/>
+    <p:sldId id="274" r:id="rId27"/>
+    <p:sldId id="276" r:id="rId28"/>
+    <p:sldId id="275" r:id="rId29"/>
+    <p:sldId id="278" r:id="rId30"/>
+    <p:sldId id="279" r:id="rId31"/>
+    <p:sldId id="288" r:id="rId32"/>
   </p:sldIdLst>
   <p:sldSz cx="12192000" cy="6858000"/>
   <p:notesSz cx="6858000" cy="9144000"/>
@@ -225,7 +227,7 @@
           <a:p>
             <a:fld id="{E4BC6123-1163-F94A-BA09-1DD7850FFB16}" type="datetimeFigureOut">
               <a:rPr lang="en-BE" smtClean="0"/>
-              <a:t>15/09/2025</a:t>
+              <a:t>10/02/2026</a:t>
             </a:fld>
             <a:endParaRPr lang="en-BE"/>
           </a:p>
@@ -840,7 +842,7 @@
           <a:p>
             <a:fld id="{F2AA4657-833F-094E-A535-887F61AFD5FC}" type="slidenum">
               <a:rPr lang="en-BE" smtClean="0"/>
-              <a:t>17</a:t>
+              <a:t>19</a:t>
             </a:fld>
             <a:endParaRPr lang="en-BE"/>
           </a:p>
@@ -1156,7 +1158,7 @@
           <a:p>
             <a:fld id="{F2AA4657-833F-094E-A535-887F61AFD5FC}" type="slidenum">
               <a:rPr lang="en-BE" smtClean="0"/>
-              <a:t>18</a:t>
+              <a:t>20</a:t>
             </a:fld>
             <a:endParaRPr lang="en-BE"/>
           </a:p>
@@ -1472,7 +1474,7 @@
           <a:p>
             <a:fld id="{F2AA4657-833F-094E-A535-887F61AFD5FC}" type="slidenum">
               <a:rPr lang="en-BE" smtClean="0"/>
-              <a:t>19</a:t>
+              <a:t>21</a:t>
             </a:fld>
             <a:endParaRPr lang="en-BE"/>
           </a:p>
@@ -1700,7 +1702,7 @@
           <a:p>
             <a:fld id="{F2AA4657-833F-094E-A535-887F61AFD5FC}" type="slidenum">
               <a:rPr lang="en-BE" smtClean="0"/>
-              <a:t>20</a:t>
+              <a:t>22</a:t>
             </a:fld>
             <a:endParaRPr lang="en-BE"/>
           </a:p>
@@ -1834,7 +1836,7 @@
           <a:p>
             <a:fld id="{F2AA4657-833F-094E-A535-887F61AFD5FC}" type="slidenum">
               <a:rPr lang="en-BE" smtClean="0"/>
-              <a:t>21</a:t>
+              <a:t>23</a:t>
             </a:fld>
             <a:endParaRPr lang="en-BE"/>
           </a:p>
@@ -2017,7 +2019,7 @@
           <a:p>
             <a:fld id="{F2AA4657-833F-094E-A535-887F61AFD5FC}" type="slidenum">
               <a:rPr lang="en-BE" smtClean="0"/>
-              <a:t>22</a:t>
+              <a:t>24</a:t>
             </a:fld>
             <a:endParaRPr lang="en-BE"/>
           </a:p>
@@ -2167,7 +2169,7 @@
           <a:p>
             <a:fld id="{F2AA4657-833F-094E-A535-887F61AFD5FC}" type="slidenum">
               <a:rPr lang="en-BE" smtClean="0"/>
-              <a:t>23</a:t>
+              <a:t>25</a:t>
             </a:fld>
             <a:endParaRPr lang="en-BE"/>
           </a:p>
@@ -2363,7 +2365,7 @@
           <a:p>
             <a:fld id="{F2AA4657-833F-094E-A535-887F61AFD5FC}" type="slidenum">
               <a:rPr lang="en-BE" smtClean="0"/>
-              <a:t>24</a:t>
+              <a:t>26</a:t>
             </a:fld>
             <a:endParaRPr lang="en-BE"/>
           </a:p>
@@ -2584,7 +2586,7 @@
           <a:p>
             <a:fld id="{F2AA4657-833F-094E-A535-887F61AFD5FC}" type="slidenum">
               <a:rPr lang="en-BE" smtClean="0"/>
-              <a:t>25</a:t>
+              <a:t>27</a:t>
             </a:fld>
             <a:endParaRPr lang="en-BE"/>
           </a:p>
@@ -2647,78 +2649,13 @@
           <a:bodyPr/>
           <a:lstStyle/>
           <a:p>
-            <a:pPr algn="l"/>
-            <a:r>
-              <a:rPr lang="en-GB" b="0" i="0" dirty="0">
-                <a:solidFill>
-                  <a:srgbClr val="333333"/>
-                </a:solidFill>
-                <a:effectLst/>
-                <a:latin typeface="OpenSans"/>
-              </a:rPr>
-              <a:t>CI is where developers plan and then code the solution, and then build it and test it in several repeating cycles until it’s complete. And then the solution is ready to be delivered. </a:t>
-            </a:r>
-          </a:p>
-          <a:p>
-            <a:pPr algn="l"/>
-            <a:endParaRPr lang="en-GB" b="0" i="0" dirty="0">
-              <a:solidFill>
-                <a:srgbClr val="333333"/>
-              </a:solidFill>
-              <a:effectLst/>
-              <a:latin typeface="OpenSans"/>
-            </a:endParaRPr>
-          </a:p>
-          <a:p>
-            <a:pPr algn="l"/>
-            <a:r>
-              <a:rPr lang="en-GB" b="0" i="0" dirty="0">
-                <a:solidFill>
-                  <a:srgbClr val="333333"/>
-                </a:solidFill>
-                <a:effectLst/>
-                <a:latin typeface="OpenSans"/>
-              </a:rPr>
-              <a:t>While Continuous Delivery is made up of Release, Deploy, and Operate phases, where the solution is released, and the binaries are deployed into a given environment in repeating cycles, and the solution is then in live operation from that point on. </a:t>
-            </a:r>
-          </a:p>
-          <a:p>
-            <a:pPr algn="l"/>
-            <a:endParaRPr lang="en-GB" b="0" i="0" dirty="0">
-              <a:solidFill>
-                <a:srgbClr val="333333"/>
-              </a:solidFill>
-              <a:effectLst/>
-              <a:latin typeface="OpenSans"/>
-            </a:endParaRPr>
-          </a:p>
-          <a:p>
-            <a:pPr algn="l"/>
-            <a:r>
-              <a:rPr lang="en-GB" b="0" i="0" dirty="0">
-                <a:solidFill>
-                  <a:srgbClr val="333333"/>
-                </a:solidFill>
-                <a:effectLst/>
-                <a:latin typeface="OpenSans"/>
-              </a:rPr>
-              <a:t>In the class and project, we will focus on only CI</a:t>
-            </a:r>
-          </a:p>
-          <a:p>
-            <a:pPr algn="l"/>
-            <a:endParaRPr lang="en-GB" b="0" i="0" dirty="0">
-              <a:solidFill>
-                <a:srgbClr val="333333"/>
-              </a:solidFill>
-              <a:effectLst/>
-              <a:latin typeface="OpenSans"/>
-            </a:endParaRPr>
-          </a:p>
-          <a:p>
-            <a:r>
-              <a:rPr lang="en-BE" dirty="0"/>
-              <a:t> </a:t>
+            <a:r>
+              <a:rPr lang="en-GB" b="1" dirty="0"/>
+              <a:t>In this class and in your project, we focus exclusively on CI</a:t>
+            </a:r>
+            <a:r>
+              <a:rPr lang="en-GB" dirty="0"/>
+              <a:t> — the part of the pipeline that supports pull requests, code reviews, and safe collaboration.</a:t>
             </a:r>
           </a:p>
         </p:txBody>
@@ -2903,7 +2840,7 @@
           <a:p>
             <a:fld id="{F2AA4657-833F-094E-A535-887F61AFD5FC}" type="slidenum">
               <a:rPr lang="en-BE" smtClean="0"/>
-              <a:t>26</a:t>
+              <a:t>28</a:t>
             </a:fld>
             <a:endParaRPr lang="en-BE"/>
           </a:p>
@@ -3092,7 +3029,7 @@
           <a:p>
             <a:fld id="{F2AA4657-833F-094E-A535-887F61AFD5FC}" type="slidenum">
               <a:rPr lang="en-BE" smtClean="0"/>
-              <a:t>27</a:t>
+              <a:t>29</a:t>
             </a:fld>
             <a:endParaRPr lang="en-BE"/>
           </a:p>
@@ -3281,7 +3218,7 @@
           <a:p>
             <a:fld id="{F2AA4657-833F-094E-A535-887F61AFD5FC}" type="slidenum">
               <a:rPr lang="en-BE" smtClean="0"/>
-              <a:t>28</a:t>
+              <a:t>30</a:t>
             </a:fld>
             <a:endParaRPr lang="en-BE"/>
           </a:p>
@@ -3344,58 +3281,90 @@
           <a:bodyPr/>
           <a:lstStyle/>
           <a:p>
-            <a:pPr algn="l"/>
-            <a:r>
-              <a:rPr lang="en-GB" b="0" i="0" dirty="0">
-                <a:solidFill>
-                  <a:srgbClr val="333333"/>
-                </a:solidFill>
-                <a:effectLst/>
-                <a:latin typeface="OpenSans"/>
-              </a:rPr>
-              <a:t>Continuous Deployment’ is when you continuously push to production</a:t>
-            </a:r>
-          </a:p>
-          <a:p>
-            <a:pPr algn="l"/>
-            <a:r>
-              <a:rPr lang="en-GB" b="0" i="0" dirty="0">
-                <a:solidFill>
-                  <a:srgbClr val="333333"/>
-                </a:solidFill>
-                <a:effectLst/>
-                <a:latin typeface="OpenSans"/>
-              </a:rPr>
-              <a:t>Release automation – for example releasing your package to a package manager</a:t>
-            </a:r>
-          </a:p>
-          <a:p>
-            <a:pPr algn="l"/>
-            <a:r>
-              <a:rPr lang="en-GB" b="0" i="0" dirty="0">
-                <a:solidFill>
-                  <a:srgbClr val="333333"/>
-                </a:solidFill>
-                <a:effectLst/>
-                <a:latin typeface="OpenSans"/>
-              </a:rPr>
-              <a:t>Production automation – deploying your package to production – e.g., deploying your app/package to app store or google play</a:t>
-            </a:r>
-          </a:p>
-          <a:p>
-            <a:pPr algn="l"/>
-            <a:endParaRPr lang="en-GB" b="0" i="0" dirty="0">
-              <a:solidFill>
-                <a:srgbClr val="333333"/>
-              </a:solidFill>
-              <a:effectLst/>
-              <a:latin typeface="OpenSans"/>
-            </a:endParaRPr>
-          </a:p>
-          <a:p>
-            <a:r>
-              <a:rPr lang="en-BE" dirty="0"/>
-              <a:t> </a:t>
+            <a:r>
+              <a:rPr lang="en-GB" b="1" dirty="0"/>
+              <a:t>Continuous Deployment</a:t>
+            </a:r>
+            <a:r>
+              <a:rPr lang="en-GB" dirty="0"/>
+              <a:t> means that every change that passes CI is automatically released to a production environment, without human approval.</a:t>
+            </a:r>
+          </a:p>
+          <a:p>
+            <a:r>
+              <a:rPr lang="en-GB" dirty="0"/>
+              <a:t>This requires:</a:t>
+            </a:r>
+          </a:p>
+          <a:p>
+            <a:r>
+              <a:rPr lang="en-GB" b="1" dirty="0"/>
+              <a:t>Release automation</a:t>
+            </a:r>
+            <a:r>
+              <a:rPr lang="en-GB" dirty="0"/>
+              <a:t>, such as publishing a package or generating a production-ready artifact</a:t>
+            </a:r>
+          </a:p>
+          <a:p>
+            <a:r>
+              <a:rPr lang="en-GB" b="1" dirty="0"/>
+              <a:t>Production automation</a:t>
+            </a:r>
+            <a:r>
+              <a:rPr lang="en-GB" dirty="0"/>
+              <a:t>, where that artifact is deployed directly to users — for example via a web service rollout or an app store release</a:t>
+            </a:r>
+          </a:p>
+          <a:p>
+            <a:r>
+              <a:rPr lang="en-GB" dirty="0"/>
+              <a:t>In contrast, </a:t>
+            </a:r>
+            <a:r>
+              <a:rPr lang="en-GB" b="1" dirty="0"/>
+              <a:t>Continuous Delivery</a:t>
+            </a:r>
+            <a:r>
+              <a:rPr lang="en-GB" dirty="0"/>
+              <a:t> stops just short of this step.</a:t>
+            </a:r>
+            <a:br>
+              <a:rPr lang="en-GB" dirty="0"/>
+            </a:br>
+            <a:r>
+              <a:rPr lang="en-GB" dirty="0"/>
+              <a:t>Changes are always </a:t>
+            </a:r>
+            <a:r>
+              <a:rPr lang="en-GB" i="1" dirty="0"/>
+              <a:t>ready</a:t>
+            </a:r>
+            <a:r>
+              <a:rPr lang="en-GB" dirty="0"/>
+              <a:t> to deploy, but a human decides </a:t>
+            </a:r>
+            <a:r>
+              <a:rPr lang="en-GB" b="1" dirty="0"/>
+              <a:t>when</a:t>
+            </a:r>
+            <a:r>
+              <a:rPr lang="en-GB" dirty="0"/>
+              <a:t> they go to production.</a:t>
+            </a:r>
+          </a:p>
+          <a:p>
+            <a:r>
+              <a:rPr lang="en-GB" dirty="0"/>
+              <a:t>In practice, most teams use </a:t>
+            </a:r>
+            <a:r>
+              <a:rPr lang="en-GB" b="1" dirty="0"/>
+              <a:t>continuous delivery</a:t>
+            </a:r>
+            <a:r>
+              <a:rPr lang="en-GB" dirty="0"/>
+              <a:t>, not continuous deployment — especially when changes involve risk, users, or AI-generated code.</a:t>
             </a:r>
           </a:p>
         </p:txBody>
@@ -4516,9 +4485,9 @@
           <a:bodyPr/>
           <a:lstStyle/>
           <a:p>
-            <a:fld id="{66E7E895-4D34-FB4B-8B19-AC896057ED5E}" type="datetimeFigureOut">
-              <a:rPr lang="en-BE" smtClean="0"/>
-              <a:t>15/09/2025</a:t>
+            <a:fld id="{6DFD7053-30C3-F845-BA29-D37ED4295CD3}" type="datetime1">
+              <a:rPr lang="en-US" smtClean="0"/>
+              <a:t>2/10/26</a:t>
             </a:fld>
             <a:endParaRPr lang="en-BE"/>
           </a:p>
@@ -4716,9 +4685,9 @@
           <a:bodyPr/>
           <a:lstStyle/>
           <a:p>
-            <a:fld id="{66E7E895-4D34-FB4B-8B19-AC896057ED5E}" type="datetimeFigureOut">
-              <a:rPr lang="en-BE" smtClean="0"/>
-              <a:t>15/09/2025</a:t>
+            <a:fld id="{8C53274B-405E-3B42-A516-AE6417BDDB6C}" type="datetime1">
+              <a:rPr lang="en-US" smtClean="0"/>
+              <a:t>2/10/26</a:t>
             </a:fld>
             <a:endParaRPr lang="en-BE"/>
           </a:p>
@@ -4926,9 +4895,9 @@
           <a:bodyPr/>
           <a:lstStyle/>
           <a:p>
-            <a:fld id="{66E7E895-4D34-FB4B-8B19-AC896057ED5E}" type="datetimeFigureOut">
-              <a:rPr lang="en-BE" smtClean="0"/>
-              <a:t>15/09/2025</a:t>
+            <a:fld id="{49CCB7B2-B459-F240-9313-57499759AB25}" type="datetime1">
+              <a:rPr lang="en-US" smtClean="0"/>
+              <a:t>2/10/26</a:t>
             </a:fld>
             <a:endParaRPr lang="en-BE"/>
           </a:p>
@@ -5126,9 +5095,9 @@
           <a:bodyPr/>
           <a:lstStyle/>
           <a:p>
-            <a:fld id="{66E7E895-4D34-FB4B-8B19-AC896057ED5E}" type="datetimeFigureOut">
-              <a:rPr lang="en-BE" smtClean="0"/>
-              <a:t>15/09/2025</a:t>
+            <a:fld id="{8D9DA577-D78B-1340-8EA6-B625CC2E8019}" type="datetime1">
+              <a:rPr lang="en-US" smtClean="0"/>
+              <a:t>2/10/26</a:t>
             </a:fld>
             <a:endParaRPr lang="en-BE"/>
           </a:p>
@@ -5402,9 +5371,9 @@
           <a:bodyPr/>
           <a:lstStyle/>
           <a:p>
-            <a:fld id="{66E7E895-4D34-FB4B-8B19-AC896057ED5E}" type="datetimeFigureOut">
-              <a:rPr lang="en-BE" smtClean="0"/>
-              <a:t>15/09/2025</a:t>
+            <a:fld id="{37DC2910-E7C7-2B4D-A5ED-BEAD37436F68}" type="datetime1">
+              <a:rPr lang="en-US" smtClean="0"/>
+              <a:t>2/10/26</a:t>
             </a:fld>
             <a:endParaRPr lang="en-BE"/>
           </a:p>
@@ -5670,9 +5639,9 @@
           <a:bodyPr/>
           <a:lstStyle/>
           <a:p>
-            <a:fld id="{66E7E895-4D34-FB4B-8B19-AC896057ED5E}" type="datetimeFigureOut">
-              <a:rPr lang="en-BE" smtClean="0"/>
-              <a:t>15/09/2025</a:t>
+            <a:fld id="{C822211D-ADC5-8746-BFF0-E2E57159386A}" type="datetime1">
+              <a:rPr lang="en-US" smtClean="0"/>
+              <a:t>2/10/26</a:t>
             </a:fld>
             <a:endParaRPr lang="en-BE"/>
           </a:p>
@@ -6085,9 +6054,9 @@
           <a:bodyPr/>
           <a:lstStyle/>
           <a:p>
-            <a:fld id="{66E7E895-4D34-FB4B-8B19-AC896057ED5E}" type="datetimeFigureOut">
-              <a:rPr lang="en-BE" smtClean="0"/>
-              <a:t>15/09/2025</a:t>
+            <a:fld id="{13FD7546-4B88-DD4D-8D0F-B7037F812648}" type="datetime1">
+              <a:rPr lang="en-US" smtClean="0"/>
+              <a:t>2/10/26</a:t>
             </a:fld>
             <a:endParaRPr lang="en-BE"/>
           </a:p>
@@ -6227,9 +6196,9 @@
           <a:bodyPr/>
           <a:lstStyle/>
           <a:p>
-            <a:fld id="{66E7E895-4D34-FB4B-8B19-AC896057ED5E}" type="datetimeFigureOut">
-              <a:rPr lang="en-BE" smtClean="0"/>
-              <a:t>15/09/2025</a:t>
+            <a:fld id="{D3A74519-E102-EC4D-8F00-BBEDB56B58D6}" type="datetime1">
+              <a:rPr lang="en-US" smtClean="0"/>
+              <a:t>2/10/26</a:t>
             </a:fld>
             <a:endParaRPr lang="en-BE"/>
           </a:p>
@@ -6340,9 +6309,9 @@
           <a:bodyPr/>
           <a:lstStyle/>
           <a:p>
-            <a:fld id="{66E7E895-4D34-FB4B-8B19-AC896057ED5E}" type="datetimeFigureOut">
-              <a:rPr lang="en-BE" smtClean="0"/>
-              <a:t>15/09/2025</a:t>
+            <a:fld id="{9F7BC692-C68F-EB46-81D3-8E211600C5A7}" type="datetime1">
+              <a:rPr lang="en-US" smtClean="0"/>
+              <a:t>2/10/26</a:t>
             </a:fld>
             <a:endParaRPr lang="en-BE"/>
           </a:p>
@@ -6653,9 +6622,9 @@
           <a:bodyPr/>
           <a:lstStyle/>
           <a:p>
-            <a:fld id="{66E7E895-4D34-FB4B-8B19-AC896057ED5E}" type="datetimeFigureOut">
-              <a:rPr lang="en-BE" smtClean="0"/>
-              <a:t>15/09/2025</a:t>
+            <a:fld id="{BFBA3FB0-6A70-074B-A6E8-9A90CED99076}" type="datetime1">
+              <a:rPr lang="en-US" smtClean="0"/>
+              <a:t>2/10/26</a:t>
             </a:fld>
             <a:endParaRPr lang="en-BE"/>
           </a:p>
@@ -6942,9 +6911,9 @@
           <a:bodyPr/>
           <a:lstStyle/>
           <a:p>
-            <a:fld id="{66E7E895-4D34-FB4B-8B19-AC896057ED5E}" type="datetimeFigureOut">
-              <a:rPr lang="en-BE" smtClean="0"/>
-              <a:t>15/09/2025</a:t>
+            <a:fld id="{EAAB1C94-1B03-9F48-ABBF-1D0A26EE12D2}" type="datetime1">
+              <a:rPr lang="en-US" smtClean="0"/>
+              <a:t>2/10/26</a:t>
             </a:fld>
             <a:endParaRPr lang="en-BE"/>
           </a:p>
@@ -7185,9 +7154,9 @@
             </a:lvl1pPr>
           </a:lstStyle>
           <a:p>
-            <a:fld id="{66E7E895-4D34-FB4B-8B19-AC896057ED5E}" type="datetimeFigureOut">
-              <a:rPr lang="en-BE" smtClean="0"/>
-              <a:t>15/09/2025</a:t>
+            <a:fld id="{2F5A4C35-5EAD-1B48-96DD-BD639D1F1602}" type="datetime1">
+              <a:rPr lang="en-US" smtClean="0"/>
+              <a:t>2/10/26</a:t>
             </a:fld>
             <a:endParaRPr lang="en-BE"/>
           </a:p>
@@ -7304,6 +7273,7 @@
     <p:sldLayoutId id="2147483658" r:id="rId10"/>
     <p:sldLayoutId id="2147483659" r:id="rId11"/>
   </p:sldLayoutIdLst>
+  <p:hf hdr="0" ftr="0" dt="0"/>
   <p:txStyles>
     <p:titleStyle>
       <a:lvl1pPr algn="l" defTabSz="914400" rtl="0" eaLnBrk="1" latinLnBrk="0" hangingPunct="1">
@@ -7666,6 +7636,35 @@
           </a:p>
         </p:txBody>
       </p:sp>
+      <p:sp>
+        <p:nvSpPr>
+          <p:cNvPr id="5" name="Slide Number Placeholder 4">
+            <a:extLst>
+              <a:ext uri="{FF2B5EF4-FFF2-40B4-BE49-F238E27FC236}">
+                <a16:creationId xmlns:a16="http://schemas.microsoft.com/office/drawing/2014/main" id="{8A24714F-8F8E-BD20-1879-DC0562C7CE5D}"/>
+              </a:ext>
+            </a:extLst>
+          </p:cNvPr>
+          <p:cNvSpPr>
+            <a:spLocks noGrp="1"/>
+          </p:cNvSpPr>
+          <p:nvPr>
+            <p:ph type="sldNum" sz="quarter" idx="12"/>
+          </p:nvPr>
+        </p:nvSpPr>
+        <p:spPr/>
+        <p:txBody>
+          <a:bodyPr/>
+          <a:lstStyle/>
+          <a:p>
+            <a:fld id="{6F19EB20-827F-9F40-A633-3810B83D00D5}" type="slidenum">
+              <a:rPr lang="en-BE" smtClean="0"/>
+              <a:t>1</a:t>
+            </a:fld>
+            <a:endParaRPr lang="en-BE"/>
+          </a:p>
+        </p:txBody>
+      </p:sp>
     </p:spTree>
     <p:extLst>
       <p:ext uri="{BB962C8B-B14F-4D97-AF65-F5344CB8AC3E}">
@@ -7712,7 +7711,12 @@
             <p:ph type="title"/>
           </p:nvPr>
         </p:nvSpPr>
-        <p:spPr/>
+        <p:spPr>
+          <a:xfrm>
+            <a:off x="813872" y="55527"/>
+            <a:ext cx="10515600" cy="1325563"/>
+          </a:xfrm>
+        </p:spPr>
         <p:txBody>
           <a:bodyPr/>
           <a:lstStyle/>
@@ -7740,10 +7744,15 @@
             <p:ph idx="1"/>
           </p:nvPr>
         </p:nvSpPr>
-        <p:spPr/>
+        <p:spPr>
+          <a:xfrm>
+            <a:off x="838200" y="1470784"/>
+            <a:ext cx="10515600" cy="4351338"/>
+          </a:xfrm>
+        </p:spPr>
         <p:txBody>
           <a:bodyPr>
-            <a:normAutofit lnSpcReduction="10000"/>
+            <a:normAutofit fontScale="92500" lnSpcReduction="10000"/>
           </a:bodyPr>
           <a:lstStyle/>
           <a:p>
@@ -7801,15 +7810,22 @@
           <a:p>
             <a:pPr lvl="1"/>
             <a:r>
-              <a:rPr lang="en-BE" dirty="0"/>
-              <a:t>A platform to automate  builds and tests and deploy GitHub workflows</a:t>
+              <a:rPr lang="en-GB" dirty="0"/>
+              <a:t>Native CI for GitHub pull-request workflows</a:t>
             </a:r>
           </a:p>
           <a:p>
             <a:pPr lvl="1"/>
             <a:r>
-              <a:rPr lang="en-BE" dirty="0"/>
-              <a:t>Only works with GitHub</a:t>
+              <a:rPr lang="en-GB" dirty="0"/>
+              <a:t>Defined as code (YAML) and versioned with the project</a:t>
+            </a:r>
+          </a:p>
+          <a:p>
+            <a:pPr lvl="1"/>
+            <a:r>
+              <a:rPr lang="en-GB" dirty="0"/>
+              <a:t>Tight integration with PRs, reviews, and branch protection</a:t>
             </a:r>
           </a:p>
           <a:p>
@@ -7831,10 +7847,10 @@
         </p:nvGrpSpPr>
         <p:grpSpPr>
           <a:xfrm>
-            <a:off x="838200" y="4903304"/>
-            <a:ext cx="9697278" cy="1735324"/>
-            <a:chOff x="838200" y="4903304"/>
-            <a:chExt cx="9697278" cy="1735324"/>
+            <a:off x="838200" y="4312694"/>
+            <a:ext cx="9697278" cy="2007374"/>
+            <a:chOff x="838200" y="4312694"/>
+            <a:chExt cx="9697278" cy="2007374"/>
           </a:xfrm>
         </p:grpSpPr>
         <p:sp>
@@ -7851,8 +7867,8 @@
           </p:nvSpPr>
           <p:spPr>
             <a:xfrm>
-              <a:off x="838200" y="4903304"/>
-              <a:ext cx="9697278" cy="1273659"/>
+              <a:off x="838200" y="4312694"/>
+              <a:ext cx="9697278" cy="1599122"/>
             </a:xfrm>
             <a:prstGeom prst="roundRect">
               <a:avLst/>
@@ -7903,7 +7919,7 @@
           </p:nvSpPr>
           <p:spPr>
             <a:xfrm>
-              <a:off x="3273287" y="6176963"/>
+              <a:off x="3218696" y="5858403"/>
               <a:ext cx="1656522" cy="461665"/>
             </a:xfrm>
             <a:prstGeom prst="rect">
@@ -7929,6 +7945,35 @@
           </p:txBody>
         </p:sp>
       </p:grpSp>
+      <p:sp>
+        <p:nvSpPr>
+          <p:cNvPr id="8" name="Slide Number Placeholder 7">
+            <a:extLst>
+              <a:ext uri="{FF2B5EF4-FFF2-40B4-BE49-F238E27FC236}">
+                <a16:creationId xmlns:a16="http://schemas.microsoft.com/office/drawing/2014/main" id="{936A4D6A-5C98-66B1-B893-FCF552A9A90C}"/>
+              </a:ext>
+            </a:extLst>
+          </p:cNvPr>
+          <p:cNvSpPr>
+            <a:spLocks noGrp="1"/>
+          </p:cNvSpPr>
+          <p:nvPr>
+            <p:ph type="sldNum" sz="quarter" idx="12"/>
+          </p:nvPr>
+        </p:nvSpPr>
+        <p:spPr/>
+        <p:txBody>
+          <a:bodyPr/>
+          <a:lstStyle/>
+          <a:p>
+            <a:fld id="{6F19EB20-827F-9F40-A633-3810B83D00D5}" type="slidenum">
+              <a:rPr lang="en-BE" smtClean="0"/>
+              <a:t>10</a:t>
+            </a:fld>
+            <a:endParaRPr lang="en-BE"/>
+          </a:p>
+        </p:txBody>
+      </p:sp>
     </p:spTree>
     <p:extLst>
       <p:ext uri="{BB962C8B-B14F-4D97-AF65-F5344CB8AC3E}">
@@ -8093,7 +8138,7 @@
         </p:spPr>
         <p:txBody>
           <a:bodyPr>
-            <a:normAutofit/>
+            <a:normAutofit lnSpcReduction="10000"/>
           </a:bodyPr>
           <a:lstStyle/>
           <a:p>
@@ -8134,6 +8179,13 @@
                 <a:effectLst/>
               </a:rPr>
               <a:t>ven if you forgot to run the tests, the CI tool will test it.</a:t>
+            </a:r>
+          </a:p>
+          <a:p>
+            <a:pPr lvl="2"/>
+            <a:r>
+              <a:rPr lang="en-GB" sz="2400" dirty="0"/>
+              <a:t>Fast feedback before mistakes become expensive</a:t>
             </a:r>
             <a:endParaRPr lang="en-BE" sz="2400" dirty="0"/>
           </a:p>
@@ -8203,6 +8255,76 @@
               <a:buNone/>
             </a:pPr>
             <a:endParaRPr lang="en-BE" dirty="0"/>
+          </a:p>
+        </p:txBody>
+      </p:sp>
+      <p:sp>
+        <p:nvSpPr>
+          <p:cNvPr id="5" name="Slide Number Placeholder 4">
+            <a:extLst>
+              <a:ext uri="{FF2B5EF4-FFF2-40B4-BE49-F238E27FC236}">
+                <a16:creationId xmlns:a16="http://schemas.microsoft.com/office/drawing/2014/main" id="{5B7E1495-599F-2F12-6BF4-00B073FDA9B9}"/>
+              </a:ext>
+            </a:extLst>
+          </p:cNvPr>
+          <p:cNvSpPr>
+            <a:spLocks noGrp="1"/>
+          </p:cNvSpPr>
+          <p:nvPr>
+            <p:ph type="sldNum" sz="quarter" idx="12"/>
+          </p:nvPr>
+        </p:nvSpPr>
+        <p:spPr/>
+        <p:txBody>
+          <a:bodyPr/>
+          <a:lstStyle/>
+          <a:p>
+            <a:fld id="{6F19EB20-827F-9F40-A633-3810B83D00D5}" type="slidenum">
+              <a:rPr lang="en-BE" smtClean="0"/>
+              <a:t>11</a:t>
+            </a:fld>
+            <a:endParaRPr lang="en-BE"/>
+          </a:p>
+        </p:txBody>
+      </p:sp>
+      <p:sp>
+        <p:nvSpPr>
+          <p:cNvPr id="7" name="TextBox 6">
+            <a:extLst>
+              <a:ext uri="{FF2B5EF4-FFF2-40B4-BE49-F238E27FC236}">
+                <a16:creationId xmlns:a16="http://schemas.microsoft.com/office/drawing/2014/main" id="{ECE6EF63-ACCF-A452-2736-1E8E79F8B16D}"/>
+              </a:ext>
+            </a:extLst>
+          </p:cNvPr>
+          <p:cNvSpPr txBox="1"/>
+          <p:nvPr/>
+        </p:nvSpPr>
+        <p:spPr>
+          <a:xfrm>
+            <a:off x="1064525" y="5710019"/>
+            <a:ext cx="10289275" cy="461665"/>
+          </a:xfrm>
+          <a:prstGeom prst="rect">
+            <a:avLst/>
+          </a:prstGeom>
+          <a:noFill/>
+          <a:ln w="28575">
+            <a:solidFill>
+              <a:srgbClr val="C00000"/>
+            </a:solidFill>
+          </a:ln>
+        </p:spPr>
+        <p:txBody>
+          <a:bodyPr wrap="square">
+            <a:spAutoFit/>
+          </a:bodyPr>
+          <a:lstStyle/>
+          <a:p>
+            <a:r>
+              <a:rPr lang="en-GB" sz="2400" dirty="0"/>
+              <a:t>CI isn’t about saving time — it’s about failing fast while the change is still small.”</a:t>
+            </a:r>
+            <a:endParaRPr lang="en-US" sz="2400" dirty="0"/>
           </a:p>
         </p:txBody>
       </p:sp>
@@ -8286,15 +8408,8 @@
           <a:p>
             <a:pPr lvl="1"/>
             <a:r>
-              <a:rPr lang="en-BE" sz="3200" dirty="0"/>
-              <a:t>No need of integrating 100,000 lines of code into your code base</a:t>
-            </a:r>
-          </a:p>
-          <a:p>
-            <a:pPr lvl="1"/>
-            <a:r>
-              <a:rPr lang="en-BE" sz="3200" dirty="0"/>
-              <a:t>Only need to integrate 10-50 lines of code</a:t>
+              <a:rPr lang="en-GB" sz="3200" dirty="0"/>
+              <a:t>Integrating tens of lines instead of thousands</a:t>
             </a:r>
           </a:p>
           <a:p>
@@ -8309,7 +8424,14 @@
               </a:rPr>
               <a:t>Remember, less change means less risk.</a:t>
             </a:r>
-            <a:endParaRPr lang="en-BE" sz="2400" dirty="0"/>
+          </a:p>
+          <a:p>
+            <a:pPr lvl="1"/>
+            <a:r>
+              <a:rPr lang="en-GB" sz="2800" dirty="0"/>
+              <a:t>Smaller changes make AI-generated code easier to verify</a:t>
+            </a:r>
+            <a:endParaRPr lang="en-BE" sz="2800" dirty="0"/>
           </a:p>
         </p:txBody>
       </p:sp>
@@ -8345,6 +8467,35 @@
               <a:rPr lang="en-BE" sz="4000" dirty="0"/>
               <a:t>Benefits of CI - Reduced code integration risk</a:t>
             </a:r>
+          </a:p>
+        </p:txBody>
+      </p:sp>
+      <p:sp>
+        <p:nvSpPr>
+          <p:cNvPr id="4" name="Slide Number Placeholder 3">
+            <a:extLst>
+              <a:ext uri="{FF2B5EF4-FFF2-40B4-BE49-F238E27FC236}">
+                <a16:creationId xmlns:a16="http://schemas.microsoft.com/office/drawing/2014/main" id="{81DE8025-4561-40E0-6474-D2BBDC018472}"/>
+              </a:ext>
+            </a:extLst>
+          </p:cNvPr>
+          <p:cNvSpPr>
+            <a:spLocks noGrp="1"/>
+          </p:cNvSpPr>
+          <p:nvPr>
+            <p:ph type="sldNum" sz="quarter" idx="12"/>
+          </p:nvPr>
+        </p:nvSpPr>
+        <p:spPr/>
+        <p:txBody>
+          <a:bodyPr/>
+          <a:lstStyle/>
+          <a:p>
+            <a:fld id="{6F19EB20-827F-9F40-A633-3810B83D00D5}" type="slidenum">
+              <a:rPr lang="en-BE" smtClean="0"/>
+              <a:t>12</a:t>
+            </a:fld>
+            <a:endParaRPr lang="en-BE"/>
           </a:p>
         </p:txBody>
       </p:sp>
@@ -8402,7 +8553,7 @@
         </p:spPr>
         <p:txBody>
           <a:bodyPr>
-            <a:normAutofit fontScale="92500" lnSpcReduction="10000"/>
+            <a:normAutofit fontScale="92500" lnSpcReduction="20000"/>
           </a:bodyPr>
           <a:lstStyle/>
           <a:p>
@@ -8465,6 +8616,21 @@
                 </a:solidFill>
               </a:rPr>
               <a:t>Code is not doing what it’s supposed to do - “why are you changing this?”</a:t>
+            </a:r>
+          </a:p>
+          <a:p>
+            <a:pPr lvl="2"/>
+            <a:r>
+              <a:rPr lang="en-GB" sz="2400" dirty="0"/>
+              <a:t>PR reviews verify </a:t>
+            </a:r>
+            <a:r>
+              <a:rPr lang="en-GB" sz="2400" i="1" dirty="0"/>
+              <a:t>intent</a:t>
+            </a:r>
+            <a:r>
+              <a:rPr lang="en-GB" sz="2400" dirty="0"/>
+              <a:t>, not just correctness</a:t>
             </a:r>
             <a:endParaRPr lang="en-BE" sz="2400" dirty="0"/>
           </a:p>
@@ -8607,6 +8773,35 @@
           </a:extLst>
         </p:spPr>
       </p:pic>
+      <p:sp>
+        <p:nvSpPr>
+          <p:cNvPr id="5" name="Slide Number Placeholder 4">
+            <a:extLst>
+              <a:ext uri="{FF2B5EF4-FFF2-40B4-BE49-F238E27FC236}">
+                <a16:creationId xmlns:a16="http://schemas.microsoft.com/office/drawing/2014/main" id="{7E4C019A-156D-454E-1B52-17B627460EC0}"/>
+              </a:ext>
+            </a:extLst>
+          </p:cNvPr>
+          <p:cNvSpPr>
+            <a:spLocks noGrp="1"/>
+          </p:cNvSpPr>
+          <p:nvPr>
+            <p:ph type="sldNum" sz="quarter" idx="12"/>
+          </p:nvPr>
+        </p:nvSpPr>
+        <p:spPr/>
+        <p:txBody>
+          <a:bodyPr/>
+          <a:lstStyle/>
+          <a:p>
+            <a:fld id="{6F19EB20-827F-9F40-A633-3810B83D00D5}" type="slidenum">
+              <a:rPr lang="en-BE" smtClean="0"/>
+              <a:t>13</a:t>
+            </a:fld>
+            <a:endParaRPr lang="en-BE"/>
+          </a:p>
+        </p:txBody>
+      </p:sp>
     </p:spTree>
     <p:extLst>
       <p:ext uri="{BB962C8B-B14F-4D97-AF65-F5344CB8AC3E}">
@@ -8899,6 +9094,37 @@
                                           <p:spTgt spid="3">
                                             <p:txEl>
                                               <p:pRg st="8" end="8"/>
+                                            </p:txEl>
+                                          </p:spTgt>
+                                        </p:tgtEl>
+                                        <p:attrNameLst>
+                                          <p:attrName>style.visibility</p:attrName>
+                                        </p:attrNameLst>
+                                      </p:cBhvr>
+                                      <p:to>
+                                        <p:strVal val="visible"/>
+                                      </p:to>
+                                    </p:set>
+                                  </p:childTnLst>
+                                </p:cTn>
+                              </p:par>
+                              <p:par>
+                                <p:cTn id="25" presetID="1" presetClass="entr" presetSubtype="0" fill="hold" nodeType="withEffect">
+                                  <p:stCondLst>
+                                    <p:cond delay="0"/>
+                                  </p:stCondLst>
+                                  <p:childTnLst>
+                                    <p:set>
+                                      <p:cBhvr>
+                                        <p:cTn id="26" dur="1" fill="hold">
+                                          <p:stCondLst>
+                                            <p:cond delay="0"/>
+                                          </p:stCondLst>
+                                        </p:cTn>
+                                        <p:tgtEl>
+                                          <p:spTgt spid="3">
+                                            <p:txEl>
+                                              <p:pRg st="9" end="9"/>
                                             </p:txEl>
                                           </p:spTgt>
                                         </p:tgtEl>
@@ -9829,6 +10055,35 @@
           </a:p>
         </p:txBody>
       </p:sp>
+      <p:sp>
+        <p:nvSpPr>
+          <p:cNvPr id="27" name="Slide Number Placeholder 26">
+            <a:extLst>
+              <a:ext uri="{FF2B5EF4-FFF2-40B4-BE49-F238E27FC236}">
+                <a16:creationId xmlns:a16="http://schemas.microsoft.com/office/drawing/2014/main" id="{D41F6901-A9BE-4AF6-A308-38DE999EB34B}"/>
+              </a:ext>
+            </a:extLst>
+          </p:cNvPr>
+          <p:cNvSpPr>
+            <a:spLocks noGrp="1"/>
+          </p:cNvSpPr>
+          <p:nvPr>
+            <p:ph type="sldNum" sz="quarter" idx="12"/>
+          </p:nvPr>
+        </p:nvSpPr>
+        <p:spPr/>
+        <p:txBody>
+          <a:bodyPr/>
+          <a:lstStyle/>
+          <a:p>
+            <a:fld id="{6F19EB20-827F-9F40-A633-3810B83D00D5}" type="slidenum">
+              <a:rPr lang="en-BE" smtClean="0"/>
+              <a:t>14</a:t>
+            </a:fld>
+            <a:endParaRPr lang="en-BE"/>
+          </a:p>
+        </p:txBody>
+      </p:sp>
     </p:spTree>
     <p:extLst>
       <p:ext uri="{BB962C8B-B14F-4D97-AF65-F5344CB8AC3E}">
@@ -10040,6 +10295,322 @@
           <p:cNvPr id="2" name="Title 1">
             <a:extLst>
               <a:ext uri="{FF2B5EF4-FFF2-40B4-BE49-F238E27FC236}">
+                <a16:creationId xmlns:a16="http://schemas.microsoft.com/office/drawing/2014/main" id="{9695341C-06A5-D2AF-EA6C-5DE5CC3493CF}"/>
+              </a:ext>
+            </a:extLst>
+          </p:cNvPr>
+          <p:cNvSpPr>
+            <a:spLocks noGrp="1"/>
+          </p:cNvSpPr>
+          <p:nvPr>
+            <p:ph type="title"/>
+          </p:nvPr>
+        </p:nvSpPr>
+        <p:spPr/>
+        <p:txBody>
+          <a:bodyPr>
+            <a:normAutofit/>
+          </a:bodyPr>
+          <a:lstStyle/>
+          <a:p>
+            <a:r>
+              <a:rPr lang="en-GB" sz="3200" b="1" dirty="0"/>
+              <a:t>Continuous Integration is not about speed — it’s about controlling risk.</a:t>
+            </a:r>
+            <a:endParaRPr lang="en-US" sz="3200" dirty="0"/>
+          </a:p>
+        </p:txBody>
+      </p:sp>
+      <p:sp>
+        <p:nvSpPr>
+          <p:cNvPr id="3" name="Content Placeholder 2">
+            <a:extLst>
+              <a:ext uri="{FF2B5EF4-FFF2-40B4-BE49-F238E27FC236}">
+                <a16:creationId xmlns:a16="http://schemas.microsoft.com/office/drawing/2014/main" id="{923AB0F9-EDDE-A285-1439-B81D3EF04571}"/>
+              </a:ext>
+            </a:extLst>
+          </p:cNvPr>
+          <p:cNvSpPr>
+            <a:spLocks noGrp="1"/>
+          </p:cNvSpPr>
+          <p:nvPr>
+            <p:ph idx="1"/>
+          </p:nvPr>
+        </p:nvSpPr>
+        <p:spPr/>
+        <p:txBody>
+          <a:bodyPr/>
+          <a:lstStyle/>
+          <a:p>
+            <a:endParaRPr lang="en-GB" dirty="0"/>
+          </a:p>
+          <a:p>
+            <a:r>
+              <a:rPr lang="en-GB" sz="3200" dirty="0"/>
+              <a:t>Each CI practice exists to reduce a specific failure mode:</a:t>
+            </a:r>
+          </a:p>
+          <a:p>
+            <a:pPr lvl="1"/>
+            <a:r>
+              <a:rPr lang="en-GB" sz="2800" b="1" dirty="0"/>
+              <a:t>Short-lived branches</a:t>
+            </a:r>
+            <a:r>
+              <a:rPr lang="en-GB" sz="2800" dirty="0"/>
+              <a:t> reduce integration drift</a:t>
+            </a:r>
+          </a:p>
+          <a:p>
+            <a:pPr lvl="1"/>
+            <a:r>
+              <a:rPr lang="en-GB" sz="2800" b="1" dirty="0"/>
+              <a:t>Frequent pull requests</a:t>
+            </a:r>
+            <a:r>
+              <a:rPr lang="en-GB" sz="2800" dirty="0"/>
+              <a:t> reduce review and merge complexity</a:t>
+            </a:r>
+          </a:p>
+          <a:p>
+            <a:pPr lvl="1"/>
+            <a:r>
+              <a:rPr lang="en-GB" sz="2800" b="1" dirty="0"/>
+              <a:t>Automated CI</a:t>
+            </a:r>
+            <a:r>
+              <a:rPr lang="en-GB" sz="2800" dirty="0"/>
+              <a:t> reduces human error and missed checks</a:t>
+            </a:r>
+          </a:p>
+          <a:p>
+            <a:r>
+              <a:rPr lang="en-GB" sz="3200" dirty="0"/>
+              <a:t>Together, these practices make collaboration safe;</a:t>
+            </a:r>
+            <a:br>
+              <a:rPr lang="en-GB" sz="3200" dirty="0"/>
+            </a:br>
+            <a:r>
+              <a:rPr lang="en-GB" sz="3200" b="1" dirty="0"/>
+              <a:t>even when changes are frequent, large, or AI-generated.</a:t>
+            </a:r>
+            <a:endParaRPr lang="en-GB" sz="3200" dirty="0"/>
+          </a:p>
+          <a:p>
+            <a:pPr marL="0" indent="0">
+              <a:buNone/>
+            </a:pPr>
+            <a:endParaRPr lang="en-US" dirty="0"/>
+          </a:p>
+        </p:txBody>
+      </p:sp>
+      <p:sp>
+        <p:nvSpPr>
+          <p:cNvPr id="4" name="Slide Number Placeholder 3">
+            <a:extLst>
+              <a:ext uri="{FF2B5EF4-FFF2-40B4-BE49-F238E27FC236}">
+                <a16:creationId xmlns:a16="http://schemas.microsoft.com/office/drawing/2014/main" id="{4D6EDFC8-3383-CFC1-54FD-8084DFCDB63B}"/>
+              </a:ext>
+            </a:extLst>
+          </p:cNvPr>
+          <p:cNvSpPr>
+            <a:spLocks noGrp="1"/>
+          </p:cNvSpPr>
+          <p:nvPr>
+            <p:ph type="sldNum" sz="quarter" idx="12"/>
+          </p:nvPr>
+        </p:nvSpPr>
+        <p:spPr/>
+        <p:txBody>
+          <a:bodyPr/>
+          <a:lstStyle/>
+          <a:p>
+            <a:fld id="{6F19EB20-827F-9F40-A633-3810B83D00D5}" type="slidenum">
+              <a:rPr lang="en-BE" smtClean="0"/>
+              <a:t>15</a:t>
+            </a:fld>
+            <a:endParaRPr lang="en-BE"/>
+          </a:p>
+        </p:txBody>
+      </p:sp>
+    </p:spTree>
+    <p:extLst>
+      <p:ext uri="{BB962C8B-B14F-4D97-AF65-F5344CB8AC3E}">
+        <p14:creationId xmlns:p14="http://schemas.microsoft.com/office/powerpoint/2010/main" val="67047860"/>
+      </p:ext>
+    </p:extLst>
+  </p:cSld>
+  <p:clrMapOvr>
+    <a:masterClrMapping/>
+  </p:clrMapOvr>
+</p:sld>
+</file>
+
+<file path=ppt/slides/slide16.xml><?xml version="1.0" encoding="utf-8"?>
+<p:sld xmlns:a="http://schemas.openxmlformats.org/drawingml/2006/main" xmlns:r="http://schemas.openxmlformats.org/officeDocument/2006/relationships" xmlns:p="http://schemas.openxmlformats.org/presentationml/2006/main">
+  <p:cSld>
+    <p:spTree>
+      <p:nvGrpSpPr>
+        <p:cNvPr id="1" name=""/>
+        <p:cNvGrpSpPr/>
+        <p:nvPr/>
+      </p:nvGrpSpPr>
+      <p:grpSpPr>
+        <a:xfrm>
+          <a:off x="0" y="0"/>
+          <a:ext cx="0" cy="0"/>
+          <a:chOff x="0" y="0"/>
+          <a:chExt cx="0" cy="0"/>
+        </a:xfrm>
+      </p:grpSpPr>
+      <p:sp>
+        <p:nvSpPr>
+          <p:cNvPr id="2" name="Title 1">
+            <a:extLst>
+              <a:ext uri="{FF2B5EF4-FFF2-40B4-BE49-F238E27FC236}">
+                <a16:creationId xmlns:a16="http://schemas.microsoft.com/office/drawing/2014/main" id="{4AEA7FC8-D0D3-73F3-1DA3-C349C18B7597}"/>
+              </a:ext>
+            </a:extLst>
+          </p:cNvPr>
+          <p:cNvSpPr>
+            <a:spLocks noGrp="1"/>
+          </p:cNvSpPr>
+          <p:nvPr>
+            <p:ph type="title"/>
+          </p:nvPr>
+        </p:nvSpPr>
+        <p:spPr/>
+        <p:txBody>
+          <a:bodyPr/>
+          <a:lstStyle/>
+          <a:p>
+            <a:r>
+              <a:rPr lang="en-GB" dirty="0"/>
+              <a:t>How CI becomes real on GitHub</a:t>
+            </a:r>
+            <a:endParaRPr lang="en-US" dirty="0"/>
+          </a:p>
+        </p:txBody>
+      </p:sp>
+      <p:sp>
+        <p:nvSpPr>
+          <p:cNvPr id="3" name="Content Placeholder 2">
+            <a:extLst>
+              <a:ext uri="{FF2B5EF4-FFF2-40B4-BE49-F238E27FC236}">
+                <a16:creationId xmlns:a16="http://schemas.microsoft.com/office/drawing/2014/main" id="{29125052-4D11-FBD8-3E5C-D855AA3F7169}"/>
+              </a:ext>
+            </a:extLst>
+          </p:cNvPr>
+          <p:cNvSpPr>
+            <a:spLocks noGrp="1"/>
+          </p:cNvSpPr>
+          <p:nvPr>
+            <p:ph idx="1"/>
+          </p:nvPr>
+        </p:nvSpPr>
+        <p:spPr/>
+        <p:txBody>
+          <a:bodyPr/>
+          <a:lstStyle/>
+          <a:p>
+            <a:r>
+              <a:rPr lang="en-GB" dirty="0"/>
+              <a:t>Short-lived branches → workflows run on </a:t>
+            </a:r>
+            <a:r>
+              <a:rPr lang="en-GB" dirty="0" err="1"/>
+              <a:t>pull_request</a:t>
+            </a:r>
+            <a:endParaRPr lang="en-GB" dirty="0"/>
+          </a:p>
+          <a:p>
+            <a:r>
+              <a:rPr lang="en-GB" dirty="0"/>
+              <a:t>Frequent PRs → CI status checks on every PR</a:t>
+            </a:r>
+          </a:p>
+          <a:p>
+            <a:r>
+              <a:rPr lang="en-GB" dirty="0"/>
+              <a:t>Automated CI → required workflows before merge</a:t>
+            </a:r>
+          </a:p>
+          <a:p>
+            <a:r>
+              <a:rPr lang="en-GB" dirty="0"/>
+              <a:t>Risk reduction → failing CI blocks integration</a:t>
+            </a:r>
+          </a:p>
+          <a:p>
+            <a:endParaRPr lang="en-US" dirty="0"/>
+          </a:p>
+        </p:txBody>
+      </p:sp>
+      <p:sp>
+        <p:nvSpPr>
+          <p:cNvPr id="4" name="Slide Number Placeholder 3">
+            <a:extLst>
+              <a:ext uri="{FF2B5EF4-FFF2-40B4-BE49-F238E27FC236}">
+                <a16:creationId xmlns:a16="http://schemas.microsoft.com/office/drawing/2014/main" id="{AFF40C50-506F-04E1-A543-37B717D3A645}"/>
+              </a:ext>
+            </a:extLst>
+          </p:cNvPr>
+          <p:cNvSpPr>
+            <a:spLocks noGrp="1"/>
+          </p:cNvSpPr>
+          <p:nvPr>
+            <p:ph type="sldNum" sz="quarter" idx="12"/>
+          </p:nvPr>
+        </p:nvSpPr>
+        <p:spPr/>
+        <p:txBody>
+          <a:bodyPr/>
+          <a:lstStyle/>
+          <a:p>
+            <a:fld id="{6F19EB20-827F-9F40-A633-3810B83D00D5}" type="slidenum">
+              <a:rPr lang="en-BE" smtClean="0"/>
+              <a:t>16</a:t>
+            </a:fld>
+            <a:endParaRPr lang="en-BE"/>
+          </a:p>
+        </p:txBody>
+      </p:sp>
+    </p:spTree>
+    <p:extLst>
+      <p:ext uri="{BB962C8B-B14F-4D97-AF65-F5344CB8AC3E}">
+        <p14:creationId xmlns:p14="http://schemas.microsoft.com/office/powerpoint/2010/main" val="3686013777"/>
+      </p:ext>
+    </p:extLst>
+  </p:cSld>
+  <p:clrMapOvr>
+    <a:masterClrMapping/>
+  </p:clrMapOvr>
+</p:sld>
+</file>
+
+<file path=ppt/slides/slide17.xml><?xml version="1.0" encoding="utf-8"?>
+<p:sld xmlns:a="http://schemas.openxmlformats.org/drawingml/2006/main" xmlns:r="http://schemas.openxmlformats.org/officeDocument/2006/relationships" xmlns:p="http://schemas.openxmlformats.org/presentationml/2006/main">
+  <p:cSld>
+    <p:spTree>
+      <p:nvGrpSpPr>
+        <p:cNvPr id="1" name=""/>
+        <p:cNvGrpSpPr/>
+        <p:nvPr/>
+      </p:nvGrpSpPr>
+      <p:grpSpPr>
+        <a:xfrm>
+          <a:off x="0" y="0"/>
+          <a:ext cx="0" cy="0"/>
+          <a:chOff x="0" y="0"/>
+          <a:chExt cx="0" cy="0"/>
+        </a:xfrm>
+      </p:grpSpPr>
+      <p:sp>
+        <p:nvSpPr>
+          <p:cNvPr id="2" name="Title 1">
+            <a:extLst>
+              <a:ext uri="{FF2B5EF4-FFF2-40B4-BE49-F238E27FC236}">
                 <a16:creationId xmlns:a16="http://schemas.microsoft.com/office/drawing/2014/main" id="{D4D79595-D3B3-DAE0-55E1-1E67001D8684}"/>
               </a:ext>
             </a:extLst>
@@ -10085,14 +10656,14 @@
           <a:lstStyle/>
           <a:p>
             <a:r>
-              <a:rPr lang="en-BE" dirty="0"/>
-              <a:t>GitHub Actoins is a CI/CD tool available on every repository</a:t>
-            </a:r>
-          </a:p>
-          <a:p>
-            <a:r>
-              <a:rPr lang="en-BE" dirty="0"/>
-              <a:t>Integrated into GitHub as a service</a:t>
+              <a:rPr lang="en-GB" dirty="0"/>
+              <a:t>GitHub Actions is GitHub’s native CI system</a:t>
+            </a:r>
+          </a:p>
+          <a:p>
+            <a:r>
+              <a:rPr lang="en-GB" dirty="0"/>
+              <a:t>It enforces CI rules directly on pull requests and branches</a:t>
             </a:r>
           </a:p>
           <a:p>
@@ -10156,6 +10727,76 @@
           </a:extLst>
         </p:spPr>
       </p:pic>
+      <p:sp>
+        <p:nvSpPr>
+          <p:cNvPr id="5" name="Slide Number Placeholder 4">
+            <a:extLst>
+              <a:ext uri="{FF2B5EF4-FFF2-40B4-BE49-F238E27FC236}">
+                <a16:creationId xmlns:a16="http://schemas.microsoft.com/office/drawing/2014/main" id="{5714DA4A-CE6F-BFC4-ED67-28D9AB641A99}"/>
+              </a:ext>
+            </a:extLst>
+          </p:cNvPr>
+          <p:cNvSpPr>
+            <a:spLocks noGrp="1"/>
+          </p:cNvSpPr>
+          <p:nvPr>
+            <p:ph type="sldNum" sz="quarter" idx="12"/>
+          </p:nvPr>
+        </p:nvSpPr>
+        <p:spPr/>
+        <p:txBody>
+          <a:bodyPr/>
+          <a:lstStyle/>
+          <a:p>
+            <a:fld id="{6F19EB20-827F-9F40-A633-3810B83D00D5}" type="slidenum">
+              <a:rPr lang="en-BE" smtClean="0"/>
+              <a:t>17</a:t>
+            </a:fld>
+            <a:endParaRPr lang="en-BE"/>
+          </a:p>
+        </p:txBody>
+      </p:sp>
+      <p:sp>
+        <p:nvSpPr>
+          <p:cNvPr id="9" name="TextBox 8">
+            <a:extLst>
+              <a:ext uri="{FF2B5EF4-FFF2-40B4-BE49-F238E27FC236}">
+                <a16:creationId xmlns:a16="http://schemas.microsoft.com/office/drawing/2014/main" id="{805BE104-1F7C-F0B8-A39C-9800DFD21FEB}"/>
+              </a:ext>
+            </a:extLst>
+          </p:cNvPr>
+          <p:cNvSpPr txBox="1"/>
+          <p:nvPr/>
+        </p:nvSpPr>
+        <p:spPr>
+          <a:xfrm>
+            <a:off x="982639" y="5174330"/>
+            <a:ext cx="9858913" cy="461665"/>
+          </a:xfrm>
+          <a:prstGeom prst="rect">
+            <a:avLst/>
+          </a:prstGeom>
+          <a:noFill/>
+          <a:ln w="28575">
+            <a:solidFill>
+              <a:srgbClr val="C00000"/>
+            </a:solidFill>
+          </a:ln>
+        </p:spPr>
+        <p:txBody>
+          <a:bodyPr wrap="square">
+            <a:spAutoFit/>
+          </a:bodyPr>
+          <a:lstStyle/>
+          <a:p>
+            <a:r>
+              <a:rPr lang="en-GB" sz="2400" dirty="0"/>
+              <a:t>GitHub Actions isn’t just automation — it’s how GitHub enforces CI discipline.</a:t>
+            </a:r>
+            <a:endParaRPr lang="en-US" sz="2400" dirty="0"/>
+          </a:p>
+        </p:txBody>
+      </p:sp>
     </p:spTree>
     <p:extLst>
       <p:ext uri="{BB962C8B-B14F-4D97-AF65-F5344CB8AC3E}">
@@ -10166,10 +10807,88 @@
   <p:clrMapOvr>
     <a:masterClrMapping/>
   </p:clrMapOvr>
+  <p:timing>
+    <p:tnLst>
+      <p:par>
+        <p:cTn id="1" dur="indefinite" restart="never" nodeType="tmRoot">
+          <p:childTnLst>
+            <p:seq concurrent="1" nextAc="seek">
+              <p:cTn id="2" dur="indefinite" nodeType="mainSeq">
+                <p:childTnLst>
+                  <p:par>
+                    <p:cTn id="3" fill="hold">
+                      <p:stCondLst>
+                        <p:cond delay="indefinite"/>
+                      </p:stCondLst>
+                      <p:childTnLst>
+                        <p:par>
+                          <p:cTn id="4" fill="hold">
+                            <p:stCondLst>
+                              <p:cond delay="0"/>
+                            </p:stCondLst>
+                            <p:childTnLst>
+                              <p:par>
+                                <p:cTn id="5" presetID="1" presetClass="entr" presetSubtype="0" fill="hold" grpId="0" nodeType="clickEffect">
+                                  <p:stCondLst>
+                                    <p:cond delay="0"/>
+                                  </p:stCondLst>
+                                  <p:childTnLst>
+                                    <p:set>
+                                      <p:cBhvr>
+                                        <p:cTn id="6" dur="1" fill="hold">
+                                          <p:stCondLst>
+                                            <p:cond delay="0"/>
+                                          </p:stCondLst>
+                                        </p:cTn>
+                                        <p:tgtEl>
+                                          <p:spTgt spid="9"/>
+                                        </p:tgtEl>
+                                        <p:attrNameLst>
+                                          <p:attrName>style.visibility</p:attrName>
+                                        </p:attrNameLst>
+                                      </p:cBhvr>
+                                      <p:to>
+                                        <p:strVal val="visible"/>
+                                      </p:to>
+                                    </p:set>
+                                  </p:childTnLst>
+                                </p:cTn>
+                              </p:par>
+                            </p:childTnLst>
+                          </p:cTn>
+                        </p:par>
+                      </p:childTnLst>
+                    </p:cTn>
+                  </p:par>
+                </p:childTnLst>
+              </p:cTn>
+              <p:prevCondLst>
+                <p:cond evt="onPrev" delay="0">
+                  <p:tgtEl>
+                    <p:sldTgt/>
+                  </p:tgtEl>
+                </p:cond>
+              </p:prevCondLst>
+              <p:nextCondLst>
+                <p:cond evt="onNext" delay="0">
+                  <p:tgtEl>
+                    <p:sldTgt/>
+                  </p:tgtEl>
+                </p:cond>
+              </p:nextCondLst>
+            </p:seq>
+          </p:childTnLst>
+        </p:cTn>
+      </p:par>
+    </p:tnLst>
+    <p:bldLst>
+      <p:bldP spid="9" grpId="0" animBg="1"/>
+    </p:bldLst>
+  </p:timing>
 </p:sld>
 </file>
 
-<file path=ppt/slides/slide16.xml><?xml version="1.0" encoding="utf-8"?>
+<file path=ppt/slides/slide18.xml><?xml version="1.0" encoding="utf-8"?>
 <p:sld xmlns:a="http://schemas.openxmlformats.org/drawingml/2006/main" xmlns:r="http://schemas.openxmlformats.org/officeDocument/2006/relationships" xmlns:p="http://schemas.openxmlformats.org/presentationml/2006/main">
   <p:cSld>
     <p:spTree>
@@ -10286,7 +11005,7 @@
         </p:blipFill>
         <p:spPr>
           <a:xfrm>
-            <a:off x="940905" y="3056333"/>
+            <a:off x="838200" y="2615008"/>
             <a:ext cx="4458804" cy="3436542"/>
           </a:xfrm>
           <a:prstGeom prst="rect">
@@ -10371,6 +11090,76 @@
           </a:extLst>
         </p:spPr>
       </p:pic>
+      <p:sp>
+        <p:nvSpPr>
+          <p:cNvPr id="8" name="Slide Number Placeholder 7">
+            <a:extLst>
+              <a:ext uri="{FF2B5EF4-FFF2-40B4-BE49-F238E27FC236}">
+                <a16:creationId xmlns:a16="http://schemas.microsoft.com/office/drawing/2014/main" id="{843CC4D6-27E4-E2AA-F491-86F05C7061C1}"/>
+              </a:ext>
+            </a:extLst>
+          </p:cNvPr>
+          <p:cNvSpPr>
+            <a:spLocks noGrp="1"/>
+          </p:cNvSpPr>
+          <p:nvPr>
+            <p:ph type="sldNum" sz="quarter" idx="12"/>
+          </p:nvPr>
+        </p:nvSpPr>
+        <p:spPr/>
+        <p:txBody>
+          <a:bodyPr/>
+          <a:lstStyle/>
+          <a:p>
+            <a:fld id="{6F19EB20-827F-9F40-A633-3810B83D00D5}" type="slidenum">
+              <a:rPr lang="en-BE" smtClean="0"/>
+              <a:t>18</a:t>
+            </a:fld>
+            <a:endParaRPr lang="en-BE"/>
+          </a:p>
+        </p:txBody>
+      </p:sp>
+      <p:sp>
+        <p:nvSpPr>
+          <p:cNvPr id="10" name="TextBox 9">
+            <a:extLst>
+              <a:ext uri="{FF2B5EF4-FFF2-40B4-BE49-F238E27FC236}">
+                <a16:creationId xmlns:a16="http://schemas.microsoft.com/office/drawing/2014/main" id="{ACA50A21-64BD-7FD0-5CCB-19C853A7C925}"/>
+              </a:ext>
+            </a:extLst>
+          </p:cNvPr>
+          <p:cNvSpPr txBox="1"/>
+          <p:nvPr/>
+        </p:nvSpPr>
+        <p:spPr>
+          <a:xfrm>
+            <a:off x="182156" y="6049961"/>
+            <a:ext cx="7013124" cy="707886"/>
+          </a:xfrm>
+          <a:prstGeom prst="rect">
+            <a:avLst/>
+          </a:prstGeom>
+          <a:noFill/>
+          <a:ln w="28575">
+            <a:solidFill>
+              <a:srgbClr val="C00000"/>
+            </a:solidFill>
+          </a:ln>
+        </p:spPr>
+        <p:txBody>
+          <a:bodyPr wrap="square">
+            <a:spAutoFit/>
+          </a:bodyPr>
+          <a:lstStyle/>
+          <a:p>
+            <a:r>
+              <a:rPr lang="en-GB" sz="2000" dirty="0"/>
+              <a:t>Actions help you standardize and enforce checks across all contributors (human or AI)</a:t>
+            </a:r>
+            <a:endParaRPr lang="en-US" sz="2000" dirty="0"/>
+          </a:p>
+        </p:txBody>
+      </p:sp>
     </p:spTree>
     <p:extLst>
       <p:ext uri="{BB962C8B-B14F-4D97-AF65-F5344CB8AC3E}">
@@ -10442,6 +11231,51 @@
                       </p:childTnLst>
                     </p:cTn>
                   </p:par>
+                  <p:par>
+                    <p:cTn id="8" fill="hold">
+                      <p:stCondLst>
+                        <p:cond delay="indefinite"/>
+                      </p:stCondLst>
+                      <p:childTnLst>
+                        <p:par>
+                          <p:cTn id="9" fill="hold">
+                            <p:stCondLst>
+                              <p:cond delay="0"/>
+                            </p:stCondLst>
+                            <p:childTnLst>
+                              <p:par>
+                                <p:cTn id="10" presetID="1" presetClass="entr" presetSubtype="0" fill="hold" grpId="0" nodeType="clickEffect">
+                                  <p:stCondLst>
+                                    <p:cond delay="0"/>
+                                  </p:stCondLst>
+                                  <p:childTnLst>
+                                    <p:set>
+                                      <p:cBhvr>
+                                        <p:cTn id="11" dur="1" fill="hold">
+                                          <p:stCondLst>
+                                            <p:cond delay="0"/>
+                                          </p:stCondLst>
+                                        </p:cTn>
+                                        <p:tgtEl>
+                                          <p:spTgt spid="10"/>
+                                        </p:tgtEl>
+                                        <p:attrNameLst>
+                                          <p:attrName>style.visibility</p:attrName>
+                                        </p:attrNameLst>
+                                      </p:cBhvr>
+                                      <p:to>
+                                        <p:strVal val="visible"/>
+                                      </p:to>
+                                    </p:set>
+                                  </p:childTnLst>
+                                </p:cTn>
+                              </p:par>
+                            </p:childTnLst>
+                          </p:cTn>
+                        </p:par>
+                      </p:childTnLst>
+                    </p:cTn>
+                  </p:par>
                 </p:childTnLst>
               </p:cTn>
               <p:prevCondLst>
@@ -10463,11 +11297,14 @@
         </p:cTn>
       </p:par>
     </p:tnLst>
+    <p:bldLst>
+      <p:bldP spid="10" grpId="0" animBg="1"/>
+    </p:bldLst>
   </p:timing>
 </p:sld>
 </file>
 
-<file path=ppt/slides/slide17.xml><?xml version="1.0" encoding="utf-8"?>
+<file path=ppt/slides/slide19.xml><?xml version="1.0" encoding="utf-8"?>
 <p:sld xmlns:a="http://schemas.openxmlformats.org/drawingml/2006/main" xmlns:r="http://schemas.openxmlformats.org/officeDocument/2006/relationships" xmlns:p="http://schemas.openxmlformats.org/presentationml/2006/main">
   <p:cSld>
     <p:spTree>
@@ -10540,25 +11377,43 @@
           </a:xfrm>
         </p:spPr>
         <p:txBody>
-          <a:bodyPr/>
+          <a:bodyPr>
+            <a:normAutofit/>
+          </a:bodyPr>
           <a:lstStyle/>
           <a:p>
             <a:r>
-              <a:rPr lang="en-BE" dirty="0"/>
+              <a:rPr lang="en-BE" sz="2400" dirty="0"/>
               <a:t>All you need is a workflows folder and a .yaml file</a:t>
             </a:r>
           </a:p>
           <a:p>
             <a:r>
-              <a:rPr lang="en-BE" dirty="0"/>
-              <a:t>No other configurations is needed</a:t>
-            </a:r>
-          </a:p>
-          <a:p>
-            <a:r>
-              <a:rPr lang="en-BE" dirty="0"/>
+              <a:rPr lang="en-GB" sz="2400" dirty="0"/>
+              <a:t>Minimal configuration is needed to get started</a:t>
+            </a:r>
+          </a:p>
+          <a:p>
+            <a:r>
+              <a:rPr lang="en-BE" sz="2400" dirty="0"/>
               <a:t>Starter code is also available</a:t>
             </a:r>
+          </a:p>
+          <a:p>
+            <a:r>
+              <a:rPr lang="en-GB" sz="2400" dirty="0"/>
+              <a:t>Advanced rules (secrets, protections) can </a:t>
+            </a:r>
+          </a:p>
+          <a:p>
+            <a:pPr marL="0" indent="0">
+              <a:buNone/>
+            </a:pPr>
+            <a:r>
+              <a:rPr lang="en-GB" sz="2400" dirty="0"/>
+              <a:t>be added incrementally</a:t>
+            </a:r>
+            <a:endParaRPr lang="en-BE" sz="2400" dirty="0"/>
           </a:p>
         </p:txBody>
       </p:sp>
@@ -10639,6 +11494,35 @@
           </a:extLst>
         </p:spPr>
       </p:pic>
+      <p:sp>
+        <p:nvSpPr>
+          <p:cNvPr id="7" name="Slide Number Placeholder 6">
+            <a:extLst>
+              <a:ext uri="{FF2B5EF4-FFF2-40B4-BE49-F238E27FC236}">
+                <a16:creationId xmlns:a16="http://schemas.microsoft.com/office/drawing/2014/main" id="{B4FDD1B0-B4B3-2CC3-5FE1-C84FFF8CB033}"/>
+              </a:ext>
+            </a:extLst>
+          </p:cNvPr>
+          <p:cNvSpPr>
+            <a:spLocks noGrp="1"/>
+          </p:cNvSpPr>
+          <p:nvPr>
+            <p:ph type="sldNum" sz="quarter" idx="12"/>
+          </p:nvPr>
+        </p:nvSpPr>
+        <p:spPr/>
+        <p:txBody>
+          <a:bodyPr/>
+          <a:lstStyle/>
+          <a:p>
+            <a:fld id="{6F19EB20-827F-9F40-A633-3810B83D00D5}" type="slidenum">
+              <a:rPr lang="en-BE" smtClean="0"/>
+              <a:t>19</a:t>
+            </a:fld>
+            <a:endParaRPr lang="en-BE"/>
+          </a:p>
+        </p:txBody>
+      </p:sp>
     </p:spTree>
     <p:extLst>
       <p:ext uri="{BB962C8B-B14F-4D97-AF65-F5344CB8AC3E}">
@@ -10735,7 +11619,136 @@
 </p:sld>
 </file>
 
-<file path=ppt/slides/slide18.xml><?xml version="1.0" encoding="utf-8"?>
+<file path=ppt/slides/slide2.xml><?xml version="1.0" encoding="utf-8"?>
+<p:sld xmlns:a="http://schemas.openxmlformats.org/drawingml/2006/main" xmlns:r="http://schemas.openxmlformats.org/officeDocument/2006/relationships" xmlns:p="http://schemas.openxmlformats.org/presentationml/2006/main">
+  <p:cSld>
+    <p:spTree>
+      <p:nvGrpSpPr>
+        <p:cNvPr id="1" name=""/>
+        <p:cNvGrpSpPr/>
+        <p:nvPr/>
+      </p:nvGrpSpPr>
+      <p:grpSpPr>
+        <a:xfrm>
+          <a:off x="0" y="0"/>
+          <a:ext cx="0" cy="0"/>
+          <a:chOff x="0" y="0"/>
+          <a:chExt cx="0" cy="0"/>
+        </a:xfrm>
+      </p:grpSpPr>
+      <p:sp>
+        <p:nvSpPr>
+          <p:cNvPr id="2" name="Title 1">
+            <a:extLst>
+              <a:ext uri="{FF2B5EF4-FFF2-40B4-BE49-F238E27FC236}">
+                <a16:creationId xmlns:a16="http://schemas.microsoft.com/office/drawing/2014/main" id="{41419E29-9907-84A1-3653-5BD5D70AF27B}"/>
+              </a:ext>
+            </a:extLst>
+          </p:cNvPr>
+          <p:cNvSpPr>
+            <a:spLocks noGrp="1"/>
+          </p:cNvSpPr>
+          <p:nvPr>
+            <p:ph type="title"/>
+          </p:nvPr>
+        </p:nvSpPr>
+        <p:spPr/>
+        <p:txBody>
+          <a:bodyPr/>
+          <a:lstStyle/>
+          <a:p>
+            <a:r>
+              <a:rPr lang="en-US" dirty="0"/>
+              <a:t>Announcements</a:t>
+            </a:r>
+          </a:p>
+        </p:txBody>
+      </p:sp>
+      <p:sp>
+        <p:nvSpPr>
+          <p:cNvPr id="3" name="Content Placeholder 2">
+            <a:extLst>
+              <a:ext uri="{FF2B5EF4-FFF2-40B4-BE49-F238E27FC236}">
+                <a16:creationId xmlns:a16="http://schemas.microsoft.com/office/drawing/2014/main" id="{A5E52FB4-57C1-472D-F3BC-6C429508AF74}"/>
+              </a:ext>
+            </a:extLst>
+          </p:cNvPr>
+          <p:cNvSpPr>
+            <a:spLocks noGrp="1"/>
+          </p:cNvSpPr>
+          <p:nvPr>
+            <p:ph idx="1"/>
+          </p:nvPr>
+        </p:nvSpPr>
+        <p:spPr/>
+        <p:txBody>
+          <a:bodyPr/>
+          <a:lstStyle/>
+          <a:p>
+            <a:r>
+              <a:rPr lang="en-US" dirty="0"/>
+              <a:t>Start working on the DP I ASAP – </a:t>
+            </a:r>
+            <a:r>
+              <a:rPr lang="en-US" b="1" dirty="0"/>
+              <a:t>Due date 02/20/2026</a:t>
+            </a:r>
+          </a:p>
+          <a:p>
+            <a:r>
+              <a:rPr lang="en-US" dirty="0"/>
+              <a:t>Testing and CI lab is </a:t>
+            </a:r>
+            <a:r>
+              <a:rPr lang="en-US" b="1" dirty="0"/>
+              <a:t>Due 02/16/2026</a:t>
+            </a:r>
+          </a:p>
+        </p:txBody>
+      </p:sp>
+      <p:sp>
+        <p:nvSpPr>
+          <p:cNvPr id="5" name="Slide Number Placeholder 4">
+            <a:extLst>
+              <a:ext uri="{FF2B5EF4-FFF2-40B4-BE49-F238E27FC236}">
+                <a16:creationId xmlns:a16="http://schemas.microsoft.com/office/drawing/2014/main" id="{E44CA612-BC61-4C55-FC62-56A8464CF1A3}"/>
+              </a:ext>
+            </a:extLst>
+          </p:cNvPr>
+          <p:cNvSpPr>
+            <a:spLocks noGrp="1"/>
+          </p:cNvSpPr>
+          <p:nvPr>
+            <p:ph type="sldNum" sz="quarter" idx="12"/>
+          </p:nvPr>
+        </p:nvSpPr>
+        <p:spPr/>
+        <p:txBody>
+          <a:bodyPr/>
+          <a:lstStyle/>
+          <a:p>
+            <a:fld id="{6F19EB20-827F-9F40-A633-3810B83D00D5}" type="slidenum">
+              <a:rPr lang="en-BE" smtClean="0"/>
+              <a:t>2</a:t>
+            </a:fld>
+            <a:endParaRPr lang="en-BE"/>
+          </a:p>
+        </p:txBody>
+      </p:sp>
+    </p:spTree>
+    <p:extLst>
+      <p:ext uri="{BB962C8B-B14F-4D97-AF65-F5344CB8AC3E}">
+        <p14:creationId xmlns:p14="http://schemas.microsoft.com/office/powerpoint/2010/main" val="3362318213"/>
+      </p:ext>
+    </p:extLst>
+  </p:cSld>
+  <p:clrMapOvr>
+    <a:masterClrMapping/>
+  </p:clrMapOvr>
+</p:sld>
+</file>
+
+<file path=ppt/slides/slide20.xml><?xml version="1.0" encoding="utf-8"?>
 <p:sld xmlns:a="http://schemas.openxmlformats.org/drawingml/2006/main" xmlns:r="http://schemas.openxmlformats.org/officeDocument/2006/relationships" xmlns:p="http://schemas.openxmlformats.org/presentationml/2006/main">
   <p:cSld>
     <p:spTree>
@@ -11868,6 +12881,84 @@
           </p:txBody>
         </p:sp>
       </p:grpSp>
+      <p:sp>
+        <p:nvSpPr>
+          <p:cNvPr id="5" name="Slide Number Placeholder 4">
+            <a:extLst>
+              <a:ext uri="{FF2B5EF4-FFF2-40B4-BE49-F238E27FC236}">
+                <a16:creationId xmlns:a16="http://schemas.microsoft.com/office/drawing/2014/main" id="{4938A562-37F6-99E9-7785-87BC9C917CFA}"/>
+              </a:ext>
+            </a:extLst>
+          </p:cNvPr>
+          <p:cNvSpPr>
+            <a:spLocks noGrp="1"/>
+          </p:cNvSpPr>
+          <p:nvPr>
+            <p:ph type="sldNum" sz="quarter" idx="12"/>
+          </p:nvPr>
+        </p:nvSpPr>
+        <p:spPr/>
+        <p:txBody>
+          <a:bodyPr/>
+          <a:lstStyle/>
+          <a:p>
+            <a:fld id="{6F19EB20-827F-9F40-A633-3810B83D00D5}" type="slidenum">
+              <a:rPr lang="en-BE" smtClean="0"/>
+              <a:t>20</a:t>
+            </a:fld>
+            <a:endParaRPr lang="en-BE"/>
+          </a:p>
+        </p:txBody>
+      </p:sp>
+      <p:sp>
+        <p:nvSpPr>
+          <p:cNvPr id="8" name="TextBox 7">
+            <a:extLst>
+              <a:ext uri="{FF2B5EF4-FFF2-40B4-BE49-F238E27FC236}">
+                <a16:creationId xmlns:a16="http://schemas.microsoft.com/office/drawing/2014/main" id="{20E83DA0-D4C3-45B3-80B7-3E7B4C8E64EF}"/>
+              </a:ext>
+            </a:extLst>
+          </p:cNvPr>
+          <p:cNvSpPr txBox="1"/>
+          <p:nvPr/>
+        </p:nvSpPr>
+        <p:spPr>
+          <a:xfrm>
+            <a:off x="557192" y="5723792"/>
+            <a:ext cx="10796608" cy="430887"/>
+          </a:xfrm>
+          <a:prstGeom prst="rect">
+            <a:avLst/>
+          </a:prstGeom>
+          <a:noFill/>
+          <a:ln w="28575">
+            <a:solidFill>
+              <a:srgbClr val="C00000"/>
+            </a:solidFill>
+          </a:ln>
+        </p:spPr>
+        <p:txBody>
+          <a:bodyPr wrap="square">
+            <a:spAutoFit/>
+          </a:bodyPr>
+          <a:lstStyle/>
+          <a:p>
+            <a:r>
+              <a:rPr lang="en-GB" sz="2200" dirty="0"/>
+              <a:t>When code is written by humans </a:t>
+            </a:r>
+            <a:r>
+              <a:rPr lang="en-GB" sz="2200" i="1" dirty="0"/>
+              <a:t>or AI</a:t>
+            </a:r>
+            <a:r>
+              <a:rPr lang="en-GB" sz="2200" dirty="0"/>
+              <a:t>, this workflow is what decides whether it’s allowed in.</a:t>
+            </a:r>
+            <a:endParaRPr lang="en-US" sz="2200" dirty="0"/>
+          </a:p>
+        </p:txBody>
+      </p:sp>
     </p:spTree>
     <p:extLst>
       <p:ext uri="{BB962C8B-B14F-4D97-AF65-F5344CB8AC3E}">
@@ -12238,6 +13329,51 @@
                       </p:childTnLst>
                     </p:cTn>
                   </p:par>
+                  <p:par>
+                    <p:cTn id="33" fill="hold">
+                      <p:stCondLst>
+                        <p:cond delay="indefinite"/>
+                      </p:stCondLst>
+                      <p:childTnLst>
+                        <p:par>
+                          <p:cTn id="34" fill="hold">
+                            <p:stCondLst>
+                              <p:cond delay="0"/>
+                            </p:stCondLst>
+                            <p:childTnLst>
+                              <p:par>
+                                <p:cTn id="35" presetID="1" presetClass="entr" presetSubtype="0" fill="hold" grpId="0" nodeType="clickEffect">
+                                  <p:stCondLst>
+                                    <p:cond delay="0"/>
+                                  </p:stCondLst>
+                                  <p:childTnLst>
+                                    <p:set>
+                                      <p:cBhvr>
+                                        <p:cTn id="36" dur="1" fill="hold">
+                                          <p:stCondLst>
+                                            <p:cond delay="0"/>
+                                          </p:stCondLst>
+                                        </p:cTn>
+                                        <p:tgtEl>
+                                          <p:spTgt spid="8"/>
+                                        </p:tgtEl>
+                                        <p:attrNameLst>
+                                          <p:attrName>style.visibility</p:attrName>
+                                        </p:attrNameLst>
+                                      </p:cBhvr>
+                                      <p:to>
+                                        <p:strVal val="visible"/>
+                                      </p:to>
+                                    </p:set>
+                                  </p:childTnLst>
+                                </p:cTn>
+                              </p:par>
+                            </p:childTnLst>
+                          </p:cTn>
+                        </p:par>
+                      </p:childTnLst>
+                    </p:cTn>
+                  </p:par>
                 </p:childTnLst>
               </p:cTn>
               <p:prevCondLst>
@@ -12261,12 +13397,13 @@
     </p:tnLst>
     <p:bldLst>
       <p:bldP spid="3" grpId="0" build="p"/>
+      <p:bldP spid="8" grpId="0" animBg="1"/>
     </p:bldLst>
   </p:timing>
 </p:sld>
 </file>
 
-<file path=ppt/slides/slide19.xml><?xml version="1.0" encoding="utf-8"?>
+<file path=ppt/slides/slide21.xml><?xml version="1.0" encoding="utf-8"?>
 <p:sld xmlns:a="http://schemas.openxmlformats.org/drawingml/2006/main" xmlns:r="http://schemas.openxmlformats.org/officeDocument/2006/relationships" xmlns:p="http://schemas.openxmlformats.org/presentationml/2006/main">
   <p:cSld>
     <p:spTree>
@@ -13228,6 +14365,35 @@
           </p:txBody>
         </p:sp>
       </p:grpSp>
+      <p:sp>
+        <p:nvSpPr>
+          <p:cNvPr id="23" name="Slide Number Placeholder 22">
+            <a:extLst>
+              <a:ext uri="{FF2B5EF4-FFF2-40B4-BE49-F238E27FC236}">
+                <a16:creationId xmlns:a16="http://schemas.microsoft.com/office/drawing/2014/main" id="{A57D9EC6-D75D-D318-D940-1A0802BF447E}"/>
+              </a:ext>
+            </a:extLst>
+          </p:cNvPr>
+          <p:cNvSpPr>
+            <a:spLocks noGrp="1"/>
+          </p:cNvSpPr>
+          <p:nvPr>
+            <p:ph type="sldNum" sz="quarter" idx="12"/>
+          </p:nvPr>
+        </p:nvSpPr>
+        <p:spPr/>
+        <p:txBody>
+          <a:bodyPr/>
+          <a:lstStyle/>
+          <a:p>
+            <a:fld id="{6F19EB20-827F-9F40-A633-3810B83D00D5}" type="slidenum">
+              <a:rPr lang="en-BE" smtClean="0"/>
+              <a:t>21</a:t>
+            </a:fld>
+            <a:endParaRPr lang="en-BE"/>
+          </a:p>
+        </p:txBody>
+      </p:sp>
     </p:spTree>
     <p:extLst>
       <p:ext uri="{BB962C8B-B14F-4D97-AF65-F5344CB8AC3E}">
@@ -13797,103 +14963,7 @@
 </p:sld>
 </file>
 
-<file path=ppt/slides/slide2.xml><?xml version="1.0" encoding="utf-8"?>
-<p:sld xmlns:a="http://schemas.openxmlformats.org/drawingml/2006/main" xmlns:r="http://schemas.openxmlformats.org/officeDocument/2006/relationships" xmlns:p="http://schemas.openxmlformats.org/presentationml/2006/main">
-  <p:cSld>
-    <p:spTree>
-      <p:nvGrpSpPr>
-        <p:cNvPr id="1" name=""/>
-        <p:cNvGrpSpPr/>
-        <p:nvPr/>
-      </p:nvGrpSpPr>
-      <p:grpSpPr>
-        <a:xfrm>
-          <a:off x="0" y="0"/>
-          <a:ext cx="0" cy="0"/>
-          <a:chOff x="0" y="0"/>
-          <a:chExt cx="0" cy="0"/>
-        </a:xfrm>
-      </p:grpSpPr>
-      <p:sp>
-        <p:nvSpPr>
-          <p:cNvPr id="2" name="Title 1">
-            <a:extLst>
-              <a:ext uri="{FF2B5EF4-FFF2-40B4-BE49-F238E27FC236}">
-                <a16:creationId xmlns:a16="http://schemas.microsoft.com/office/drawing/2014/main" id="{41419E29-9907-84A1-3653-5BD5D70AF27B}"/>
-              </a:ext>
-            </a:extLst>
-          </p:cNvPr>
-          <p:cNvSpPr>
-            <a:spLocks noGrp="1"/>
-          </p:cNvSpPr>
-          <p:nvPr>
-            <p:ph type="title"/>
-          </p:nvPr>
-        </p:nvSpPr>
-        <p:spPr/>
-        <p:txBody>
-          <a:bodyPr/>
-          <a:lstStyle/>
-          <a:p>
-            <a:r>
-              <a:rPr lang="en-US" dirty="0"/>
-              <a:t>Announcements</a:t>
-            </a:r>
-          </a:p>
-        </p:txBody>
-      </p:sp>
-      <p:sp>
-        <p:nvSpPr>
-          <p:cNvPr id="3" name="Content Placeholder 2">
-            <a:extLst>
-              <a:ext uri="{FF2B5EF4-FFF2-40B4-BE49-F238E27FC236}">
-                <a16:creationId xmlns:a16="http://schemas.microsoft.com/office/drawing/2014/main" id="{A5E52FB4-57C1-472D-F3BC-6C429508AF74}"/>
-              </a:ext>
-            </a:extLst>
-          </p:cNvPr>
-          <p:cNvSpPr>
-            <a:spLocks noGrp="1"/>
-          </p:cNvSpPr>
-          <p:nvPr>
-            <p:ph idx="1"/>
-          </p:nvPr>
-        </p:nvSpPr>
-        <p:spPr/>
-        <p:txBody>
-          <a:bodyPr/>
-          <a:lstStyle/>
-          <a:p>
-            <a:r>
-              <a:rPr lang="en-US" dirty="0"/>
-              <a:t>Lab 1 marks are posted – a few students are missing marks</a:t>
-            </a:r>
-          </a:p>
-          <a:p>
-            <a:r>
-              <a:rPr lang="en-US" dirty="0"/>
-              <a:t>Start working on the DP I ASAP – </a:t>
-            </a:r>
-            <a:r>
-              <a:rPr lang="en-US" b="1" dirty="0"/>
-              <a:t>Due date 09/21/2025</a:t>
-            </a:r>
-          </a:p>
-        </p:txBody>
-      </p:sp>
-    </p:spTree>
-    <p:extLst>
-      <p:ext uri="{BB962C8B-B14F-4D97-AF65-F5344CB8AC3E}">
-        <p14:creationId xmlns:p14="http://schemas.microsoft.com/office/powerpoint/2010/main" val="3362318213"/>
-      </p:ext>
-    </p:extLst>
-  </p:cSld>
-  <p:clrMapOvr>
-    <a:masterClrMapping/>
-  </p:clrMapOvr>
-</p:sld>
-</file>
-
-<file path=ppt/slides/slide20.xml><?xml version="1.0" encoding="utf-8"?>
+<file path=ppt/slides/slide22.xml><?xml version="1.0" encoding="utf-8"?>
 <p:sld xmlns:a="http://schemas.openxmlformats.org/drawingml/2006/main" xmlns:r="http://schemas.openxmlformats.org/officeDocument/2006/relationships" xmlns:p="http://schemas.openxmlformats.org/presentationml/2006/main">
   <p:cSld>
     <p:spTree>
@@ -15234,6 +16304,35 @@
           </p:txBody>
         </p:sp>
       </p:grpSp>
+      <p:sp>
+        <p:nvSpPr>
+          <p:cNvPr id="15" name="Slide Number Placeholder 14">
+            <a:extLst>
+              <a:ext uri="{FF2B5EF4-FFF2-40B4-BE49-F238E27FC236}">
+                <a16:creationId xmlns:a16="http://schemas.microsoft.com/office/drawing/2014/main" id="{B801570B-0853-5D23-9BEF-07E8153CD4E4}"/>
+              </a:ext>
+            </a:extLst>
+          </p:cNvPr>
+          <p:cNvSpPr>
+            <a:spLocks noGrp="1"/>
+          </p:cNvSpPr>
+          <p:nvPr>
+            <p:ph type="sldNum" sz="quarter" idx="12"/>
+          </p:nvPr>
+        </p:nvSpPr>
+        <p:spPr/>
+        <p:txBody>
+          <a:bodyPr/>
+          <a:lstStyle/>
+          <a:p>
+            <a:fld id="{6F19EB20-827F-9F40-A633-3810B83D00D5}" type="slidenum">
+              <a:rPr lang="en-BE" smtClean="0"/>
+              <a:t>22</a:t>
+            </a:fld>
+            <a:endParaRPr lang="en-BE"/>
+          </a:p>
+        </p:txBody>
+      </p:sp>
     </p:spTree>
     <p:extLst>
       <p:ext uri="{BB962C8B-B14F-4D97-AF65-F5344CB8AC3E}">
@@ -15832,7 +16931,7 @@
 </p:sld>
 </file>
 
-<file path=ppt/slides/slide21.xml><?xml version="1.0" encoding="utf-8"?>
+<file path=ppt/slides/slide23.xml><?xml version="1.0" encoding="utf-8"?>
 <p:sld xmlns:a="http://schemas.openxmlformats.org/drawingml/2006/main" xmlns:r="http://schemas.openxmlformats.org/officeDocument/2006/relationships" xmlns:p="http://schemas.openxmlformats.org/presentationml/2006/main">
   <p:cSld>
     <p:spTree>
@@ -16263,6 +17362,35 @@
               <a:rPr lang="en-BE" sz="2800" dirty="0"/>
               <a:t>The publish job will only run after the build job that it depends on has been completed successfully</a:t>
             </a:r>
+          </a:p>
+        </p:txBody>
+      </p:sp>
+      <p:sp>
+        <p:nvSpPr>
+          <p:cNvPr id="10" name="Slide Number Placeholder 9">
+            <a:extLst>
+              <a:ext uri="{FF2B5EF4-FFF2-40B4-BE49-F238E27FC236}">
+                <a16:creationId xmlns:a16="http://schemas.microsoft.com/office/drawing/2014/main" id="{F10DCE88-2FE9-31AB-D45A-3B64720D758A}"/>
+              </a:ext>
+            </a:extLst>
+          </p:cNvPr>
+          <p:cNvSpPr>
+            <a:spLocks noGrp="1"/>
+          </p:cNvSpPr>
+          <p:nvPr>
+            <p:ph type="sldNum" sz="quarter" idx="12"/>
+          </p:nvPr>
+        </p:nvSpPr>
+        <p:spPr/>
+        <p:txBody>
+          <a:bodyPr/>
+          <a:lstStyle/>
+          <a:p>
+            <a:fld id="{6F19EB20-827F-9F40-A633-3810B83D00D5}" type="slidenum">
+              <a:rPr lang="en-BE" smtClean="0"/>
+              <a:t>23</a:t>
+            </a:fld>
+            <a:endParaRPr lang="en-BE"/>
           </a:p>
         </p:txBody>
       </p:sp>
@@ -16789,7 +17917,7 @@
 </p:sld>
 </file>
 
-<file path=ppt/slides/slide22.xml><?xml version="1.0" encoding="utf-8"?>
+<file path=ppt/slides/slide24.xml><?xml version="1.0" encoding="utf-8"?>
 <p:sld xmlns:a="http://schemas.openxmlformats.org/drawingml/2006/main" xmlns:r="http://schemas.openxmlformats.org/officeDocument/2006/relationships" xmlns:p="http://schemas.openxmlformats.org/presentationml/2006/main">
   <p:cSld>
     <p:spTree>
@@ -16911,6 +18039,35 @@
           </a:p>
         </p:txBody>
       </p:sp>
+      <p:sp>
+        <p:nvSpPr>
+          <p:cNvPr id="5" name="Slide Number Placeholder 4">
+            <a:extLst>
+              <a:ext uri="{FF2B5EF4-FFF2-40B4-BE49-F238E27FC236}">
+                <a16:creationId xmlns:a16="http://schemas.microsoft.com/office/drawing/2014/main" id="{08075B4E-34EC-417C-5A3E-DB9BB0E6406A}"/>
+              </a:ext>
+            </a:extLst>
+          </p:cNvPr>
+          <p:cNvSpPr>
+            <a:spLocks noGrp="1"/>
+          </p:cNvSpPr>
+          <p:nvPr>
+            <p:ph type="sldNum" sz="quarter" idx="12"/>
+          </p:nvPr>
+        </p:nvSpPr>
+        <p:spPr/>
+        <p:txBody>
+          <a:bodyPr/>
+          <a:lstStyle/>
+          <a:p>
+            <a:fld id="{6F19EB20-827F-9F40-A633-3810B83D00D5}" type="slidenum">
+              <a:rPr lang="en-BE" smtClean="0"/>
+              <a:t>24</a:t>
+            </a:fld>
+            <a:endParaRPr lang="en-BE"/>
+          </a:p>
+        </p:txBody>
+      </p:sp>
     </p:spTree>
     <p:extLst>
       <p:ext uri="{BB962C8B-B14F-4D97-AF65-F5344CB8AC3E}">
@@ -16924,7 +18081,7 @@
 </p:sld>
 </file>
 
-<file path=ppt/slides/slide23.xml><?xml version="1.0" encoding="utf-8"?>
+<file path=ppt/slides/slide25.xml><?xml version="1.0" encoding="utf-8"?>
 <p:sld xmlns:a="http://schemas.openxmlformats.org/drawingml/2006/main" xmlns:r="http://schemas.openxmlformats.org/officeDocument/2006/relationships" xmlns:p="http://schemas.openxmlformats.org/presentationml/2006/main">
   <p:cSld>
     <p:spTree>
@@ -17253,6 +18410,35 @@
           </p:txBody>
         </p:sp>
       </p:grpSp>
+      <p:sp>
+        <p:nvSpPr>
+          <p:cNvPr id="5" name="Slide Number Placeholder 4">
+            <a:extLst>
+              <a:ext uri="{FF2B5EF4-FFF2-40B4-BE49-F238E27FC236}">
+                <a16:creationId xmlns:a16="http://schemas.microsoft.com/office/drawing/2014/main" id="{73EDE4AA-4CE3-FBF0-963E-BD2821CA863B}"/>
+              </a:ext>
+            </a:extLst>
+          </p:cNvPr>
+          <p:cNvSpPr>
+            <a:spLocks noGrp="1"/>
+          </p:cNvSpPr>
+          <p:nvPr>
+            <p:ph type="sldNum" sz="quarter" idx="12"/>
+          </p:nvPr>
+        </p:nvSpPr>
+        <p:spPr/>
+        <p:txBody>
+          <a:bodyPr/>
+          <a:lstStyle/>
+          <a:p>
+            <a:fld id="{6F19EB20-827F-9F40-A633-3810B83D00D5}" type="slidenum">
+              <a:rPr lang="en-BE" smtClean="0"/>
+              <a:t>25</a:t>
+            </a:fld>
+            <a:endParaRPr lang="en-BE"/>
+          </a:p>
+        </p:txBody>
+      </p:sp>
     </p:spTree>
     <p:extLst>
       <p:ext uri="{BB962C8B-B14F-4D97-AF65-F5344CB8AC3E}">
@@ -17386,7 +18572,7 @@
 </p:sld>
 </file>
 
-<file path=ppt/slides/slide24.xml><?xml version="1.0" encoding="utf-8"?>
+<file path=ppt/slides/slide26.xml><?xml version="1.0" encoding="utf-8"?>
 <p:sld xmlns:a="http://schemas.openxmlformats.org/drawingml/2006/main" xmlns:r="http://schemas.openxmlformats.org/officeDocument/2006/relationships" xmlns:p="http://schemas.openxmlformats.org/presentationml/2006/main">
   <p:cSld>
     <p:spTree>
@@ -17546,6 +18732,35 @@
           </a:p>
         </p:txBody>
       </p:sp>
+      <p:sp>
+        <p:nvSpPr>
+          <p:cNvPr id="5" name="Slide Number Placeholder 4">
+            <a:extLst>
+              <a:ext uri="{FF2B5EF4-FFF2-40B4-BE49-F238E27FC236}">
+                <a16:creationId xmlns:a16="http://schemas.microsoft.com/office/drawing/2014/main" id="{645179EF-67CB-126B-0369-95184E2191B1}"/>
+              </a:ext>
+            </a:extLst>
+          </p:cNvPr>
+          <p:cNvSpPr>
+            <a:spLocks noGrp="1"/>
+          </p:cNvSpPr>
+          <p:nvPr>
+            <p:ph type="sldNum" sz="quarter" idx="12"/>
+          </p:nvPr>
+        </p:nvSpPr>
+        <p:spPr/>
+        <p:txBody>
+          <a:bodyPr/>
+          <a:lstStyle/>
+          <a:p>
+            <a:fld id="{6F19EB20-827F-9F40-A633-3810B83D00D5}" type="slidenum">
+              <a:rPr lang="en-BE" smtClean="0"/>
+              <a:t>26</a:t>
+            </a:fld>
+            <a:endParaRPr lang="en-BE"/>
+          </a:p>
+        </p:txBody>
+      </p:sp>
     </p:spTree>
     <p:extLst>
       <p:ext uri="{BB962C8B-B14F-4D97-AF65-F5344CB8AC3E}">
@@ -17559,7 +18774,7 @@
 </p:sld>
 </file>
 
-<file path=ppt/slides/slide25.xml><?xml version="1.0" encoding="utf-8"?>
+<file path=ppt/slides/slide27.xml><?xml version="1.0" encoding="utf-8"?>
 <p:sld xmlns:a="http://schemas.openxmlformats.org/drawingml/2006/main" xmlns:r="http://schemas.openxmlformats.org/officeDocument/2006/relationships" xmlns:p="http://schemas.openxmlformats.org/presentationml/2006/main">
   <p:cSld>
     <p:spTree>
@@ -17852,6 +19067,35 @@
           </a:p>
         </p:txBody>
       </p:sp>
+      <p:sp>
+        <p:nvSpPr>
+          <p:cNvPr id="7" name="Slide Number Placeholder 6">
+            <a:extLst>
+              <a:ext uri="{FF2B5EF4-FFF2-40B4-BE49-F238E27FC236}">
+                <a16:creationId xmlns:a16="http://schemas.microsoft.com/office/drawing/2014/main" id="{53352895-CBB2-2D48-4ADB-1457D28727FE}"/>
+              </a:ext>
+            </a:extLst>
+          </p:cNvPr>
+          <p:cNvSpPr>
+            <a:spLocks noGrp="1"/>
+          </p:cNvSpPr>
+          <p:nvPr>
+            <p:ph type="sldNum" sz="quarter" idx="12"/>
+          </p:nvPr>
+        </p:nvSpPr>
+        <p:spPr/>
+        <p:txBody>
+          <a:bodyPr/>
+          <a:lstStyle/>
+          <a:p>
+            <a:fld id="{6F19EB20-827F-9F40-A633-3810B83D00D5}" type="slidenum">
+              <a:rPr lang="en-BE" smtClean="0"/>
+              <a:t>27</a:t>
+            </a:fld>
+            <a:endParaRPr lang="en-BE"/>
+          </a:p>
+        </p:txBody>
+      </p:sp>
     </p:spTree>
     <p:extLst>
       <p:ext uri="{BB962C8B-B14F-4D97-AF65-F5344CB8AC3E}">
@@ -17865,7 +19109,7 @@
 </p:sld>
 </file>
 
-<file path=ppt/slides/slide26.xml><?xml version="1.0" encoding="utf-8"?>
+<file path=ppt/slides/slide28.xml><?xml version="1.0" encoding="utf-8"?>
 <p:sld xmlns:a="http://schemas.openxmlformats.org/drawingml/2006/main" xmlns:r="http://schemas.openxmlformats.org/officeDocument/2006/relationships" xmlns:p="http://schemas.openxmlformats.org/presentationml/2006/main">
   <p:cSld>
     <p:spTree>
@@ -18228,6 +19472,35 @@
               <a:rPr lang="en-BE" sz="2000" dirty="0"/>
               <a:t>service:app</a:t>
             </a:r>
+          </a:p>
+        </p:txBody>
+      </p:sp>
+      <p:sp>
+        <p:nvSpPr>
+          <p:cNvPr id="7" name="Slide Number Placeholder 6">
+            <a:extLst>
+              <a:ext uri="{FF2B5EF4-FFF2-40B4-BE49-F238E27FC236}">
+                <a16:creationId xmlns:a16="http://schemas.microsoft.com/office/drawing/2014/main" id="{2D4E175C-4FA9-E8F8-0B11-64294420622C}"/>
+              </a:ext>
+            </a:extLst>
+          </p:cNvPr>
+          <p:cNvSpPr>
+            <a:spLocks noGrp="1"/>
+          </p:cNvSpPr>
+          <p:nvPr>
+            <p:ph type="sldNum" sz="quarter" idx="12"/>
+          </p:nvPr>
+        </p:nvSpPr>
+        <p:spPr/>
+        <p:txBody>
+          <a:bodyPr/>
+          <a:lstStyle/>
+          <a:p>
+            <a:fld id="{6F19EB20-827F-9F40-A633-3810B83D00D5}" type="slidenum">
+              <a:rPr lang="en-BE" smtClean="0"/>
+              <a:t>28</a:t>
+            </a:fld>
+            <a:endParaRPr lang="en-BE"/>
           </a:p>
         </p:txBody>
       </p:sp>
@@ -18736,7 +20009,7 @@
 </p:sld>
 </file>
 
-<file path=ppt/slides/slide27.xml><?xml version="1.0" encoding="utf-8"?>
+<file path=ppt/slides/slide29.xml><?xml version="1.0" encoding="utf-8"?>
 <p:sld xmlns:a="http://schemas.openxmlformats.org/drawingml/2006/main" xmlns:r="http://schemas.openxmlformats.org/officeDocument/2006/relationships" xmlns:p="http://schemas.openxmlformats.org/presentationml/2006/main">
   <p:cSld>
     <p:spTree>
@@ -19166,6 +20439,35 @@
           </p:txBody>
         </p:sp>
       </p:grpSp>
+      <p:sp>
+        <p:nvSpPr>
+          <p:cNvPr id="14" name="Slide Number Placeholder 13">
+            <a:extLst>
+              <a:ext uri="{FF2B5EF4-FFF2-40B4-BE49-F238E27FC236}">
+                <a16:creationId xmlns:a16="http://schemas.microsoft.com/office/drawing/2014/main" id="{947C1538-F31E-5B18-BEDF-E2737915204F}"/>
+              </a:ext>
+            </a:extLst>
+          </p:cNvPr>
+          <p:cNvSpPr>
+            <a:spLocks noGrp="1"/>
+          </p:cNvSpPr>
+          <p:nvPr>
+            <p:ph type="sldNum" sz="quarter" idx="12"/>
+          </p:nvPr>
+        </p:nvSpPr>
+        <p:spPr/>
+        <p:txBody>
+          <a:bodyPr/>
+          <a:lstStyle/>
+          <a:p>
+            <a:fld id="{6F19EB20-827F-9F40-A633-3810B83D00D5}" type="slidenum">
+              <a:rPr lang="en-BE" smtClean="0"/>
+              <a:t>29</a:t>
+            </a:fld>
+            <a:endParaRPr lang="en-BE"/>
+          </a:p>
+        </p:txBody>
+      </p:sp>
     </p:spTree>
     <p:extLst>
       <p:ext uri="{BB962C8B-B14F-4D97-AF65-F5344CB8AC3E}">
@@ -19512,7 +20814,485 @@
 </p:sld>
 </file>
 
-<file path=ppt/slides/slide28.xml><?xml version="1.0" encoding="utf-8"?>
+<file path=ppt/slides/slide3.xml><?xml version="1.0" encoding="utf-8"?>
+<p:sld xmlns:a="http://schemas.openxmlformats.org/drawingml/2006/main" xmlns:r="http://schemas.openxmlformats.org/officeDocument/2006/relationships" xmlns:p="http://schemas.openxmlformats.org/presentationml/2006/main">
+  <p:cSld>
+    <p:spTree>
+      <p:nvGrpSpPr>
+        <p:cNvPr id="1" name=""/>
+        <p:cNvGrpSpPr/>
+        <p:nvPr/>
+      </p:nvGrpSpPr>
+      <p:grpSpPr>
+        <a:xfrm>
+          <a:off x="0" y="0"/>
+          <a:ext cx="0" cy="0"/>
+          <a:chOff x="0" y="0"/>
+          <a:chExt cx="0" cy="0"/>
+        </a:xfrm>
+      </p:grpSpPr>
+      <p:sp>
+        <p:nvSpPr>
+          <p:cNvPr id="2" name="Title 1">
+            <a:extLst>
+              <a:ext uri="{FF2B5EF4-FFF2-40B4-BE49-F238E27FC236}">
+                <a16:creationId xmlns:a16="http://schemas.microsoft.com/office/drawing/2014/main" id="{912530C2-AFD4-AFB8-F42C-107106AB5BCE}"/>
+              </a:ext>
+            </a:extLst>
+          </p:cNvPr>
+          <p:cNvSpPr>
+            <a:spLocks noGrp="1"/>
+          </p:cNvSpPr>
+          <p:nvPr>
+            <p:ph type="title"/>
+          </p:nvPr>
+        </p:nvSpPr>
+        <p:spPr>
+          <a:xfrm>
+            <a:off x="838200" y="0"/>
+            <a:ext cx="10515600" cy="1325563"/>
+          </a:xfrm>
+        </p:spPr>
+        <p:txBody>
+          <a:bodyPr/>
+          <a:lstStyle/>
+          <a:p>
+            <a:r>
+              <a:rPr lang="en-BE" dirty="0"/>
+              <a:t>What is CI/CD</a:t>
+            </a:r>
+          </a:p>
+        </p:txBody>
+      </p:sp>
+      <p:pic>
+        <p:nvPicPr>
+          <p:cNvPr id="5" name="Content Placeholder 4" descr="A diagram of a software development process&#10;&#10;Description automatically generated">
+            <a:extLst>
+              <a:ext uri="{FF2B5EF4-FFF2-40B4-BE49-F238E27FC236}">
+                <a16:creationId xmlns:a16="http://schemas.microsoft.com/office/drawing/2014/main" id="{5D7CF354-E9EE-4552-EA75-95BC936ECEA6}"/>
+              </a:ext>
+            </a:extLst>
+          </p:cNvPr>
+          <p:cNvPicPr>
+            <a:picLocks noGrp="1" noChangeAspect="1"/>
+          </p:cNvPicPr>
+          <p:nvPr>
+            <p:ph idx="1"/>
+          </p:nvPr>
+        </p:nvPicPr>
+        <p:blipFill>
+          <a:blip r:embed="rId3"/>
+          <a:stretch>
+            <a:fillRect/>
+          </a:stretch>
+        </p:blipFill>
+        <p:spPr>
+          <a:xfrm>
+            <a:off x="288225" y="2583584"/>
+            <a:ext cx="3556811" cy="1979272"/>
+          </a:xfrm>
+        </p:spPr>
+      </p:pic>
+      <p:sp>
+        <p:nvSpPr>
+          <p:cNvPr id="7" name="TextBox 6">
+            <a:extLst>
+              <a:ext uri="{FF2B5EF4-FFF2-40B4-BE49-F238E27FC236}">
+                <a16:creationId xmlns:a16="http://schemas.microsoft.com/office/drawing/2014/main" id="{840D8AB5-E42B-625D-55CB-1A4C4E13FBFC}"/>
+              </a:ext>
+            </a:extLst>
+          </p:cNvPr>
+          <p:cNvSpPr txBox="1"/>
+          <p:nvPr/>
+        </p:nvSpPr>
+        <p:spPr>
+          <a:xfrm>
+            <a:off x="3845037" y="1813970"/>
+            <a:ext cx="7763030" cy="4154984"/>
+          </a:xfrm>
+          <a:prstGeom prst="rect">
+            <a:avLst/>
+          </a:prstGeom>
+          <a:noFill/>
+        </p:spPr>
+        <p:txBody>
+          <a:bodyPr wrap="square">
+            <a:spAutoFit/>
+          </a:bodyPr>
+          <a:lstStyle/>
+          <a:p>
+            <a:pPr marL="285750" indent="-285750">
+              <a:buFont typeface="Arial" panose="020B0604020202020204" pitchFamily="34" charset="0"/>
+              <a:buChar char="•"/>
+            </a:pPr>
+            <a:r>
+              <a:rPr lang="en-GB" sz="2400" dirty="0"/>
+              <a:t>CI/CD are two related but distinct stages in a modern development workflow.</a:t>
+            </a:r>
+          </a:p>
+          <a:p>
+            <a:pPr marL="285750" indent="-285750">
+              <a:buFont typeface="Arial" panose="020B0604020202020204" pitchFamily="34" charset="0"/>
+              <a:buChar char="•"/>
+            </a:pPr>
+            <a:r>
+              <a:rPr lang="en-GB" sz="2400" b="1" dirty="0"/>
+              <a:t>Continuous Integration (CI)</a:t>
+            </a:r>
+            <a:r>
+              <a:rPr lang="en-GB" sz="2400" dirty="0"/>
+              <a:t> provides </a:t>
+            </a:r>
+            <a:r>
+              <a:rPr lang="en-GB" sz="2400" i="1" dirty="0"/>
+              <a:t>automated feedback</a:t>
+            </a:r>
+            <a:r>
+              <a:rPr lang="en-GB" sz="2400" dirty="0"/>
+              <a:t> on code changes </a:t>
+            </a:r>
+            <a:r>
+              <a:rPr lang="en-GB" sz="2400" b="1" dirty="0"/>
+              <a:t>before they are merged</a:t>
+            </a:r>
+            <a:r>
+              <a:rPr lang="en-GB" sz="2400" dirty="0"/>
+              <a:t>, typically via pull requests.</a:t>
+            </a:r>
+          </a:p>
+          <a:p>
+            <a:pPr marL="285750" indent="-285750">
+              <a:buFont typeface="Arial" panose="020B0604020202020204" pitchFamily="34" charset="0"/>
+              <a:buChar char="•"/>
+            </a:pPr>
+            <a:r>
+              <a:rPr lang="en-GB" sz="2400" dirty="0"/>
+              <a:t>CI answers the question: </a:t>
+            </a:r>
+            <a:r>
+              <a:rPr lang="en-GB" sz="2400" i="1" dirty="0"/>
+              <a:t>“Is this change safe to integrate?”</a:t>
+            </a:r>
+            <a:endParaRPr lang="en-GB" sz="2400" dirty="0"/>
+          </a:p>
+          <a:p>
+            <a:pPr marL="285750" indent="-285750">
+              <a:buFont typeface="Arial" panose="020B0604020202020204" pitchFamily="34" charset="0"/>
+              <a:buChar char="•"/>
+            </a:pPr>
+            <a:r>
+              <a:rPr lang="en-GB" sz="2400" b="1" dirty="0"/>
+              <a:t>Continuous Delivery / Deployment (CD)</a:t>
+            </a:r>
+            <a:r>
+              <a:rPr lang="en-GB" sz="2400" dirty="0"/>
+              <a:t> takes validated code and </a:t>
+            </a:r>
+            <a:r>
+              <a:rPr lang="en-GB" sz="2400" b="1" dirty="0"/>
+              <a:t>releases it to an environment</a:t>
+            </a:r>
+            <a:r>
+              <a:rPr lang="en-GB" sz="2400" dirty="0"/>
+              <a:t>, either automatically or with manual approval.</a:t>
+            </a:r>
+          </a:p>
+          <a:p>
+            <a:pPr marL="285750" indent="-285750">
+              <a:buFont typeface="Arial" panose="020B0604020202020204" pitchFamily="34" charset="0"/>
+              <a:buChar char="•"/>
+            </a:pPr>
+            <a:r>
+              <a:rPr lang="en-GB" sz="2400" dirty="0"/>
+              <a:t>CI/CD help teams maintain velocity and trust — </a:t>
+            </a:r>
+            <a:r>
+              <a:rPr lang="en-GB" sz="2400" b="1" dirty="0"/>
+              <a:t>especially when working with AI-generated or AI-assisted code</a:t>
+            </a:r>
+            <a:r>
+              <a:rPr lang="en-GB" sz="2400" dirty="0"/>
+              <a:t>.</a:t>
+            </a:r>
+            <a:endParaRPr lang="en-GB" sz="2400" b="0" i="0" dirty="0">
+              <a:solidFill>
+                <a:srgbClr val="333333"/>
+              </a:solidFill>
+              <a:effectLst/>
+              <a:latin typeface="OpenSans"/>
+            </a:endParaRPr>
+          </a:p>
+        </p:txBody>
+      </p:sp>
+      <p:sp>
+        <p:nvSpPr>
+          <p:cNvPr id="4" name="Slide Number Placeholder 3">
+            <a:extLst>
+              <a:ext uri="{FF2B5EF4-FFF2-40B4-BE49-F238E27FC236}">
+                <a16:creationId xmlns:a16="http://schemas.microsoft.com/office/drawing/2014/main" id="{AD9A37E4-C13C-CFB9-1C34-B5A39170E369}"/>
+              </a:ext>
+            </a:extLst>
+          </p:cNvPr>
+          <p:cNvSpPr>
+            <a:spLocks noGrp="1"/>
+          </p:cNvSpPr>
+          <p:nvPr>
+            <p:ph type="sldNum" sz="quarter" idx="12"/>
+          </p:nvPr>
+        </p:nvSpPr>
+        <p:spPr/>
+        <p:txBody>
+          <a:bodyPr/>
+          <a:lstStyle/>
+          <a:p>
+            <a:fld id="{6F19EB20-827F-9F40-A633-3810B83D00D5}" type="slidenum">
+              <a:rPr lang="en-BE" smtClean="0"/>
+              <a:t>3</a:t>
+            </a:fld>
+            <a:endParaRPr lang="en-BE"/>
+          </a:p>
+        </p:txBody>
+      </p:sp>
+    </p:spTree>
+    <p:extLst>
+      <p:ext uri="{BB962C8B-B14F-4D97-AF65-F5344CB8AC3E}">
+        <p14:creationId xmlns:p14="http://schemas.microsoft.com/office/powerpoint/2010/main" val="3652846455"/>
+      </p:ext>
+    </p:extLst>
+  </p:cSld>
+  <p:clrMapOvr>
+    <a:masterClrMapping/>
+  </p:clrMapOvr>
+  <p:timing>
+    <p:tnLst>
+      <p:par>
+        <p:cTn id="1" dur="indefinite" restart="never" nodeType="tmRoot">
+          <p:childTnLst>
+            <p:seq concurrent="1" nextAc="seek">
+              <p:cTn id="2" dur="indefinite" nodeType="mainSeq">
+                <p:childTnLst>
+                  <p:par>
+                    <p:cTn id="3" fill="hold">
+                      <p:stCondLst>
+                        <p:cond delay="indefinite"/>
+                      </p:stCondLst>
+                      <p:childTnLst>
+                        <p:par>
+                          <p:cTn id="4" fill="hold">
+                            <p:stCondLst>
+                              <p:cond delay="0"/>
+                            </p:stCondLst>
+                            <p:childTnLst>
+                              <p:par>
+                                <p:cTn id="5" presetID="1" presetClass="entr" presetSubtype="0" fill="hold" nodeType="clickEffect">
+                                  <p:stCondLst>
+                                    <p:cond delay="0"/>
+                                  </p:stCondLst>
+                                  <p:childTnLst>
+                                    <p:set>
+                                      <p:cBhvr>
+                                        <p:cTn id="6" dur="1" fill="hold">
+                                          <p:stCondLst>
+                                            <p:cond delay="0"/>
+                                          </p:stCondLst>
+                                        </p:cTn>
+                                        <p:tgtEl>
+                                          <p:spTgt spid="7">
+                                            <p:txEl>
+                                              <p:pRg st="1" end="1"/>
+                                            </p:txEl>
+                                          </p:spTgt>
+                                        </p:tgtEl>
+                                        <p:attrNameLst>
+                                          <p:attrName>style.visibility</p:attrName>
+                                        </p:attrNameLst>
+                                      </p:cBhvr>
+                                      <p:to>
+                                        <p:strVal val="visible"/>
+                                      </p:to>
+                                    </p:set>
+                                  </p:childTnLst>
+                                </p:cTn>
+                              </p:par>
+                            </p:childTnLst>
+                          </p:cTn>
+                        </p:par>
+                      </p:childTnLst>
+                    </p:cTn>
+                  </p:par>
+                  <p:par>
+                    <p:cTn id="7" fill="hold">
+                      <p:stCondLst>
+                        <p:cond delay="indefinite"/>
+                      </p:stCondLst>
+                      <p:childTnLst>
+                        <p:par>
+                          <p:cTn id="8" fill="hold">
+                            <p:stCondLst>
+                              <p:cond delay="0"/>
+                            </p:stCondLst>
+                            <p:childTnLst>
+                              <p:par>
+                                <p:cTn id="9" presetID="1" presetClass="entr" presetSubtype="0" fill="hold" nodeType="clickEffect">
+                                  <p:stCondLst>
+                                    <p:cond delay="0"/>
+                                  </p:stCondLst>
+                                  <p:childTnLst>
+                                    <p:set>
+                                      <p:cBhvr>
+                                        <p:cTn id="10" dur="1" fill="hold">
+                                          <p:stCondLst>
+                                            <p:cond delay="0"/>
+                                          </p:stCondLst>
+                                        </p:cTn>
+                                        <p:tgtEl>
+                                          <p:spTgt spid="7">
+                                            <p:txEl>
+                                              <p:pRg st="2" end="2"/>
+                                            </p:txEl>
+                                          </p:spTgt>
+                                        </p:tgtEl>
+                                        <p:attrNameLst>
+                                          <p:attrName>style.visibility</p:attrName>
+                                        </p:attrNameLst>
+                                      </p:cBhvr>
+                                      <p:to>
+                                        <p:strVal val="visible"/>
+                                      </p:to>
+                                    </p:set>
+                                  </p:childTnLst>
+                                </p:cTn>
+                              </p:par>
+                            </p:childTnLst>
+                          </p:cTn>
+                        </p:par>
+                      </p:childTnLst>
+                    </p:cTn>
+                  </p:par>
+                  <p:par>
+                    <p:cTn id="11" fill="hold">
+                      <p:stCondLst>
+                        <p:cond delay="indefinite"/>
+                      </p:stCondLst>
+                      <p:childTnLst>
+                        <p:par>
+                          <p:cTn id="12" fill="hold">
+                            <p:stCondLst>
+                              <p:cond delay="0"/>
+                            </p:stCondLst>
+                            <p:childTnLst>
+                              <p:par>
+                                <p:cTn id="13" presetID="1" presetClass="entr" presetSubtype="0" fill="hold" nodeType="clickEffect">
+                                  <p:stCondLst>
+                                    <p:cond delay="0"/>
+                                  </p:stCondLst>
+                                  <p:childTnLst>
+                                    <p:set>
+                                      <p:cBhvr>
+                                        <p:cTn id="14" dur="1" fill="hold">
+                                          <p:stCondLst>
+                                            <p:cond delay="0"/>
+                                          </p:stCondLst>
+                                        </p:cTn>
+                                        <p:tgtEl>
+                                          <p:spTgt spid="7">
+                                            <p:txEl>
+                                              <p:pRg st="3" end="3"/>
+                                            </p:txEl>
+                                          </p:spTgt>
+                                        </p:tgtEl>
+                                        <p:attrNameLst>
+                                          <p:attrName>style.visibility</p:attrName>
+                                        </p:attrNameLst>
+                                      </p:cBhvr>
+                                      <p:to>
+                                        <p:strVal val="visible"/>
+                                      </p:to>
+                                    </p:set>
+                                  </p:childTnLst>
+                                </p:cTn>
+                              </p:par>
+                            </p:childTnLst>
+                          </p:cTn>
+                        </p:par>
+                      </p:childTnLst>
+                    </p:cTn>
+                  </p:par>
+                  <p:par>
+                    <p:cTn id="15" fill="hold">
+                      <p:stCondLst>
+                        <p:cond delay="indefinite"/>
+                      </p:stCondLst>
+                      <p:childTnLst>
+                        <p:par>
+                          <p:cTn id="16" fill="hold">
+                            <p:stCondLst>
+                              <p:cond delay="0"/>
+                            </p:stCondLst>
+                            <p:childTnLst>
+                              <p:par>
+                                <p:cTn id="17" presetID="1" presetClass="entr" presetSubtype="0" fill="hold" nodeType="clickEffect">
+                                  <p:stCondLst>
+                                    <p:cond delay="0"/>
+                                  </p:stCondLst>
+                                  <p:childTnLst>
+                                    <p:set>
+                                      <p:cBhvr>
+                                        <p:cTn id="18" dur="1" fill="hold">
+                                          <p:stCondLst>
+                                            <p:cond delay="0"/>
+                                          </p:stCondLst>
+                                        </p:cTn>
+                                        <p:tgtEl>
+                                          <p:spTgt spid="7">
+                                            <p:txEl>
+                                              <p:pRg st="4" end="4"/>
+                                            </p:txEl>
+                                          </p:spTgt>
+                                        </p:tgtEl>
+                                        <p:attrNameLst>
+                                          <p:attrName>style.visibility</p:attrName>
+                                        </p:attrNameLst>
+                                      </p:cBhvr>
+                                      <p:to>
+                                        <p:strVal val="visible"/>
+                                      </p:to>
+                                    </p:set>
+                                  </p:childTnLst>
+                                </p:cTn>
+                              </p:par>
+                            </p:childTnLst>
+                          </p:cTn>
+                        </p:par>
+                      </p:childTnLst>
+                    </p:cTn>
+                  </p:par>
+                </p:childTnLst>
+              </p:cTn>
+              <p:prevCondLst>
+                <p:cond evt="onPrev" delay="0">
+                  <p:tgtEl>
+                    <p:sldTgt/>
+                  </p:tgtEl>
+                </p:cond>
+              </p:prevCondLst>
+              <p:nextCondLst>
+                <p:cond evt="onNext" delay="0">
+                  <p:tgtEl>
+                    <p:sldTgt/>
+                  </p:tgtEl>
+                </p:cond>
+              </p:nextCondLst>
+            </p:seq>
+          </p:childTnLst>
+        </p:cTn>
+      </p:par>
+    </p:tnLst>
+  </p:timing>
+</p:sld>
+</file>
+
+<file path=ppt/slides/slide30.xml><?xml version="1.0" encoding="utf-8"?>
 <p:sld xmlns:a="http://schemas.openxmlformats.org/drawingml/2006/main" xmlns:r="http://schemas.openxmlformats.org/officeDocument/2006/relationships" xmlns:p="http://schemas.openxmlformats.org/presentationml/2006/main">
   <p:cSld>
     <p:spTree>
@@ -20258,6 +22038,35 @@
           </p:txBody>
         </p:sp>
       </p:grpSp>
+      <p:sp>
+        <p:nvSpPr>
+          <p:cNvPr id="4" name="Slide Number Placeholder 3">
+            <a:extLst>
+              <a:ext uri="{FF2B5EF4-FFF2-40B4-BE49-F238E27FC236}">
+                <a16:creationId xmlns:a16="http://schemas.microsoft.com/office/drawing/2014/main" id="{53D21ED8-59DE-CAAC-E5DE-A1081B45E0C3}"/>
+              </a:ext>
+            </a:extLst>
+          </p:cNvPr>
+          <p:cNvSpPr>
+            <a:spLocks noGrp="1"/>
+          </p:cNvSpPr>
+          <p:nvPr>
+            <p:ph type="sldNum" sz="quarter" idx="12"/>
+          </p:nvPr>
+        </p:nvSpPr>
+        <p:spPr/>
+        <p:txBody>
+          <a:bodyPr/>
+          <a:lstStyle/>
+          <a:p>
+            <a:fld id="{6F19EB20-827F-9F40-A633-3810B83D00D5}" type="slidenum">
+              <a:rPr lang="en-BE" smtClean="0"/>
+              <a:t>30</a:t>
+            </a:fld>
+            <a:endParaRPr lang="en-BE"/>
+          </a:p>
+        </p:txBody>
+      </p:sp>
     </p:spTree>
     <p:extLst>
       <p:ext uri="{BB962C8B-B14F-4D97-AF65-F5344CB8AC3E}">
@@ -20719,7 +22528,7 @@
 </p:sld>
 </file>
 
-<file path=ppt/slides/slide29.xml><?xml version="1.0" encoding="utf-8"?>
+<file path=ppt/slides/slide31.xml><?xml version="1.0" encoding="utf-8"?>
 <p:sld xmlns:a="http://schemas.openxmlformats.org/drawingml/2006/main" xmlns:r="http://schemas.openxmlformats.org/officeDocument/2006/relationships" xmlns:p="http://schemas.openxmlformats.org/presentationml/2006/main">
   <p:cSld>
     <p:spTree>
@@ -20841,6 +22650,35 @@
           </a:prstGeom>
         </p:spPr>
       </p:pic>
+      <p:sp>
+        <p:nvSpPr>
+          <p:cNvPr id="6" name="Slide Number Placeholder 5">
+            <a:extLst>
+              <a:ext uri="{FF2B5EF4-FFF2-40B4-BE49-F238E27FC236}">
+                <a16:creationId xmlns:a16="http://schemas.microsoft.com/office/drawing/2014/main" id="{50AE2B98-DD54-D934-0A2B-B182A54003D6}"/>
+              </a:ext>
+            </a:extLst>
+          </p:cNvPr>
+          <p:cNvSpPr>
+            <a:spLocks noGrp="1"/>
+          </p:cNvSpPr>
+          <p:nvPr>
+            <p:ph type="sldNum" sz="quarter" idx="12"/>
+          </p:nvPr>
+        </p:nvSpPr>
+        <p:spPr/>
+        <p:txBody>
+          <a:bodyPr/>
+          <a:lstStyle/>
+          <a:p>
+            <a:fld id="{6F19EB20-827F-9F40-A633-3810B83D00D5}" type="slidenum">
+              <a:rPr lang="en-BE" smtClean="0"/>
+              <a:t>31</a:t>
+            </a:fld>
+            <a:endParaRPr lang="en-BE"/>
+          </a:p>
+        </p:txBody>
+      </p:sp>
     </p:spTree>
     <p:extLst>
       <p:ext uri="{BB962C8B-B14F-4D97-AF65-F5344CB8AC3E}">
@@ -20933,187 +22771,6 @@
 </p:sld>
 </file>
 
-<file path=ppt/slides/slide3.xml><?xml version="1.0" encoding="utf-8"?>
-<p:sld xmlns:a="http://schemas.openxmlformats.org/drawingml/2006/main" xmlns:r="http://schemas.openxmlformats.org/officeDocument/2006/relationships" xmlns:p="http://schemas.openxmlformats.org/presentationml/2006/main">
-  <p:cSld>
-    <p:spTree>
-      <p:nvGrpSpPr>
-        <p:cNvPr id="1" name=""/>
-        <p:cNvGrpSpPr/>
-        <p:nvPr/>
-      </p:nvGrpSpPr>
-      <p:grpSpPr>
-        <a:xfrm>
-          <a:off x="0" y="0"/>
-          <a:ext cx="0" cy="0"/>
-          <a:chOff x="0" y="0"/>
-          <a:chExt cx="0" cy="0"/>
-        </a:xfrm>
-      </p:grpSpPr>
-      <p:sp>
-        <p:nvSpPr>
-          <p:cNvPr id="2" name="Title 1">
-            <a:extLst>
-              <a:ext uri="{FF2B5EF4-FFF2-40B4-BE49-F238E27FC236}">
-                <a16:creationId xmlns:a16="http://schemas.microsoft.com/office/drawing/2014/main" id="{912530C2-AFD4-AFB8-F42C-107106AB5BCE}"/>
-              </a:ext>
-            </a:extLst>
-          </p:cNvPr>
-          <p:cNvSpPr>
-            <a:spLocks noGrp="1"/>
-          </p:cNvSpPr>
-          <p:nvPr>
-            <p:ph type="title"/>
-          </p:nvPr>
-        </p:nvSpPr>
-        <p:spPr/>
-        <p:txBody>
-          <a:bodyPr/>
-          <a:lstStyle/>
-          <a:p>
-            <a:r>
-              <a:rPr lang="en-BE" dirty="0"/>
-              <a:t>What is CI/CD</a:t>
-            </a:r>
-          </a:p>
-        </p:txBody>
-      </p:sp>
-      <p:pic>
-        <p:nvPicPr>
-          <p:cNvPr id="5" name="Content Placeholder 4" descr="A diagram of a software development process&#10;&#10;Description automatically generated">
-            <a:extLst>
-              <a:ext uri="{FF2B5EF4-FFF2-40B4-BE49-F238E27FC236}">
-                <a16:creationId xmlns:a16="http://schemas.microsoft.com/office/drawing/2014/main" id="{5D7CF354-E9EE-4552-EA75-95BC936ECEA6}"/>
-              </a:ext>
-            </a:extLst>
-          </p:cNvPr>
-          <p:cNvPicPr>
-            <a:picLocks noGrp="1" noChangeAspect="1"/>
-          </p:cNvPicPr>
-          <p:nvPr>
-            <p:ph idx="1"/>
-          </p:nvPr>
-        </p:nvPicPr>
-        <p:blipFill>
-          <a:blip r:embed="rId3"/>
-          <a:stretch>
-            <a:fillRect/>
-          </a:stretch>
-        </p:blipFill>
-        <p:spPr>
-          <a:xfrm>
-            <a:off x="288225" y="2583584"/>
-            <a:ext cx="3556811" cy="1979272"/>
-          </a:xfrm>
-        </p:spPr>
-      </p:pic>
-      <p:sp>
-        <p:nvSpPr>
-          <p:cNvPr id="7" name="TextBox 6">
-            <a:extLst>
-              <a:ext uri="{FF2B5EF4-FFF2-40B4-BE49-F238E27FC236}">
-                <a16:creationId xmlns:a16="http://schemas.microsoft.com/office/drawing/2014/main" id="{840D8AB5-E42B-625D-55CB-1A4C4E13FBFC}"/>
-              </a:ext>
-            </a:extLst>
-          </p:cNvPr>
-          <p:cNvSpPr txBox="1"/>
-          <p:nvPr/>
-        </p:nvSpPr>
-        <p:spPr>
-          <a:xfrm>
-            <a:off x="4233671" y="1813970"/>
-            <a:ext cx="7374395" cy="2677656"/>
-          </a:xfrm>
-          <a:prstGeom prst="rect">
-            <a:avLst/>
-          </a:prstGeom>
-          <a:noFill/>
-        </p:spPr>
-        <p:txBody>
-          <a:bodyPr wrap="square">
-            <a:spAutoFit/>
-          </a:bodyPr>
-          <a:lstStyle/>
-          <a:p>
-            <a:pPr marL="285750" indent="-285750" algn="l">
-              <a:buFont typeface="Arial" panose="020B0604020202020204" pitchFamily="34" charset="0"/>
-              <a:buChar char="•"/>
-            </a:pPr>
-            <a:r>
-              <a:rPr lang="en-GB" sz="2400" b="0" i="0" dirty="0">
-                <a:solidFill>
-                  <a:srgbClr val="333333"/>
-                </a:solidFill>
-                <a:effectLst/>
-                <a:latin typeface="OpenSans"/>
-              </a:rPr>
-              <a:t>CI/CD is not one process. It’s two separate and distinct processes that happen right after each other.</a:t>
-            </a:r>
-          </a:p>
-          <a:p>
-            <a:pPr marL="285750" indent="-285750" algn="l">
-              <a:buFont typeface="Arial" panose="020B0604020202020204" pitchFamily="34" charset="0"/>
-              <a:buChar char="•"/>
-            </a:pPr>
-            <a:r>
-              <a:rPr lang="en-GB" sz="2400" b="0" i="0" dirty="0">
-                <a:solidFill>
-                  <a:srgbClr val="333333"/>
-                </a:solidFill>
-                <a:effectLst/>
-                <a:latin typeface="OpenSans"/>
-              </a:rPr>
-              <a:t>CI is an automation process that allows you to integrate your work into the main branch so your branch stays within a reasonable distance.</a:t>
-            </a:r>
-          </a:p>
-          <a:p>
-            <a:pPr marL="285750" indent="-285750" algn="l">
-              <a:buFont typeface="Arial" panose="020B0604020202020204" pitchFamily="34" charset="0"/>
-              <a:buChar char="•"/>
-            </a:pPr>
-            <a:r>
-              <a:rPr lang="en-GB" sz="2400" b="0" i="0" dirty="0">
-                <a:solidFill>
-                  <a:srgbClr val="333333"/>
-                </a:solidFill>
-                <a:effectLst/>
-                <a:latin typeface="OpenSans"/>
-              </a:rPr>
-              <a:t>CD is</a:t>
-            </a:r>
-            <a:r>
-              <a:rPr lang="en-GB" sz="2400" b="0" i="0" dirty="0">
-                <a:solidFill>
-                  <a:srgbClr val="1F1F1F"/>
-                </a:solidFill>
-                <a:effectLst/>
-                <a:latin typeface="Source Sans Pro" panose="020B0503030403020204" pitchFamily="34" charset="0"/>
-              </a:rPr>
-              <a:t> then taking the integrated code and deploying it somewhere. </a:t>
-            </a:r>
-            <a:endParaRPr lang="en-GB" sz="2400" b="0" i="0" dirty="0">
-              <a:solidFill>
-                <a:srgbClr val="333333"/>
-              </a:solidFill>
-              <a:effectLst/>
-              <a:latin typeface="OpenSans"/>
-            </a:endParaRPr>
-          </a:p>
-        </p:txBody>
-      </p:sp>
-    </p:spTree>
-    <p:extLst>
-      <p:ext uri="{BB962C8B-B14F-4D97-AF65-F5344CB8AC3E}">
-        <p14:creationId xmlns:p14="http://schemas.microsoft.com/office/powerpoint/2010/main" val="3652846455"/>
-      </p:ext>
-    </p:extLst>
-  </p:cSld>
-  <p:clrMapOvr>
-    <a:masterClrMapping/>
-  </p:clrMapOvr>
-</p:sld>
-</file>
-
 <file path=ppt/slides/slide4.xml><?xml version="1.0" encoding="utf-8"?>
 <p:sld xmlns:a="http://schemas.openxmlformats.org/drawingml/2006/main" xmlns:r="http://schemas.openxmlformats.org/officeDocument/2006/relationships" xmlns:p="http://schemas.openxmlformats.org/presentationml/2006/main">
   <p:cSld>
@@ -21147,7 +22804,12 @@
             <p:ph type="title"/>
           </p:nvPr>
         </p:nvSpPr>
-        <p:spPr/>
+        <p:spPr>
+          <a:xfrm>
+            <a:off x="838200" y="22980"/>
+            <a:ext cx="10515600" cy="1325563"/>
+          </a:xfrm>
+        </p:spPr>
         <p:txBody>
           <a:bodyPr/>
           <a:lstStyle/>
@@ -21182,7 +22844,7 @@
         </p:blipFill>
         <p:spPr>
           <a:xfrm>
-            <a:off x="6362299" y="2804988"/>
+            <a:off x="6362299" y="2386345"/>
             <a:ext cx="3630716" cy="639672"/>
           </a:xfrm>
         </p:spPr>
@@ -21208,7 +22870,7 @@
         </p:blipFill>
         <p:spPr>
           <a:xfrm>
-            <a:off x="1468602" y="2761919"/>
+            <a:off x="1468602" y="2343276"/>
             <a:ext cx="4745628" cy="643708"/>
           </a:xfrm>
           <a:prstGeom prst="rect">
@@ -21230,7 +22892,7 @@
         </p:nvSpPr>
         <p:spPr>
           <a:xfrm>
-            <a:off x="8510352" y="1401930"/>
+            <a:off x="8510352" y="983287"/>
             <a:ext cx="96252" cy="346510"/>
           </a:xfrm>
           <a:prstGeom prst="rect">
@@ -21282,7 +22944,7 @@
         </p:nvGrpSpPr>
         <p:grpSpPr>
           <a:xfrm>
-            <a:off x="1481890" y="1936644"/>
+            <a:off x="1481890" y="1518001"/>
             <a:ext cx="4745628" cy="2615381"/>
             <a:chOff x="1481890" y="1936644"/>
             <a:chExt cx="4745628" cy="2615381"/>
@@ -21392,7 +23054,7 @@
         </p:nvGrpSpPr>
         <p:grpSpPr>
           <a:xfrm>
-            <a:off x="6304549" y="1973179"/>
+            <a:off x="6304549" y="1554536"/>
             <a:ext cx="3782727" cy="2579571"/>
             <a:chOff x="6304549" y="1973179"/>
             <a:chExt cx="3782727" cy="2579571"/>
@@ -21502,7 +23164,7 @@
         </p:nvGrpSpPr>
         <p:grpSpPr>
           <a:xfrm>
-            <a:off x="3592701" y="2334696"/>
+            <a:off x="3592701" y="1916053"/>
             <a:ext cx="1697496" cy="1321338"/>
             <a:chOff x="3592701" y="2334696"/>
             <a:chExt cx="1697496" cy="1321338"/>
@@ -21673,7 +23335,7 @@
         </p:nvGrpSpPr>
         <p:grpSpPr>
           <a:xfrm>
-            <a:off x="7158700" y="2362006"/>
+            <a:off x="7158700" y="1943363"/>
             <a:ext cx="1697496" cy="1321338"/>
             <a:chOff x="7158700" y="2362006"/>
             <a:chExt cx="1697496" cy="1321338"/>
@@ -21844,7 +23506,7 @@
         </p:nvSpPr>
         <p:spPr>
           <a:xfrm>
-            <a:off x="1481890" y="1973175"/>
+            <a:off x="1481890" y="1554532"/>
             <a:ext cx="4745628" cy="2579571"/>
           </a:xfrm>
           <a:prstGeom prst="rect">
@@ -21896,7 +23558,7 @@
         </p:nvSpPr>
         <p:spPr>
           <a:xfrm>
-            <a:off x="2702560" y="1447063"/>
+            <a:off x="2702560" y="1028420"/>
             <a:ext cx="2304288" cy="523220"/>
           </a:xfrm>
           <a:prstGeom prst="rect">
@@ -21931,8 +23593,8 @@
         </p:nvSpPr>
         <p:spPr>
           <a:xfrm>
-            <a:off x="6362299" y="4689905"/>
-            <a:ext cx="4991501" cy="2092881"/>
+            <a:off x="6362299" y="4271262"/>
+            <a:ext cx="5392699" cy="2031325"/>
           </a:xfrm>
           <a:prstGeom prst="rect">
             <a:avLst/>
@@ -21950,23 +23612,25 @@
           </a:bodyPr>
           <a:lstStyle/>
           <a:p>
-            <a:r>
-              <a:rPr lang="en-US" dirty="0"/>
-              <a:t>Staging environment for automated deployment</a:t>
-            </a:r>
-          </a:p>
-          <a:p>
             <a:pPr marL="285750" indent="-285750">
               <a:buFont typeface="Arial" panose="020B0604020202020204" pitchFamily="34" charset="0"/>
               <a:buChar char="•"/>
             </a:pPr>
             <a:r>
-              <a:rPr lang="en-US" sz="1600" b="1" dirty="0"/>
-              <a:t>Release</a:t>
-            </a:r>
-            <a:r>
-              <a:rPr lang="en-US" sz="1600" dirty="0"/>
-              <a:t> – changes are prepared (e.g., triggering automated tests)</a:t>
+              <a:rPr lang="en-GB" b="1" dirty="0"/>
+              <a:t>Continuous Delivery (CD)</a:t>
+            </a:r>
+            <a:r>
+              <a:rPr lang="en-GB" dirty="0"/>
+              <a:t> focuses on what happens </a:t>
+            </a:r>
+            <a:r>
+              <a:rPr lang="en-GB" i="1" dirty="0"/>
+              <a:t>after</a:t>
+            </a:r>
+            <a:r>
+              <a:rPr lang="en-GB" dirty="0"/>
+              <a:t> code has been integrated.</a:t>
             </a:r>
           </a:p>
           <a:p>
@@ -21975,46 +23639,34 @@
               <a:buChar char="•"/>
             </a:pPr>
             <a:r>
-              <a:rPr lang="en-US" sz="1600" b="1" dirty="0"/>
+              <a:rPr lang="en-GB" dirty="0"/>
+              <a:t>It includes the </a:t>
+            </a:r>
+            <a:r>
+              <a:rPr lang="en-GB" b="1" dirty="0"/>
+              <a:t>Release</a:t>
+            </a:r>
+            <a:r>
+              <a:rPr lang="en-GB" dirty="0"/>
+              <a:t>, </a:t>
+            </a:r>
+            <a:r>
+              <a:rPr lang="en-GB" b="1" dirty="0"/>
               <a:t>Deploy</a:t>
             </a:r>
             <a:r>
-              <a:rPr lang="en-US" sz="1600" dirty="0"/>
-              <a:t> – packaged application is deployed in the staging environment </a:t>
-            </a:r>
-          </a:p>
-          <a:p>
-            <a:pPr marL="285750" indent="-285750">
-              <a:buFont typeface="Arial" panose="020B0604020202020204" pitchFamily="34" charset="0"/>
-              <a:buChar char="•"/>
-            </a:pPr>
-            <a:r>
-              <a:rPr lang="en-US" sz="1600" b="1" dirty="0"/>
+              <a:rPr lang="en-GB" dirty="0"/>
+              <a:t>, and </a:t>
+            </a:r>
+            <a:r>
+              <a:rPr lang="en-GB" b="1" dirty="0"/>
               <a:t>Operate</a:t>
             </a:r>
             <a:r>
-              <a:rPr lang="en-US" sz="1600" dirty="0"/>
-              <a:t> -  </a:t>
-            </a:r>
-            <a:r>
-              <a:rPr lang="en-GB" sz="1600" b="0" i="0" dirty="0">
-                <a:effectLst/>
-              </a:rPr>
-              <a:t>the application is actively monitored and maintained in the production environment (</a:t>
-            </a:r>
-            <a:r>
-              <a:rPr lang="en-GB" sz="1600" b="1" i="0" dirty="0">
-                <a:effectLst/>
-              </a:rPr>
-              <a:t>manual step</a:t>
-            </a:r>
-            <a:r>
-              <a:rPr lang="en-GB" sz="1600" b="0" i="0" dirty="0">
-                <a:effectLst/>
-              </a:rPr>
-              <a:t>)</a:t>
-            </a:r>
-            <a:endParaRPr lang="en-US" sz="1600" dirty="0"/>
+              <a:rPr lang="en-GB" dirty="0"/>
+              <a:t> phases, where validated binaries are packaged, deployed to an environment, and monitored in operation — sometimes automatically, sometimes with manual approval.</a:t>
+            </a:r>
+            <a:endParaRPr lang="en-US" dirty="0"/>
           </a:p>
         </p:txBody>
       </p:sp>
@@ -22032,8 +23684,8 @@
         </p:nvSpPr>
         <p:spPr>
           <a:xfrm>
-            <a:off x="1222729" y="4689905"/>
-            <a:ext cx="4991501" cy="1908215"/>
+            <a:off x="1222729" y="4271262"/>
+            <a:ext cx="4991501" cy="2123658"/>
           </a:xfrm>
           <a:prstGeom prst="rect">
             <a:avLst/>
@@ -22051,47 +23703,21 @@
           </a:bodyPr>
           <a:lstStyle/>
           <a:p>
-            <a:r>
-              <a:rPr lang="en-US" dirty="0"/>
-              <a:t>Encompasses the entire software development lifecycle from </a:t>
-            </a:r>
-            <a:r>
-              <a:rPr lang="en-US" b="1" dirty="0"/>
-              <a:t>planning</a:t>
-            </a:r>
-            <a:r>
-              <a:rPr lang="en-US" dirty="0"/>
-              <a:t> and </a:t>
-            </a:r>
-            <a:r>
-              <a:rPr lang="en-US" b="1" dirty="0"/>
-              <a:t>coding</a:t>
-            </a:r>
-            <a:r>
-              <a:rPr lang="en-US" dirty="0"/>
-              <a:t> to </a:t>
-            </a:r>
-            <a:r>
-              <a:rPr lang="en-US" b="1" dirty="0"/>
-              <a:t>building</a:t>
-            </a:r>
-            <a:r>
-              <a:rPr lang="en-US" dirty="0"/>
-              <a:t> and </a:t>
-            </a:r>
-            <a:r>
-              <a:rPr lang="en-US" b="1" dirty="0"/>
-              <a:t>testing</a:t>
-            </a:r>
-          </a:p>
-          <a:p>
             <a:pPr marL="285750" indent="-285750">
               <a:buFont typeface="Arial" panose="020B0604020202020204" pitchFamily="34" charset="0"/>
               <a:buChar char="•"/>
             </a:pPr>
             <a:r>
-              <a:rPr lang="en-US" sz="1600" dirty="0"/>
-              <a:t>Emphasis on the frequent integration of code changes</a:t>
+              <a:rPr lang="en-GB" dirty="0"/>
+              <a:t>CI is a </a:t>
+            </a:r>
+            <a:r>
+              <a:rPr lang="en-GB" i="1" dirty="0"/>
+              <a:t>repeating feedback loop</a:t>
+            </a:r>
+            <a:r>
+              <a:rPr lang="en-GB" dirty="0"/>
+              <a:t> that evaluates proposed changes as they are proposed.</a:t>
             </a:r>
           </a:p>
           <a:p>
@@ -22100,14 +23726,17 @@
               <a:buChar char="•"/>
             </a:pPr>
             <a:r>
-              <a:rPr lang="en-GB" sz="1600" b="0" i="0" dirty="0">
-                <a:effectLst/>
-              </a:rPr>
-              <a:t>automated building of the application</a:t>
-            </a:r>
-            <a:endParaRPr lang="en-US" sz="1600" b="0" i="0" dirty="0">
-              <a:effectLst/>
-            </a:endParaRPr>
+              <a:rPr lang="en-GB" sz="1600" dirty="0"/>
+              <a:t>Developers write code, and CI automatically builds and tests those changes to answer one key question: “</a:t>
+            </a:r>
+            <a:r>
+              <a:rPr lang="en-GB" sz="1600" b="1" dirty="0"/>
+              <a:t>Is this change safe to integrate?</a:t>
+            </a:r>
+            <a:r>
+              <a:rPr lang="en-GB" sz="1600" dirty="0"/>
+              <a:t>”</a:t>
+            </a:r>
           </a:p>
           <a:p>
             <a:pPr marL="285750" indent="-285750">
@@ -22115,12 +23744,39 @@
               <a:buChar char="•"/>
             </a:pPr>
             <a:r>
-              <a:rPr lang="en-GB" sz="1600" b="0" i="0" dirty="0">
-                <a:effectLst/>
-              </a:rPr>
-              <a:t>running of automated tests to ensure the quality and correctness</a:t>
+              <a:rPr lang="en-GB" sz="1600" dirty="0"/>
+              <a:t>CI runs many times throughout development — not to finish the system, but to keep changes small, compatible, and reviewable.</a:t>
             </a:r>
             <a:endParaRPr lang="en-US" sz="1600" dirty="0"/>
+          </a:p>
+        </p:txBody>
+      </p:sp>
+      <p:sp>
+        <p:nvSpPr>
+          <p:cNvPr id="25" name="Slide Number Placeholder 24">
+            <a:extLst>
+              <a:ext uri="{FF2B5EF4-FFF2-40B4-BE49-F238E27FC236}">
+                <a16:creationId xmlns:a16="http://schemas.microsoft.com/office/drawing/2014/main" id="{52C9C033-2596-2245-6F0B-C136A6DBB57E}"/>
+              </a:ext>
+            </a:extLst>
+          </p:cNvPr>
+          <p:cNvSpPr>
+            <a:spLocks noGrp="1"/>
+          </p:cNvSpPr>
+          <p:nvPr>
+            <p:ph type="sldNum" sz="quarter" idx="12"/>
+          </p:nvPr>
+        </p:nvSpPr>
+        <p:spPr/>
+        <p:txBody>
+          <a:bodyPr/>
+          <a:lstStyle/>
+          <a:p>
+            <a:fld id="{6F19EB20-827F-9F40-A633-3810B83D00D5}" type="slidenum">
+              <a:rPr lang="en-BE" smtClean="0"/>
+              <a:t>4</a:t>
+            </a:fld>
+            <a:endParaRPr lang="en-BE"/>
           </a:p>
         </p:txBody>
       </p:sp>
@@ -22654,15 +24310,23 @@
             <p:ph type="title"/>
           </p:nvPr>
         </p:nvSpPr>
-        <p:spPr/>
+        <p:spPr>
+          <a:xfrm>
+            <a:off x="838200" y="365125"/>
+            <a:ext cx="10515600" cy="964019"/>
+          </a:xfrm>
+        </p:spPr>
         <p:txBody>
-          <a:bodyPr/>
+          <a:bodyPr>
+            <a:normAutofit/>
+          </a:bodyPr>
           <a:lstStyle/>
           <a:p>
             <a:r>
-              <a:rPr lang="en-BE" dirty="0"/>
-              <a:t>Continuous Deployment</a:t>
-            </a:r>
+              <a:rPr lang="en-GB" sz="3600" dirty="0"/>
+              <a:t>Continuous Delivery vs Continuous Deployment</a:t>
+            </a:r>
+            <a:endParaRPr lang="en-BE" sz="3600" dirty="0"/>
           </a:p>
         </p:txBody>
       </p:sp>
@@ -22978,6 +24642,142 @@
           </p:spPr>
         </p:pic>
       </p:grpSp>
+      <p:grpSp>
+        <p:nvGrpSpPr>
+          <p:cNvPr id="13" name="Group 12">
+            <a:extLst>
+              <a:ext uri="{FF2B5EF4-FFF2-40B4-BE49-F238E27FC236}">
+                <a16:creationId xmlns:a16="http://schemas.microsoft.com/office/drawing/2014/main" id="{29690A52-7675-9536-63D9-03C88F477D5C}"/>
+              </a:ext>
+            </a:extLst>
+          </p:cNvPr>
+          <p:cNvGrpSpPr/>
+          <p:nvPr/>
+        </p:nvGrpSpPr>
+        <p:grpSpPr>
+          <a:xfrm>
+            <a:off x="8829040" y="1505152"/>
+            <a:ext cx="3028219" cy="923330"/>
+            <a:chOff x="8829040" y="1505152"/>
+            <a:chExt cx="3028219" cy="923330"/>
+          </a:xfrm>
+        </p:grpSpPr>
+        <p:sp>
+          <p:nvSpPr>
+            <p:cNvPr id="5" name="TextBox 4">
+              <a:extLst>
+                <a:ext uri="{FF2B5EF4-FFF2-40B4-BE49-F238E27FC236}">
+                  <a16:creationId xmlns:a16="http://schemas.microsoft.com/office/drawing/2014/main" id="{3175C137-F84D-4356-AEA8-4204FEBEA9DA}"/>
+                </a:ext>
+              </a:extLst>
+            </p:cNvPr>
+            <p:cNvSpPr txBox="1"/>
+            <p:nvPr/>
+          </p:nvSpPr>
+          <p:spPr>
+            <a:xfrm>
+              <a:off x="9748912" y="1505152"/>
+              <a:ext cx="2108347" cy="923330"/>
+            </a:xfrm>
+            <a:prstGeom prst="rect">
+              <a:avLst/>
+            </a:prstGeom>
+            <a:noFill/>
+            <a:ln w="28575">
+              <a:solidFill>
+                <a:srgbClr val="C00000"/>
+              </a:solidFill>
+            </a:ln>
+          </p:spPr>
+          <p:txBody>
+            <a:bodyPr wrap="square" rtlCol="0">
+              <a:spAutoFit/>
+            </a:bodyPr>
+            <a:lstStyle/>
+            <a:p>
+              <a:r>
+                <a:rPr lang="en-GB" dirty="0"/>
+                <a:t>Used selectively in mature, low-risk systems</a:t>
+              </a:r>
+              <a:endParaRPr lang="en-US" dirty="0"/>
+            </a:p>
+          </p:txBody>
+        </p:sp>
+        <p:cxnSp>
+          <p:nvCxnSpPr>
+            <p:cNvPr id="11" name="Straight Arrow Connector 10">
+              <a:extLst>
+                <a:ext uri="{FF2B5EF4-FFF2-40B4-BE49-F238E27FC236}">
+                  <a16:creationId xmlns:a16="http://schemas.microsoft.com/office/drawing/2014/main" id="{7C084842-C996-458A-570E-4D14C1D6DDE1}"/>
+                </a:ext>
+              </a:extLst>
+            </p:cNvPr>
+            <p:cNvCxnSpPr>
+              <a:cxnSpLocks/>
+              <a:stCxn id="5" idx="1"/>
+            </p:cNvCxnSpPr>
+            <p:nvPr/>
+          </p:nvCxnSpPr>
+          <p:spPr>
+            <a:xfrm flipH="1">
+              <a:off x="8829040" y="1966817"/>
+              <a:ext cx="919872" cy="7149"/>
+            </a:xfrm>
+            <a:prstGeom prst="straightConnector1">
+              <a:avLst/>
+            </a:prstGeom>
+            <a:ln w="28575">
+              <a:solidFill>
+                <a:srgbClr val="C00000"/>
+              </a:solidFill>
+              <a:tailEnd type="triangle"/>
+            </a:ln>
+          </p:spPr>
+          <p:style>
+            <a:lnRef idx="1">
+              <a:schemeClr val="accent1"/>
+            </a:lnRef>
+            <a:fillRef idx="0">
+              <a:schemeClr val="accent1"/>
+            </a:fillRef>
+            <a:effectRef idx="0">
+              <a:schemeClr val="accent1"/>
+            </a:effectRef>
+            <a:fontRef idx="minor">
+              <a:schemeClr val="tx1"/>
+            </a:fontRef>
+          </p:style>
+        </p:cxnSp>
+      </p:grpSp>
+      <p:sp>
+        <p:nvSpPr>
+          <p:cNvPr id="15" name="Slide Number Placeholder 14">
+            <a:extLst>
+              <a:ext uri="{FF2B5EF4-FFF2-40B4-BE49-F238E27FC236}">
+                <a16:creationId xmlns:a16="http://schemas.microsoft.com/office/drawing/2014/main" id="{34EF92B7-3E67-78E0-C76E-0F1730B1AD50}"/>
+              </a:ext>
+            </a:extLst>
+          </p:cNvPr>
+          <p:cNvSpPr>
+            <a:spLocks noGrp="1"/>
+          </p:cNvSpPr>
+          <p:nvPr>
+            <p:ph type="sldNum" sz="quarter" idx="12"/>
+          </p:nvPr>
+        </p:nvSpPr>
+        <p:spPr/>
+        <p:txBody>
+          <a:bodyPr/>
+          <a:lstStyle/>
+          <a:p>
+            <a:fld id="{6F19EB20-827F-9F40-A633-3810B83D00D5}" type="slidenum">
+              <a:rPr lang="en-BE" smtClean="0"/>
+              <a:t>5</a:t>
+            </a:fld>
+            <a:endParaRPr lang="en-BE"/>
+          </a:p>
+        </p:txBody>
+      </p:sp>
     </p:spTree>
     <p:extLst>
       <p:ext uri="{BB962C8B-B14F-4D97-AF65-F5344CB8AC3E}">
@@ -23022,7 +24822,7 @@
                                           </p:stCondLst>
                                         </p:cTn>
                                         <p:tgtEl>
-                                          <p:spTgt spid="4"/>
+                                          <p:spTgt spid="3"/>
                                         </p:tgtEl>
                                         <p:attrNameLst>
                                           <p:attrName>style.visibility</p:attrName>
@@ -23054,7 +24854,7 @@
                             </p:stCondLst>
                             <p:childTnLst>
                               <p:par>
-                                <p:cTn id="9" presetID="1" presetClass="entr" presetSubtype="0" fill="hold" grpId="0" nodeType="clickEffect">
+                                <p:cTn id="9" presetID="1" presetClass="entr" presetSubtype="0" fill="hold" nodeType="clickEffect">
                                   <p:stCondLst>
                                     <p:cond delay="0"/>
                                   </p:stCondLst>
@@ -23067,7 +24867,7 @@
                                           </p:stCondLst>
                                         </p:cTn>
                                         <p:tgtEl>
-                                          <p:spTgt spid="3"/>
+                                          <p:spTgt spid="10"/>
                                         </p:tgtEl>
                                         <p:attrNameLst>
                                           <p:attrName>style.visibility</p:attrName>
@@ -23112,7 +24912,52 @@
                                           </p:stCondLst>
                                         </p:cTn>
                                         <p:tgtEl>
-                                          <p:spTgt spid="10"/>
+                                          <p:spTgt spid="13"/>
+                                        </p:tgtEl>
+                                        <p:attrNameLst>
+                                          <p:attrName>style.visibility</p:attrName>
+                                        </p:attrNameLst>
+                                      </p:cBhvr>
+                                      <p:to>
+                                        <p:strVal val="visible"/>
+                                      </p:to>
+                                    </p:set>
+                                  </p:childTnLst>
+                                </p:cTn>
+                              </p:par>
+                            </p:childTnLst>
+                          </p:cTn>
+                        </p:par>
+                      </p:childTnLst>
+                    </p:cTn>
+                  </p:par>
+                  <p:par>
+                    <p:cTn id="15" fill="hold">
+                      <p:stCondLst>
+                        <p:cond delay="indefinite"/>
+                      </p:stCondLst>
+                      <p:childTnLst>
+                        <p:par>
+                          <p:cTn id="16" fill="hold">
+                            <p:stCondLst>
+                              <p:cond delay="0"/>
+                            </p:stCondLst>
+                            <p:childTnLst>
+                              <p:par>
+                                <p:cTn id="17" presetID="1" presetClass="entr" presetSubtype="0" fill="hold" grpId="0" nodeType="clickEffect">
+                                  <p:stCondLst>
+                                    <p:cond delay="0"/>
+                                  </p:stCondLst>
+                                  <p:childTnLst>
+                                    <p:set>
+                                      <p:cBhvr>
+                                        <p:cTn id="18" dur="1" fill="hold">
+                                          <p:stCondLst>
+                                            <p:cond delay="0"/>
+                                          </p:stCondLst>
+                                        </p:cTn>
+                                        <p:tgtEl>
+                                          <p:spTgt spid="4"/>
                                         </p:tgtEl>
                                         <p:attrNameLst>
                                           <p:attrName>style.visibility</p:attrName>
@@ -23311,7 +25156,7 @@
             </a:pPr>
             <a:r>
               <a:rPr lang="en-BE" sz="2400" dirty="0"/>
-              <a:t>Developers work in long-lived development branches</a:t>
+              <a:t>Developers often work on large features</a:t>
             </a:r>
           </a:p>
           <a:p>
@@ -23321,7 +25166,17 @@
             </a:pPr>
             <a:r>
               <a:rPr lang="en-BE" sz="2400" dirty="0"/>
-              <a:t>Merging and building occurs periodically</a:t>
+              <a:t>Develop for extended periods of time</a:t>
+            </a:r>
+          </a:p>
+          <a:p>
+            <a:pPr marL="285750" indent="-285750">
+              <a:buFont typeface="Arial" panose="020B0604020202020204" pitchFamily="34" charset="0"/>
+              <a:buChar char="•"/>
+            </a:pPr>
+            <a:r>
+              <a:rPr lang="en-BE" sz="2400" dirty="0"/>
+              <a:t>Teasting, integration, and building happen late after wor is done</a:t>
             </a:r>
           </a:p>
           <a:p>
@@ -23353,7 +25208,7 @@
         <p:spPr>
           <a:xfrm>
             <a:off x="5950226" y="649357"/>
-            <a:ext cx="0" cy="5698914"/>
+            <a:ext cx="0" cy="5150942"/>
           </a:xfrm>
           <a:prstGeom prst="line">
             <a:avLst/>
@@ -23424,7 +25279,7 @@
         <p:spPr>
           <a:xfrm>
             <a:off x="6732105" y="3371448"/>
-            <a:ext cx="5459895" cy="1384995"/>
+            <a:ext cx="5459895" cy="2677656"/>
           </a:xfrm>
           <a:prstGeom prst="rect">
             <a:avLst/>
@@ -23442,7 +25297,7 @@
               <a:buChar char="•"/>
             </a:pPr>
             <a:r>
-              <a:rPr lang="en-BE" sz="2800" dirty="0"/>
+              <a:rPr lang="en-BE" sz="2400" dirty="0"/>
               <a:t>Short-lived branches</a:t>
             </a:r>
           </a:p>
@@ -23452,7 +25307,7 @@
               <a:buChar char="•"/>
             </a:pPr>
             <a:r>
-              <a:rPr lang="en-BE" sz="2800" dirty="0"/>
+              <a:rPr lang="en-BE" sz="2400" dirty="0"/>
               <a:t>Frequent pull requests</a:t>
             </a:r>
           </a:p>
@@ -23462,9 +25317,106 @@
               <a:buChar char="•"/>
             </a:pPr>
             <a:r>
-              <a:rPr lang="en-BE" sz="2800" dirty="0"/>
-              <a:t>Automated CI tools</a:t>
-            </a:r>
+              <a:rPr lang="en-BE" sz="2400" dirty="0"/>
+              <a:t>Automated CI tools help with feedback befoere integration</a:t>
+            </a:r>
+          </a:p>
+          <a:p>
+            <a:pPr marL="285750" indent="-285750">
+              <a:buFont typeface="Arial" panose="020B0604020202020204" pitchFamily="34" charset="0"/>
+              <a:buChar char="•"/>
+            </a:pPr>
+            <a:r>
+              <a:rPr lang="en-GB" sz="2400" dirty="0"/>
+              <a:t>The goal is not speed for its own sake, but </a:t>
+            </a:r>
+            <a:r>
+              <a:rPr lang="en-GB" sz="2400" b="1" dirty="0"/>
+              <a:t>early feedback, smaller changes, and reduced integration risk</a:t>
+            </a:r>
+            <a:r>
+              <a:rPr lang="en-GB" sz="2400" dirty="0"/>
+              <a:t>.</a:t>
+            </a:r>
+            <a:endParaRPr lang="en-BE" sz="2400" dirty="0"/>
+          </a:p>
+        </p:txBody>
+      </p:sp>
+      <p:sp>
+        <p:nvSpPr>
+          <p:cNvPr id="4" name="TextBox 3">
+            <a:extLst>
+              <a:ext uri="{FF2B5EF4-FFF2-40B4-BE49-F238E27FC236}">
+                <a16:creationId xmlns:a16="http://schemas.microsoft.com/office/drawing/2014/main" id="{283592FE-65A7-C6A1-F60F-BB1393DD053D}"/>
+              </a:ext>
+            </a:extLst>
+          </p:cNvPr>
+          <p:cNvSpPr txBox="1"/>
+          <p:nvPr/>
+        </p:nvSpPr>
+        <p:spPr>
+          <a:xfrm>
+            <a:off x="3102196" y="6125517"/>
+            <a:ext cx="6277963" cy="461665"/>
+          </a:xfrm>
+          <a:prstGeom prst="rect">
+            <a:avLst/>
+          </a:prstGeom>
+          <a:noFill/>
+          <a:ln w="28575">
+            <a:solidFill>
+              <a:srgbClr val="C00000"/>
+            </a:solidFill>
+          </a:ln>
+        </p:spPr>
+        <p:txBody>
+          <a:bodyPr wrap="square">
+            <a:spAutoFit/>
+          </a:bodyPr>
+          <a:lstStyle/>
+          <a:p>
+            <a:r>
+              <a:rPr lang="en-GB" sz="2400" dirty="0"/>
+              <a:t>CI doesn’t prevent bugs — it prevents </a:t>
+            </a:r>
+            <a:r>
+              <a:rPr lang="en-GB" sz="2400" i="1" dirty="0"/>
+              <a:t>surprises</a:t>
+            </a:r>
+            <a:r>
+              <a:rPr lang="en-GB" sz="2400" dirty="0"/>
+              <a:t>.”</a:t>
+            </a:r>
+            <a:endParaRPr lang="en-US" sz="2400" dirty="0"/>
+          </a:p>
+        </p:txBody>
+      </p:sp>
+      <p:sp>
+        <p:nvSpPr>
+          <p:cNvPr id="6" name="Slide Number Placeholder 5">
+            <a:extLst>
+              <a:ext uri="{FF2B5EF4-FFF2-40B4-BE49-F238E27FC236}">
+                <a16:creationId xmlns:a16="http://schemas.microsoft.com/office/drawing/2014/main" id="{90011830-7D82-C695-6C08-96931775FCED}"/>
+              </a:ext>
+            </a:extLst>
+          </p:cNvPr>
+          <p:cNvSpPr>
+            <a:spLocks noGrp="1"/>
+          </p:cNvSpPr>
+          <p:nvPr>
+            <p:ph type="sldNum" sz="quarter" idx="12"/>
+          </p:nvPr>
+        </p:nvSpPr>
+        <p:spPr/>
+        <p:txBody>
+          <a:bodyPr/>
+          <a:lstStyle/>
+          <a:p>
+            <a:fld id="{6F19EB20-827F-9F40-A633-3810B83D00D5}" type="slidenum">
+              <a:rPr lang="en-BE" smtClean="0"/>
+              <a:t>6</a:t>
+            </a:fld>
+            <a:endParaRPr lang="en-BE"/>
           </a:p>
         </p:txBody>
       </p:sp>
@@ -23478,6 +25430,176 @@
   <p:clrMapOvr>
     <a:masterClrMapping/>
   </p:clrMapOvr>
+  <p:timing>
+    <p:tnLst>
+      <p:par>
+        <p:cTn id="1" dur="indefinite" restart="never" nodeType="tmRoot">
+          <p:childTnLst>
+            <p:seq concurrent="1" nextAc="seek">
+              <p:cTn id="2" dur="indefinite" nodeType="mainSeq">
+                <p:childTnLst>
+                  <p:par>
+                    <p:cTn id="3" fill="hold">
+                      <p:stCondLst>
+                        <p:cond delay="indefinite"/>
+                      </p:stCondLst>
+                      <p:childTnLst>
+                        <p:par>
+                          <p:cTn id="4" fill="hold">
+                            <p:stCondLst>
+                              <p:cond delay="0"/>
+                            </p:stCondLst>
+                            <p:childTnLst>
+                              <p:par>
+                                <p:cTn id="5" presetID="1" presetClass="entr" presetSubtype="0" fill="hold" grpId="0" nodeType="clickEffect">
+                                  <p:stCondLst>
+                                    <p:cond delay="0"/>
+                                  </p:stCondLst>
+                                  <p:childTnLst>
+                                    <p:set>
+                                      <p:cBhvr>
+                                        <p:cTn id="6" dur="1" fill="hold">
+                                          <p:stCondLst>
+                                            <p:cond delay="0"/>
+                                          </p:stCondLst>
+                                        </p:cTn>
+                                        <p:tgtEl>
+                                          <p:spTgt spid="50"/>
+                                        </p:tgtEl>
+                                        <p:attrNameLst>
+                                          <p:attrName>style.visibility</p:attrName>
+                                        </p:attrNameLst>
+                                      </p:cBhvr>
+                                      <p:to>
+                                        <p:strVal val="visible"/>
+                                      </p:to>
+                                    </p:set>
+                                  </p:childTnLst>
+                                </p:cTn>
+                              </p:par>
+                            </p:childTnLst>
+                          </p:cTn>
+                        </p:par>
+                      </p:childTnLst>
+                    </p:cTn>
+                  </p:par>
+                  <p:par>
+                    <p:cTn id="7" fill="hold">
+                      <p:stCondLst>
+                        <p:cond delay="indefinite"/>
+                      </p:stCondLst>
+                      <p:childTnLst>
+                        <p:par>
+                          <p:cTn id="8" fill="hold">
+                            <p:stCondLst>
+                              <p:cond delay="0"/>
+                            </p:stCondLst>
+                            <p:childTnLst>
+                              <p:par>
+                                <p:cTn id="9" presetID="1" presetClass="entr" presetSubtype="0" fill="hold" grpId="0" nodeType="clickEffect">
+                                  <p:stCondLst>
+                                    <p:cond delay="0"/>
+                                  </p:stCondLst>
+                                  <p:childTnLst>
+                                    <p:set>
+                                      <p:cBhvr>
+                                        <p:cTn id="10" dur="1" fill="hold">
+                                          <p:stCondLst>
+                                            <p:cond delay="0"/>
+                                          </p:stCondLst>
+                                        </p:cTn>
+                                        <p:tgtEl>
+                                          <p:spTgt spid="57"/>
+                                        </p:tgtEl>
+                                        <p:attrNameLst>
+                                          <p:attrName>style.visibility</p:attrName>
+                                        </p:attrNameLst>
+                                      </p:cBhvr>
+                                      <p:to>
+                                        <p:strVal val="visible"/>
+                                      </p:to>
+                                    </p:set>
+                                  </p:childTnLst>
+                                </p:cTn>
+                              </p:par>
+                            </p:childTnLst>
+                          </p:cTn>
+                        </p:par>
+                      </p:childTnLst>
+                    </p:cTn>
+                  </p:par>
+                  <p:par>
+                    <p:cTn id="11" fill="hold">
+                      <p:stCondLst>
+                        <p:cond delay="indefinite"/>
+                      </p:stCondLst>
+                      <p:childTnLst>
+                        <p:par>
+                          <p:cTn id="12" fill="hold">
+                            <p:stCondLst>
+                              <p:cond delay="0"/>
+                            </p:stCondLst>
+                            <p:childTnLst>
+                              <p:par>
+                                <p:cTn id="13" presetID="1" presetClass="entr" presetSubtype="0" fill="hold" grpId="0" nodeType="clickEffect">
+                                  <p:stCondLst>
+                                    <p:cond delay="0"/>
+                                  </p:stCondLst>
+                                  <p:childTnLst>
+                                    <p:set>
+                                      <p:cBhvr>
+                                        <p:cTn id="14" dur="1" fill="hold">
+                                          <p:stCondLst>
+                                            <p:cond delay="0"/>
+                                          </p:stCondLst>
+                                        </p:cTn>
+                                        <p:tgtEl>
+                                          <p:spTgt spid="4"/>
+                                        </p:tgtEl>
+                                        <p:attrNameLst>
+                                          <p:attrName>style.visibility</p:attrName>
+                                        </p:attrNameLst>
+                                      </p:cBhvr>
+                                      <p:to>
+                                        <p:strVal val="visible"/>
+                                      </p:to>
+                                    </p:set>
+                                  </p:childTnLst>
+                                </p:cTn>
+                              </p:par>
+                            </p:childTnLst>
+                          </p:cTn>
+                        </p:par>
+                      </p:childTnLst>
+                    </p:cTn>
+                  </p:par>
+                </p:childTnLst>
+              </p:cTn>
+              <p:prevCondLst>
+                <p:cond evt="onPrev" delay="0">
+                  <p:tgtEl>
+                    <p:sldTgt/>
+                  </p:tgtEl>
+                </p:cond>
+              </p:prevCondLst>
+              <p:nextCondLst>
+                <p:cond evt="onNext" delay="0">
+                  <p:tgtEl>
+                    <p:sldTgt/>
+                  </p:tgtEl>
+                </p:cond>
+              </p:nextCondLst>
+            </p:seq>
+          </p:childTnLst>
+        </p:cTn>
+      </p:par>
+    </p:tnLst>
+    <p:bldLst>
+      <p:bldP spid="50" grpId="0"/>
+      <p:bldP spid="57" grpId="0"/>
+      <p:bldP spid="4" grpId="0" animBg="1"/>
+    </p:bldLst>
+  </p:timing>
 </p:sld>
 </file>
 
@@ -23594,6 +25716,14 @@
               <a:t>educes parallel changes</a:t>
             </a:r>
           </a:p>
+          <a:p>
+            <a:pPr lvl="1"/>
+            <a:r>
+              <a:rPr lang="en-GB" sz="2800" dirty="0"/>
+              <a:t>Limits the blast radius of mistakes (human or AI-generated)</a:t>
+            </a:r>
+            <a:endParaRPr lang="en-BE" sz="2800" dirty="0"/>
+          </a:p>
         </p:txBody>
       </p:sp>
       <p:pic>
@@ -23626,6 +25756,76 @@
           </a:prstGeom>
         </p:spPr>
       </p:pic>
+      <p:sp>
+        <p:nvSpPr>
+          <p:cNvPr id="6" name="Slide Number Placeholder 5">
+            <a:extLst>
+              <a:ext uri="{FF2B5EF4-FFF2-40B4-BE49-F238E27FC236}">
+                <a16:creationId xmlns:a16="http://schemas.microsoft.com/office/drawing/2014/main" id="{D0AFB065-527E-4322-F7FB-06B506AD17FB}"/>
+              </a:ext>
+            </a:extLst>
+          </p:cNvPr>
+          <p:cNvSpPr>
+            <a:spLocks noGrp="1"/>
+          </p:cNvSpPr>
+          <p:nvPr>
+            <p:ph type="sldNum" sz="quarter" idx="12"/>
+          </p:nvPr>
+        </p:nvSpPr>
+        <p:spPr/>
+        <p:txBody>
+          <a:bodyPr/>
+          <a:lstStyle/>
+          <a:p>
+            <a:fld id="{6F19EB20-827F-9F40-A633-3810B83D00D5}" type="slidenum">
+              <a:rPr lang="en-BE" smtClean="0"/>
+              <a:t>7</a:t>
+            </a:fld>
+            <a:endParaRPr lang="en-BE"/>
+          </a:p>
+        </p:txBody>
+      </p:sp>
+      <p:sp>
+        <p:nvSpPr>
+          <p:cNvPr id="8" name="TextBox 7">
+            <a:extLst>
+              <a:ext uri="{FF2B5EF4-FFF2-40B4-BE49-F238E27FC236}">
+                <a16:creationId xmlns:a16="http://schemas.microsoft.com/office/drawing/2014/main" id="{E0EA868B-4EE1-D88C-1BAE-0D0665068F8E}"/>
+              </a:ext>
+            </a:extLst>
+          </p:cNvPr>
+          <p:cNvSpPr txBox="1"/>
+          <p:nvPr/>
+        </p:nvSpPr>
+        <p:spPr>
+          <a:xfrm>
+            <a:off x="1022445" y="5987018"/>
+            <a:ext cx="9936708" cy="400110"/>
+          </a:xfrm>
+          <a:prstGeom prst="rect">
+            <a:avLst/>
+          </a:prstGeom>
+          <a:noFill/>
+          <a:ln w="28575">
+            <a:solidFill>
+              <a:srgbClr val="C00000"/>
+            </a:solidFill>
+          </a:ln>
+        </p:spPr>
+        <p:txBody>
+          <a:bodyPr wrap="square">
+            <a:spAutoFit/>
+          </a:bodyPr>
+          <a:lstStyle/>
+          <a:p>
+            <a:r>
+              <a:rPr lang="en-GB" sz="2000" dirty="0"/>
+              <a:t>AI makes it easy to generate a lot of code quickly. Short-lived branches make it safe to do that.</a:t>
+            </a:r>
+            <a:endParaRPr lang="en-US" sz="2000" dirty="0"/>
+          </a:p>
+        </p:txBody>
+      </p:sp>
     </p:spTree>
     <p:extLst>
       <p:ext uri="{BB962C8B-B14F-4D97-AF65-F5344CB8AC3E}">
@@ -23636,6 +25836,84 @@
   <p:clrMapOvr>
     <a:masterClrMapping/>
   </p:clrMapOvr>
+  <p:timing>
+    <p:tnLst>
+      <p:par>
+        <p:cTn id="1" dur="indefinite" restart="never" nodeType="tmRoot">
+          <p:childTnLst>
+            <p:seq concurrent="1" nextAc="seek">
+              <p:cTn id="2" dur="indefinite" nodeType="mainSeq">
+                <p:childTnLst>
+                  <p:par>
+                    <p:cTn id="3" fill="hold">
+                      <p:stCondLst>
+                        <p:cond delay="indefinite"/>
+                      </p:stCondLst>
+                      <p:childTnLst>
+                        <p:par>
+                          <p:cTn id="4" fill="hold">
+                            <p:stCondLst>
+                              <p:cond delay="0"/>
+                            </p:stCondLst>
+                            <p:childTnLst>
+                              <p:par>
+                                <p:cTn id="5" presetID="1" presetClass="entr" presetSubtype="0" fill="hold" grpId="0" nodeType="clickEffect">
+                                  <p:stCondLst>
+                                    <p:cond delay="0"/>
+                                  </p:stCondLst>
+                                  <p:childTnLst>
+                                    <p:set>
+                                      <p:cBhvr>
+                                        <p:cTn id="6" dur="1" fill="hold">
+                                          <p:stCondLst>
+                                            <p:cond delay="0"/>
+                                          </p:stCondLst>
+                                        </p:cTn>
+                                        <p:tgtEl>
+                                          <p:spTgt spid="8"/>
+                                        </p:tgtEl>
+                                        <p:attrNameLst>
+                                          <p:attrName>style.visibility</p:attrName>
+                                        </p:attrNameLst>
+                                      </p:cBhvr>
+                                      <p:to>
+                                        <p:strVal val="visible"/>
+                                      </p:to>
+                                    </p:set>
+                                  </p:childTnLst>
+                                </p:cTn>
+                              </p:par>
+                            </p:childTnLst>
+                          </p:cTn>
+                        </p:par>
+                      </p:childTnLst>
+                    </p:cTn>
+                  </p:par>
+                </p:childTnLst>
+              </p:cTn>
+              <p:prevCondLst>
+                <p:cond evt="onPrev" delay="0">
+                  <p:tgtEl>
+                    <p:sldTgt/>
+                  </p:tgtEl>
+                </p:cond>
+              </p:prevCondLst>
+              <p:nextCondLst>
+                <p:cond evt="onNext" delay="0">
+                  <p:tgtEl>
+                    <p:sldTgt/>
+                  </p:tgtEl>
+                </p:cond>
+              </p:nextCondLst>
+            </p:seq>
+          </p:childTnLst>
+        </p:cTn>
+      </p:par>
+    </p:tnLst>
+    <p:bldLst>
+      <p:bldP spid="8" grpId="0" animBg="1"/>
+    </p:bldLst>
+  </p:timing>
 </p:sld>
 </file>
 
@@ -23730,18 +26008,14 @@
           </a:p>
           <a:p>
             <a:r>
-              <a:rPr lang="en-BE" sz="3200" dirty="0"/>
-              <a:t>Frequent pull requests serve as small pieces of bigger puzzle, </a:t>
-            </a:r>
-            <a:r>
-              <a:rPr lang="en-GB" sz="3200" b="0" i="0" dirty="0">
-                <a:solidFill>
-                  <a:srgbClr val="333333"/>
-                </a:solidFill>
-                <a:effectLst/>
-                <a:latin typeface="OpenSans"/>
-              </a:rPr>
-              <a:t>it easy to build upon the most updated code.</a:t>
+              <a:rPr lang="en-GB" sz="3200" dirty="0"/>
+              <a:t>Each pull request represents a small, reviewable decision</a:t>
+            </a:r>
+          </a:p>
+          <a:p>
+            <a:r>
+              <a:rPr lang="en-GB" sz="3200" dirty="0"/>
+              <a:t>Smaller PRs are easier to review, reason about, and reject</a:t>
             </a:r>
             <a:endParaRPr lang="en-BE" sz="3200" dirty="0"/>
           </a:p>
@@ -23811,6 +26085,35 @@
           </a:prstGeom>
         </p:spPr>
       </p:pic>
+      <p:sp>
+        <p:nvSpPr>
+          <p:cNvPr id="5" name="Slide Number Placeholder 4">
+            <a:extLst>
+              <a:ext uri="{FF2B5EF4-FFF2-40B4-BE49-F238E27FC236}">
+                <a16:creationId xmlns:a16="http://schemas.microsoft.com/office/drawing/2014/main" id="{9C2C2485-5995-2058-AC7D-48811A912C4C}"/>
+              </a:ext>
+            </a:extLst>
+          </p:cNvPr>
+          <p:cNvSpPr>
+            <a:spLocks noGrp="1"/>
+          </p:cNvSpPr>
+          <p:nvPr>
+            <p:ph type="sldNum" sz="quarter" idx="12"/>
+          </p:nvPr>
+        </p:nvSpPr>
+        <p:spPr/>
+        <p:txBody>
+          <a:bodyPr/>
+          <a:lstStyle/>
+          <a:p>
+            <a:fld id="{6F19EB20-827F-9F40-A633-3810B83D00D5}" type="slidenum">
+              <a:rPr lang="en-BE" smtClean="0"/>
+              <a:t>8</a:t>
+            </a:fld>
+            <a:endParaRPr lang="en-BE"/>
+          </a:p>
+        </p:txBody>
+      </p:sp>
     </p:spTree>
     <p:extLst>
       <p:ext uri="{BB962C8B-B14F-4D97-AF65-F5344CB8AC3E}">
@@ -23878,14 +26181,8 @@
           </a:p>
           <a:p>
             <a:r>
-              <a:rPr lang="en-GB" b="0" i="0" dirty="0">
-                <a:solidFill>
-                  <a:srgbClr val="333333"/>
-                </a:solidFill>
-                <a:effectLst/>
-                <a:latin typeface="OpenSans"/>
-              </a:rPr>
-              <a:t>These tools can run tests that ensure your file changes or pull requests don’t break the entire application.</a:t>
+              <a:rPr lang="en-GB" dirty="0"/>
+              <a:t>CI automatically validates every change before it can be merged</a:t>
             </a:r>
           </a:p>
           <a:p>
@@ -24060,6 +26357,76 @@
           </a:prstGeom>
         </p:spPr>
       </p:pic>
+      <p:sp>
+        <p:nvSpPr>
+          <p:cNvPr id="5" name="Slide Number Placeholder 4">
+            <a:extLst>
+              <a:ext uri="{FF2B5EF4-FFF2-40B4-BE49-F238E27FC236}">
+                <a16:creationId xmlns:a16="http://schemas.microsoft.com/office/drawing/2014/main" id="{54395EED-78C7-1A65-54DD-3C2216911949}"/>
+              </a:ext>
+            </a:extLst>
+          </p:cNvPr>
+          <p:cNvSpPr>
+            <a:spLocks noGrp="1"/>
+          </p:cNvSpPr>
+          <p:nvPr>
+            <p:ph type="sldNum" sz="quarter" idx="12"/>
+          </p:nvPr>
+        </p:nvSpPr>
+        <p:spPr/>
+        <p:txBody>
+          <a:bodyPr/>
+          <a:lstStyle/>
+          <a:p>
+            <a:fld id="{6F19EB20-827F-9F40-A633-3810B83D00D5}" type="slidenum">
+              <a:rPr lang="en-BE" smtClean="0"/>
+              <a:t>9</a:t>
+            </a:fld>
+            <a:endParaRPr lang="en-BE"/>
+          </a:p>
+        </p:txBody>
+      </p:sp>
+      <p:sp>
+        <p:nvSpPr>
+          <p:cNvPr id="9" name="TextBox 8">
+            <a:extLst>
+              <a:ext uri="{FF2B5EF4-FFF2-40B4-BE49-F238E27FC236}">
+                <a16:creationId xmlns:a16="http://schemas.microsoft.com/office/drawing/2014/main" id="{39FD37FB-83EF-4ADD-BBE3-EEEC1A7D5625}"/>
+              </a:ext>
+            </a:extLst>
+          </p:cNvPr>
+          <p:cNvSpPr txBox="1"/>
+          <p:nvPr/>
+        </p:nvSpPr>
+        <p:spPr>
+          <a:xfrm>
+            <a:off x="1890512" y="5417740"/>
+            <a:ext cx="6100548" cy="461665"/>
+          </a:xfrm>
+          <a:prstGeom prst="rect">
+            <a:avLst/>
+          </a:prstGeom>
+          <a:noFill/>
+          <a:ln w="28575">
+            <a:solidFill>
+              <a:srgbClr val="C00000"/>
+            </a:solidFill>
+          </a:ln>
+        </p:spPr>
+        <p:txBody>
+          <a:bodyPr wrap="square">
+            <a:spAutoFit/>
+          </a:bodyPr>
+          <a:lstStyle/>
+          <a:p>
+            <a:r>
+              <a:rPr lang="en-GB" sz="2400" dirty="0"/>
+              <a:t>CI doesn’t trust you — and that’s a good thing.</a:t>
+            </a:r>
+            <a:endParaRPr lang="en-US" sz="2400" dirty="0"/>
+          </a:p>
+        </p:txBody>
+      </p:sp>
     </p:spTree>
     <p:extLst>
       <p:ext uri="{BB962C8B-B14F-4D97-AF65-F5344CB8AC3E}">
@@ -24070,6 +26437,84 @@
   <p:clrMapOvr>
     <a:masterClrMapping/>
   </p:clrMapOvr>
+  <p:timing>
+    <p:tnLst>
+      <p:par>
+        <p:cTn id="1" dur="indefinite" restart="never" nodeType="tmRoot">
+          <p:childTnLst>
+            <p:seq concurrent="1" nextAc="seek">
+              <p:cTn id="2" dur="indefinite" nodeType="mainSeq">
+                <p:childTnLst>
+                  <p:par>
+                    <p:cTn id="3" fill="hold">
+                      <p:stCondLst>
+                        <p:cond delay="indefinite"/>
+                      </p:stCondLst>
+                      <p:childTnLst>
+                        <p:par>
+                          <p:cTn id="4" fill="hold">
+                            <p:stCondLst>
+                              <p:cond delay="0"/>
+                            </p:stCondLst>
+                            <p:childTnLst>
+                              <p:par>
+                                <p:cTn id="5" presetID="1" presetClass="entr" presetSubtype="0" fill="hold" grpId="0" nodeType="clickEffect">
+                                  <p:stCondLst>
+                                    <p:cond delay="0"/>
+                                  </p:stCondLst>
+                                  <p:childTnLst>
+                                    <p:set>
+                                      <p:cBhvr>
+                                        <p:cTn id="6" dur="1" fill="hold">
+                                          <p:stCondLst>
+                                            <p:cond delay="0"/>
+                                          </p:stCondLst>
+                                        </p:cTn>
+                                        <p:tgtEl>
+                                          <p:spTgt spid="9"/>
+                                        </p:tgtEl>
+                                        <p:attrNameLst>
+                                          <p:attrName>style.visibility</p:attrName>
+                                        </p:attrNameLst>
+                                      </p:cBhvr>
+                                      <p:to>
+                                        <p:strVal val="visible"/>
+                                      </p:to>
+                                    </p:set>
+                                  </p:childTnLst>
+                                </p:cTn>
+                              </p:par>
+                            </p:childTnLst>
+                          </p:cTn>
+                        </p:par>
+                      </p:childTnLst>
+                    </p:cTn>
+                  </p:par>
+                </p:childTnLst>
+              </p:cTn>
+              <p:prevCondLst>
+                <p:cond evt="onPrev" delay="0">
+                  <p:tgtEl>
+                    <p:sldTgt/>
+                  </p:tgtEl>
+                </p:cond>
+              </p:prevCondLst>
+              <p:nextCondLst>
+                <p:cond evt="onNext" delay="0">
+                  <p:tgtEl>
+                    <p:sldTgt/>
+                  </p:tgtEl>
+                </p:cond>
+              </p:nextCondLst>
+            </p:seq>
+          </p:childTnLst>
+        </p:cTn>
+      </p:par>
+    </p:tnLst>
+    <p:bldLst>
+      <p:bldP spid="9" grpId="0" animBg="1"/>
+    </p:bldLst>
+  </p:timing>
 </p:sld>
 </file>
 

</xml_diff>